<commit_message>
Add LRU to presentation.
</commit_message>
<xml_diff>
--- a/Project2/prj2pre.pptx
+++ b/Project2/prj2pre.pptx
@@ -5,7 +5,7 @@
     <p:sldMasterId id="2147483684" r:id="rId1"/>
   </p:sldMasterIdLst>
   <p:notesMasterIdLst>
-    <p:notesMasterId r:id="rId27"/>
+    <p:notesMasterId r:id="rId36"/>
   </p:notesMasterIdLst>
   <p:sldIdLst>
     <p:sldId id="256" r:id="rId2"/>
@@ -16,23 +16,32 @@
     <p:sldId id="267" r:id="rId7"/>
     <p:sldId id="266" r:id="rId8"/>
     <p:sldId id="261" r:id="rId9"/>
-    <p:sldId id="262" r:id="rId10"/>
+    <p:sldId id="281" r:id="rId10"/>
     <p:sldId id="277" r:id="rId11"/>
     <p:sldId id="263" r:id="rId12"/>
-    <p:sldId id="268" r:id="rId13"/>
-    <p:sldId id="270" r:id="rId14"/>
+    <p:sldId id="283" r:id="rId13"/>
+    <p:sldId id="282" r:id="rId14"/>
     <p:sldId id="269" r:id="rId15"/>
     <p:sldId id="276" r:id="rId16"/>
-    <p:sldId id="278" r:id="rId17"/>
-    <p:sldId id="279" r:id="rId18"/>
-    <p:sldId id="271" r:id="rId19"/>
-    <p:sldId id="272" r:id="rId20"/>
-    <p:sldId id="273" r:id="rId21"/>
-    <p:sldId id="274" r:id="rId22"/>
-    <p:sldId id="275" r:id="rId23"/>
-    <p:sldId id="280" r:id="rId24"/>
-    <p:sldId id="264" r:id="rId25"/>
-    <p:sldId id="265" r:id="rId26"/>
+    <p:sldId id="288" r:id="rId17"/>
+    <p:sldId id="289" r:id="rId18"/>
+    <p:sldId id="290" r:id="rId19"/>
+    <p:sldId id="291" r:id="rId20"/>
+    <p:sldId id="292" r:id="rId21"/>
+    <p:sldId id="262" r:id="rId22"/>
+    <p:sldId id="285" r:id="rId23"/>
+    <p:sldId id="287" r:id="rId24"/>
+    <p:sldId id="270" r:id="rId25"/>
+    <p:sldId id="278" r:id="rId26"/>
+    <p:sldId id="279" r:id="rId27"/>
+    <p:sldId id="271" r:id="rId28"/>
+    <p:sldId id="272" r:id="rId29"/>
+    <p:sldId id="273" r:id="rId30"/>
+    <p:sldId id="274" r:id="rId31"/>
+    <p:sldId id="275" r:id="rId32"/>
+    <p:sldId id="280" r:id="rId33"/>
+    <p:sldId id="264" r:id="rId34"/>
+    <p:sldId id="265" r:id="rId35"/>
   </p:sldIdLst>
   <p:sldSz cx="9144000" cy="6858000" type="screen4x3"/>
   <p:notesSz cx="6858000" cy="9144000"/>
@@ -221,7 +230,7 @@
           <a:p>
             <a:fld id="{381AE319-54B2-4E7D-A7DE-C129642D9372}" type="datetimeFigureOut">
               <a:rPr lang="zh-CN" altLang="en-US" smtClean="0"/>
-              <a:t>2019/6/17</a:t>
+              <a:t>2019/6/22</a:t>
             </a:fld>
             <a:endParaRPr lang="zh-CN" altLang="en-US"/>
           </a:p>
@@ -678,7 +687,7 @@
           <a:p>
             <a:fld id="{5D3A1078-3DED-4C23-8D1E-0FD29ACCB236}" type="datetime1">
               <a:rPr lang="en-US" altLang="zh-CN" smtClean="0"/>
-              <a:t>6/17/2019</a:t>
+              <a:t>6/22/2019</a:t>
             </a:fld>
             <a:endParaRPr lang="zh-CN" altLang="en-US"/>
           </a:p>
@@ -928,7 +937,7 @@
           <a:p>
             <a:fld id="{D738D431-F424-4476-81D7-C94BC7E6A0F0}" type="datetime1">
               <a:rPr lang="en-US" altLang="zh-CN" smtClean="0"/>
-              <a:t>6/17/2019</a:t>
+              <a:t>6/22/2019</a:t>
             </a:fld>
             <a:endParaRPr lang="zh-CN" altLang="en-US"/>
           </a:p>
@@ -1190,7 +1199,7 @@
           <a:p>
             <a:fld id="{5673D9D3-A427-442F-95AC-4A8D99DB73A3}" type="datetime1">
               <a:rPr lang="en-US" altLang="zh-CN" smtClean="0"/>
-              <a:t>6/17/2019</a:t>
+              <a:t>6/22/2019</a:t>
             </a:fld>
             <a:endParaRPr lang="zh-CN" altLang="en-US"/>
           </a:p>
@@ -1396,7 +1405,7 @@
           <a:p>
             <a:fld id="{42D6268D-2F70-4DA1-AFF2-3D6BAAA66193}" type="datetime1">
               <a:rPr lang="en-US" altLang="zh-CN" smtClean="0"/>
-              <a:t>6/17/2019</a:t>
+              <a:t>6/22/2019</a:t>
             </a:fld>
             <a:endParaRPr lang="zh-CN" altLang="en-US"/>
           </a:p>
@@ -1699,7 +1708,7 @@
           <a:p>
             <a:fld id="{832FBCBD-8421-4E2E-9FC7-E5C14DCBF41E}" type="datetime1">
               <a:rPr lang="en-US" altLang="zh-CN" smtClean="0"/>
-              <a:t>6/17/2019</a:t>
+              <a:t>6/22/2019</a:t>
             </a:fld>
             <a:endParaRPr lang="zh-CN" altLang="en-US"/>
           </a:p>
@@ -2016,7 +2025,7 @@
           <a:p>
             <a:fld id="{D03CE57E-267A-40BB-806F-75094D4A2095}" type="datetime1">
               <a:rPr lang="en-US" altLang="zh-CN" smtClean="0"/>
-              <a:t>6/17/2019</a:t>
+              <a:t>6/22/2019</a:t>
             </a:fld>
             <a:endParaRPr lang="zh-CN" altLang="en-US"/>
           </a:p>
@@ -2399,7 +2408,7 @@
           <a:p>
             <a:fld id="{F5D01026-E108-4AC1-8BD0-671D6390BCA8}" type="datetime1">
               <a:rPr lang="en-US" altLang="zh-CN" smtClean="0"/>
-              <a:t>6/17/2019</a:t>
+              <a:t>6/22/2019</a:t>
             </a:fld>
             <a:endParaRPr lang="zh-CN" altLang="en-US"/>
           </a:p>
@@ -2521,7 +2530,7 @@
           <a:p>
             <a:fld id="{53229592-1EDE-4376-A776-52E6F6611B9D}" type="datetime1">
               <a:rPr lang="en-US" altLang="zh-CN" smtClean="0"/>
-              <a:t>6/17/2019</a:t>
+              <a:t>6/22/2019</a:t>
             </a:fld>
             <a:endParaRPr lang="zh-CN" altLang="en-US"/>
           </a:p>
@@ -2698,7 +2707,7 @@
           <a:p>
             <a:fld id="{4BD7FCF5-BF71-45E0-B538-2F8CBB745C5C}" type="datetime1">
               <a:rPr lang="en-US" altLang="zh-CN" smtClean="0"/>
-              <a:t>6/17/2019</a:t>
+              <a:t>6/22/2019</a:t>
             </a:fld>
             <a:endParaRPr lang="zh-CN" altLang="en-US"/>
           </a:p>
@@ -3058,7 +3067,7 @@
           <a:p>
             <a:fld id="{070B7305-538A-4350-A4CA-8090D9E2C75F}" type="datetime1">
               <a:rPr lang="en-US" altLang="zh-CN" smtClean="0"/>
-              <a:t>6/17/2019</a:t>
+              <a:t>6/22/2019</a:t>
             </a:fld>
             <a:endParaRPr lang="zh-CN" altLang="en-US"/>
           </a:p>
@@ -3441,7 +3450,7 @@
           <a:p>
             <a:fld id="{AD210078-1402-4F42-9824-4719B5ED631B}" type="datetime1">
               <a:rPr lang="en-US" altLang="zh-CN" smtClean="0"/>
-              <a:t>6/17/2019</a:t>
+              <a:t>6/22/2019</a:t>
             </a:fld>
             <a:endParaRPr lang="zh-CN" altLang="en-US"/>
           </a:p>
@@ -3734,7 +3743,7 @@
           <a:p>
             <a:fld id="{01A8D15C-AF12-47A7-A90E-2315D48B3496}" type="datetime1">
               <a:rPr lang="en-US" altLang="zh-CN" smtClean="0"/>
-              <a:t>6/17/2019</a:t>
+              <a:t>6/22/2019</a:t>
             </a:fld>
             <a:endParaRPr lang="zh-CN" altLang="en-US"/>
           </a:p>
@@ -4440,7 +4449,7 @@
           <a:p>
             <a:fld id="{832FBCBD-8421-4E2E-9FC7-E5C14DCBF41E}" type="datetime1">
               <a:rPr lang="en-US" altLang="zh-CN" smtClean="0"/>
-              <a:t>6/17/2019</a:t>
+              <a:t>6/22/2019</a:t>
             </a:fld>
             <a:endParaRPr lang="zh-CN" altLang="en-US"/>
           </a:p>
@@ -4579,7 +4588,7 @@
             <p:ph idx="1"/>
             <p:extLst>
               <p:ext uri="{D42A27DB-BD31-4B8C-83A1-F6EECF244321}">
-                <p14:modId xmlns:p14="http://schemas.microsoft.com/office/powerpoint/2010/main" val="97897041"/>
+                <p14:modId xmlns:p14="http://schemas.microsoft.com/office/powerpoint/2010/main" val="80502303"/>
               </p:ext>
             </p:extLst>
           </p:nvPr>
@@ -4653,7 +4662,7 @@
                     <a:p>
                       <a:r>
                         <a:rPr lang="en-US" altLang="zh-CN" dirty="0"/>
-                        <a:t>LFU</a:t>
+                        <a:t>New LRU</a:t>
                       </a:r>
                       <a:endParaRPr lang="zh-CN" altLang="en-US" dirty="0"/>
                     </a:p>
@@ -4674,7 +4683,7 @@
                     <a:p>
                       <a:r>
                         <a:rPr lang="en-US" altLang="zh-CN" dirty="0"/>
-                        <a:t>Refresh page</a:t>
+                        <a:t>Access page</a:t>
                       </a:r>
                       <a:endParaRPr lang="zh-CN" altLang="en-US" dirty="0"/>
                     </a:p>
@@ -4687,29 +4696,29 @@
                     <a:lstStyle/>
                     <a:p>
                       <a:r>
-                        <a:rPr lang="en-US" altLang="zh-CN" dirty="0"/>
+                        <a:rPr lang="en-US" altLang="zh-CN"/>
                         <a:t>If </a:t>
                       </a:r>
                       <a:r>
-                        <a:rPr lang="en-US" altLang="zh-CN" dirty="0">
+                        <a:rPr lang="en-US" altLang="zh-CN">
                           <a:latin typeface="Consolas" panose="020B0609020204030204" pitchFamily="49" charset="0"/>
                         </a:rPr>
                         <a:t>PG_referenced</a:t>
                       </a:r>
                       <a:r>
-                        <a:rPr lang="en-US" altLang="zh-CN" dirty="0">
+                        <a:rPr lang="en-US" altLang="zh-CN">
                           <a:latin typeface="+mn-lt"/>
                         </a:rPr>
                         <a:t> </a:t>
                       </a:r>
                       <a:r>
-                        <a:rPr lang="en-US" altLang="zh-CN" dirty="0"/>
+                        <a:rPr lang="en-US" altLang="zh-CN"/>
                         <a:t>is 0, set it.</a:t>
                       </a:r>
                     </a:p>
                     <a:p>
                       <a:r>
-                        <a:rPr lang="en-US" altLang="zh-CN" dirty="0"/>
+                        <a:rPr lang="en-US" altLang="zh-CN"/>
                         <a:t>Otherwise clear it and add to active list.</a:t>
                       </a:r>
                       <a:endParaRPr lang="zh-CN" altLang="en-US" dirty="0"/>
@@ -4724,7 +4733,7 @@
                     <a:p>
                       <a:r>
                         <a:rPr lang="en-US" altLang="zh-CN" dirty="0"/>
-                        <a:t>Left shift </a:t>
+                        <a:t>Right shift </a:t>
                       </a:r>
                       <a:r>
                         <a:rPr lang="en-US" altLang="zh-CN" dirty="0">
@@ -4789,7 +4798,7 @@
                         <a:t>If </a:t>
                       </a:r>
                       <a:r>
-                        <a:rPr lang="en-US" altLang="zh-CN" dirty="0">
+                        <a:rPr lang="en-US" altLang="zh-CN" dirty="0" err="1">
                           <a:latin typeface="Consolas" panose="020B0609020204030204" pitchFamily="49" charset="0"/>
                         </a:rPr>
                         <a:t>PG_referenced</a:t>
@@ -4872,7 +4881,7 @@
           <a:p>
             <a:fld id="{832FBCBD-8421-4E2E-9FC7-E5C14DCBF41E}" type="datetime1">
               <a:rPr lang="en-US" altLang="zh-CN" smtClean="0"/>
-              <a:t>6/17/2019</a:t>
+              <a:t>6/22/2019</a:t>
             </a:fld>
             <a:endParaRPr lang="zh-CN" altLang="en-US"/>
           </a:p>
@@ -4951,7 +4960,7 @@
           <p:nvPr>
             <p:extLst>
               <p:ext uri="{D42A27DB-BD31-4B8C-83A1-F6EECF244321}">
-                <p14:modId xmlns:p14="http://schemas.microsoft.com/office/powerpoint/2010/main" val="1729327312"/>
+                <p14:modId xmlns:p14="http://schemas.microsoft.com/office/powerpoint/2010/main" val="3187641732"/>
               </p:ext>
             </p:extLst>
           </p:nvPr>
@@ -5025,7 +5034,7 @@
                     <a:p>
                       <a:r>
                         <a:rPr lang="en-US" altLang="zh-CN" dirty="0"/>
-                        <a:t>LFU</a:t>
+                        <a:t>New LRU</a:t>
                       </a:r>
                       <a:endParaRPr lang="zh-CN" altLang="en-US" dirty="0"/>
                     </a:p>
@@ -5227,73 +5236,191 @@
           </a:p>
         </p:txBody>
       </p:sp>
-      <p:sp>
-        <p:nvSpPr>
-          <p:cNvPr id="3" name="内容占位符 2">
-            <a:extLst>
-              <a:ext uri="{FF2B5EF4-FFF2-40B4-BE49-F238E27FC236}">
-                <a16:creationId xmlns:a16="http://schemas.microsoft.com/office/drawing/2014/main" id="{E6398D6D-484D-49D6-81ED-76C84177570D}"/>
-              </a:ext>
-            </a:extLst>
-          </p:cNvPr>
-          <p:cNvSpPr>
-            <a:spLocks noGrp="1"/>
-          </p:cNvSpPr>
-          <p:nvPr>
-            <p:ph idx="1"/>
-          </p:nvPr>
-        </p:nvSpPr>
-        <p:spPr/>
-        <p:txBody>
-          <a:bodyPr/>
-          <a:lstStyle/>
-          <a:p>
-            <a:r>
-              <a:rPr lang="en-US" altLang="zh-CN" dirty="0"/>
-              <a:t>The offset to add to </a:t>
-            </a:r>
-            <a:r>
-              <a:rPr lang="en-US" altLang="zh-CN" dirty="0">
-                <a:latin typeface="Consolas" panose="020B0609020204030204" pitchFamily="49" charset="0"/>
-              </a:rPr>
-              <a:t>PG_referenced</a:t>
-            </a:r>
-            <a:r>
-              <a:rPr lang="en-US" altLang="zh-CN" dirty="0"/>
-              <a:t> when page is refreshed: 1</a:t>
-            </a:r>
-          </a:p>
-          <a:p>
-            <a:r>
-              <a:rPr lang="en-US" altLang="zh-CN" dirty="0"/>
-              <a:t>The threshold of moving pages between lists: to be tested</a:t>
-            </a:r>
-          </a:p>
-          <a:p>
-            <a:r>
-              <a:rPr lang="en-US" altLang="zh-CN" dirty="0"/>
-              <a:t>The maximum limit of</a:t>
-            </a:r>
-            <a:r>
-              <a:rPr lang="en-US" altLang="zh-CN" dirty="0">
-                <a:latin typeface="Bahnschrift" panose="020B0502040204020203" pitchFamily="34" charset="0"/>
-              </a:rPr>
-              <a:t> </a:t>
-            </a:r>
-            <a:r>
-              <a:rPr lang="en-US" altLang="zh-CN" dirty="0">
-                <a:latin typeface="Consolas" panose="020B0609020204030204" pitchFamily="49" charset="0"/>
-              </a:rPr>
-              <a:t>PG_referenced</a:t>
-            </a:r>
-            <a:r>
-              <a:rPr lang="en-US" altLang="zh-CN" dirty="0"/>
-              <a:t>: necessary, also to be tested</a:t>
-            </a:r>
-            <a:endParaRPr lang="zh-CN" altLang="en-US" dirty="0"/>
-          </a:p>
-        </p:txBody>
-      </p:sp>
+      <mc:AlternateContent xmlns:mc="http://schemas.openxmlformats.org/markup-compatibility/2006">
+        <mc:Choice xmlns:a14="http://schemas.microsoft.com/office/drawing/2010/main" Requires="a14">
+          <p:sp>
+            <p:nvSpPr>
+              <p:cNvPr id="3" name="内容占位符 2">
+                <a:extLst>
+                  <a:ext uri="{FF2B5EF4-FFF2-40B4-BE49-F238E27FC236}">
+                    <a16:creationId xmlns:a16="http://schemas.microsoft.com/office/drawing/2014/main" id="{E6398D6D-484D-49D6-81ED-76C84177570D}"/>
+                  </a:ext>
+                </a:extLst>
+              </p:cNvPr>
+              <p:cNvSpPr>
+                <a:spLocks noGrp="1"/>
+              </p:cNvSpPr>
+              <p:nvPr>
+                <p:ph idx="1"/>
+              </p:nvPr>
+            </p:nvSpPr>
+            <p:spPr/>
+            <p:txBody>
+              <a:bodyPr/>
+              <a:lstStyle/>
+              <a:p>
+                <a:r>
+                  <a:rPr lang="en-US" altLang="zh-CN" dirty="0"/>
+                  <a:t>The offset to add to </a:t>
+                </a:r>
+                <a:r>
+                  <a:rPr lang="en-US" altLang="zh-CN" dirty="0">
+                    <a:latin typeface="Consolas" panose="020B0609020204030204" pitchFamily="49" charset="0"/>
+                  </a:rPr>
+                  <a:t>PG_referenced</a:t>
+                </a:r>
+                <a:r>
+                  <a:rPr lang="en-US" altLang="zh-CN" dirty="0"/>
+                  <a:t> when page is accessed </a:t>
+                </a:r>
+                <a14:m>
+                  <m:oMath xmlns:m="http://schemas.openxmlformats.org/officeDocument/2006/math">
+                    <m:sSup>
+                      <m:sSupPr>
+                        <m:ctrlPr>
+                          <a:rPr lang="en-US" altLang="zh-CN" b="0" i="1" smtClean="0">
+                            <a:latin typeface="Cambria Math" panose="02040503050406030204" pitchFamily="18" charset="0"/>
+                          </a:rPr>
+                        </m:ctrlPr>
+                      </m:sSupPr>
+                      <m:e>
+                        <m:r>
+                          <a:rPr lang="en-US" altLang="zh-CN" b="0" i="1" smtClean="0">
+                            <a:latin typeface="Cambria Math" panose="02040503050406030204" pitchFamily="18" charset="0"/>
+                          </a:rPr>
+                          <m:t>2</m:t>
+                        </m:r>
+                      </m:e>
+                      <m:sup>
+                        <m:r>
+                          <a:rPr lang="en-US" altLang="zh-CN" b="0" i="1" smtClean="0">
+                            <a:latin typeface="Cambria Math" panose="02040503050406030204" pitchFamily="18" charset="0"/>
+                          </a:rPr>
+                          <m:t>𝑂</m:t>
+                        </m:r>
+                      </m:sup>
+                    </m:sSup>
+                  </m:oMath>
+                </a14:m>
+                <a:r>
+                  <a:rPr lang="en-US" altLang="zh-CN" dirty="0"/>
+                  <a:t>.</a:t>
+                </a:r>
+              </a:p>
+              <a:p>
+                <a:r>
+                  <a:rPr lang="en-US" altLang="zh-CN" dirty="0"/>
+                  <a:t>The threshold of moving pages between lists </a:t>
+                </a:r>
+                <a14:m>
+                  <m:oMath xmlns:m="http://schemas.openxmlformats.org/officeDocument/2006/math">
+                    <m:sSup>
+                      <m:sSupPr>
+                        <m:ctrlPr>
+                          <a:rPr lang="en-US" altLang="zh-CN" b="0" i="1" smtClean="0">
+                            <a:latin typeface="Cambria Math" panose="02040503050406030204" pitchFamily="18" charset="0"/>
+                          </a:rPr>
+                        </m:ctrlPr>
+                      </m:sSupPr>
+                      <m:e>
+                        <m:r>
+                          <a:rPr lang="en-US" altLang="zh-CN" b="0" i="1" smtClean="0">
+                            <a:latin typeface="Cambria Math" panose="02040503050406030204" pitchFamily="18" charset="0"/>
+                          </a:rPr>
+                          <m:t>2</m:t>
+                        </m:r>
+                      </m:e>
+                      <m:sup>
+                        <m:r>
+                          <a:rPr lang="en-US" altLang="zh-CN" b="0" i="1" smtClean="0">
+                            <a:latin typeface="Cambria Math" panose="02040503050406030204" pitchFamily="18" charset="0"/>
+                          </a:rPr>
+                          <m:t>𝑇</m:t>
+                        </m:r>
+                      </m:sup>
+                    </m:sSup>
+                  </m:oMath>
+                </a14:m>
+                <a:r>
+                  <a:rPr lang="en-US" altLang="zh-CN" dirty="0"/>
+                  <a:t>.</a:t>
+                </a:r>
+              </a:p>
+              <a:p>
+                <a:r>
+                  <a:rPr lang="en-US" altLang="zh-CN" b="0" dirty="0"/>
+                  <a:t>It’s </a:t>
+                </a:r>
+                <a14:m>
+                  <m:oMath xmlns:m="http://schemas.openxmlformats.org/officeDocument/2006/math">
+                    <m:r>
+                      <a:rPr lang="en-US" altLang="zh-CN" b="0" i="1" smtClean="0">
+                        <a:latin typeface="Cambria Math" panose="02040503050406030204" pitchFamily="18" charset="0"/>
+                      </a:rPr>
+                      <m:t>𝑂</m:t>
+                    </m:r>
+                    <m:r>
+                      <a:rPr lang="en-US" altLang="zh-CN" b="0" i="1" smtClean="0">
+                        <a:latin typeface="Cambria Math" panose="02040503050406030204" pitchFamily="18" charset="0"/>
+                      </a:rPr>
+                      <m:t>−</m:t>
+                    </m:r>
+                    <m:r>
+                      <a:rPr lang="en-US" altLang="zh-CN" b="0" i="1" smtClean="0">
+                        <a:latin typeface="Cambria Math" panose="02040503050406030204" pitchFamily="18" charset="0"/>
+                      </a:rPr>
+                      <m:t>𝑇</m:t>
+                    </m:r>
+                  </m:oMath>
+                </a14:m>
+                <a:r>
+                  <a:rPr lang="en-US" altLang="zh-CN" dirty="0"/>
+                  <a:t> that affects list sizes.</a:t>
+                </a:r>
+              </a:p>
+            </p:txBody>
+          </p:sp>
+        </mc:Choice>
+        <mc:Fallback>
+          <p:sp>
+            <p:nvSpPr>
+              <p:cNvPr id="3" name="内容占位符 2">
+                <a:extLst>
+                  <a:ext uri="{FF2B5EF4-FFF2-40B4-BE49-F238E27FC236}">
+                    <a16:creationId xmlns:a16="http://schemas.microsoft.com/office/drawing/2014/main" id="{E6398D6D-484D-49D6-81ED-76C84177570D}"/>
+                  </a:ext>
+                </a:extLst>
+              </p:cNvPr>
+              <p:cNvSpPr>
+                <a:spLocks noGrp="1" noRot="1" noChangeAspect="1" noMove="1" noResize="1" noEditPoints="1" noAdjustHandles="1" noChangeArrowheads="1" noChangeShapeType="1" noTextEdit="1"/>
+              </p:cNvSpPr>
+              <p:nvPr>
+                <p:ph idx="1"/>
+              </p:nvPr>
+            </p:nvSpPr>
+            <p:spPr>
+              <a:blipFill>
+                <a:blip r:embed="rId2"/>
+                <a:stretch>
+                  <a:fillRect l="-2262"/>
+                </a:stretch>
+              </a:blipFill>
+            </p:spPr>
+            <p:txBody>
+              <a:bodyPr/>
+              <a:lstStyle/>
+              <a:p>
+                <a:r>
+                  <a:rPr lang="zh-CN" altLang="en-US">
+                    <a:noFill/>
+                  </a:rPr>
+                  <a:t> </a:t>
+                </a:r>
+              </a:p>
+            </p:txBody>
+          </p:sp>
+        </mc:Fallback>
+      </mc:AlternateContent>
       <p:sp>
         <p:nvSpPr>
           <p:cNvPr id="4" name="日期占位符 3">
@@ -5317,9 +5444,9 @@
           <a:p>
             <a:fld id="{42D6268D-2F70-4DA1-AFF2-3D6BAAA66193}" type="datetime1">
               <a:rPr lang="en-US" altLang="zh-CN" smtClean="0"/>
-              <a:t>6/17/2019</a:t>
+              <a:t>6/22/2019</a:t>
             </a:fld>
-            <a:endParaRPr lang="zh-CN" altLang="en-US"/>
+            <a:endParaRPr lang="zh-CN" altLang="en-US" dirty="0"/>
           </a:p>
         </p:txBody>
       </p:sp>
@@ -5384,7 +5511,7 @@
     </p:spTree>
     <p:extLst>
       <p:ext uri="{BB962C8B-B14F-4D97-AF65-F5344CB8AC3E}">
-        <p14:creationId xmlns:p14="http://schemas.microsoft.com/office/powerpoint/2010/main" val="202067765"/>
+        <p14:creationId xmlns:p14="http://schemas.microsoft.com/office/powerpoint/2010/main" val="1432141772"/>
       </p:ext>
     </p:extLst>
   </p:cSld>
@@ -5416,7 +5543,7 @@
           <p:cNvPr id="7" name="标题 6">
             <a:extLst>
               <a:ext uri="{FF2B5EF4-FFF2-40B4-BE49-F238E27FC236}">
-                <a16:creationId xmlns:a16="http://schemas.microsoft.com/office/drawing/2014/main" id="{17F8988D-E427-42CD-999A-379EE24D2B5F}"/>
+                <a16:creationId xmlns:a16="http://schemas.microsoft.com/office/drawing/2014/main" id="{FD6534D0-615D-4C22-9677-D0D116248DCE}"/>
               </a:ext>
             </a:extLst>
           </p:cNvPr>
@@ -5445,7 +5572,7 @@
           <p:cNvPr id="8" name="文本占位符 7">
             <a:extLst>
               <a:ext uri="{FF2B5EF4-FFF2-40B4-BE49-F238E27FC236}">
-                <a16:creationId xmlns:a16="http://schemas.microsoft.com/office/drawing/2014/main" id="{7BC2171B-E065-4AD6-9279-F82B0770FF9C}"/>
+                <a16:creationId xmlns:a16="http://schemas.microsoft.com/office/drawing/2014/main" id="{25B8186D-2F9B-4E66-A303-5AFCB987B826}"/>
               </a:ext>
             </a:extLst>
           </p:cNvPr>
@@ -5461,7 +5588,11 @@
           <a:bodyPr/>
           <a:lstStyle/>
           <a:p>
-            <a:endParaRPr lang="zh-CN" altLang="en-US"/>
+            <a:r>
+              <a:rPr lang="en-US" altLang="zh-CN" dirty="0"/>
+              <a:t>New LRU Algorithm</a:t>
+            </a:r>
+            <a:endParaRPr lang="zh-CN" altLang="en-US" dirty="0"/>
           </a:p>
         </p:txBody>
       </p:sp>
@@ -5470,7 +5601,7 @@
           <p:cNvPr id="4" name="日期占位符 3">
             <a:extLst>
               <a:ext uri="{FF2B5EF4-FFF2-40B4-BE49-F238E27FC236}">
-                <a16:creationId xmlns:a16="http://schemas.microsoft.com/office/drawing/2014/main" id="{AB937B1A-8DA4-443A-BDFD-A8B81ABB38CB}"/>
+                <a16:creationId xmlns:a16="http://schemas.microsoft.com/office/drawing/2014/main" id="{21C703E0-1B0A-4E9E-950D-1ECA07AE08EC}"/>
               </a:ext>
             </a:extLst>
           </p:cNvPr>
@@ -5488,7 +5619,7 @@
           <a:p>
             <a:fld id="{42D6268D-2F70-4DA1-AFF2-3D6BAAA66193}" type="datetime1">
               <a:rPr lang="en-US" altLang="zh-CN" smtClean="0"/>
-              <a:t>6/17/2019</a:t>
+              <a:t>6/22/2019</a:t>
             </a:fld>
             <a:endParaRPr lang="zh-CN" altLang="en-US"/>
           </a:p>
@@ -5499,7 +5630,7 @@
           <p:cNvPr id="5" name="页脚占位符 4">
             <a:extLst>
               <a:ext uri="{FF2B5EF4-FFF2-40B4-BE49-F238E27FC236}">
-                <a16:creationId xmlns:a16="http://schemas.microsoft.com/office/drawing/2014/main" id="{A5BFC8AA-452F-402F-990D-FA2CB748FD68}"/>
+                <a16:creationId xmlns:a16="http://schemas.microsoft.com/office/drawing/2014/main" id="{4DB5B903-BC56-4CB4-B997-125412C6D332}"/>
               </a:ext>
             </a:extLst>
           </p:cNvPr>
@@ -5528,7 +5659,7 @@
           <p:cNvPr id="6" name="灯片编号占位符 5">
             <a:extLst>
               <a:ext uri="{FF2B5EF4-FFF2-40B4-BE49-F238E27FC236}">
-                <a16:creationId xmlns:a16="http://schemas.microsoft.com/office/drawing/2014/main" id="{606F7653-5700-4F92-9C5D-5FD0253A0504}"/>
+                <a16:creationId xmlns:a16="http://schemas.microsoft.com/office/drawing/2014/main" id="{52CCBD45-6171-4DC5-A2F4-197058311B09}"/>
               </a:ext>
             </a:extLst>
           </p:cNvPr>
@@ -5555,7 +5686,7 @@
     </p:spTree>
     <p:extLst>
       <p:ext uri="{BB962C8B-B14F-4D97-AF65-F5344CB8AC3E}">
-        <p14:creationId xmlns:p14="http://schemas.microsoft.com/office/powerpoint/2010/main" val="4161800283"/>
+        <p14:creationId xmlns:p14="http://schemas.microsoft.com/office/powerpoint/2010/main" val="1804080046"/>
       </p:ext>
     </p:extLst>
   </p:cSld>
@@ -5634,7 +5765,7 @@
           <a:p>
             <a:r>
               <a:rPr lang="en-US" altLang="zh-CN" dirty="0"/>
-              <a:t>Write a program to occupy as much memory as possible.</a:t>
+              <a:t>Write a program to occupy as much memory as possible. </a:t>
             </a:r>
           </a:p>
           <a:p>
@@ -5691,7 +5822,7 @@
           <a:p>
             <a:fld id="{42D6268D-2F70-4DA1-AFF2-3D6BAAA66193}" type="datetime1">
               <a:rPr lang="en-US" altLang="zh-CN" smtClean="0"/>
-              <a:t>6/17/2019</a:t>
+              <a:t>6/22/2019</a:t>
             </a:fld>
             <a:endParaRPr lang="zh-CN" altLang="en-US"/>
           </a:p>
@@ -5758,7 +5889,7 @@
     </p:spTree>
     <p:extLst>
       <p:ext uri="{BB962C8B-B14F-4D97-AF65-F5344CB8AC3E}">
-        <p14:creationId xmlns:p14="http://schemas.microsoft.com/office/powerpoint/2010/main" val="931850382"/>
+        <p14:creationId xmlns:p14="http://schemas.microsoft.com/office/powerpoint/2010/main" val="2384824084"/>
       </p:ext>
     </p:extLst>
   </p:cSld>
@@ -5888,7 +6019,7 @@
           <a:p>
             <a:fld id="{42D6268D-2F70-4DA1-AFF2-3D6BAAA66193}" type="datetime1">
               <a:rPr lang="en-US" altLang="zh-CN" smtClean="0"/>
-              <a:t>6/17/2019</a:t>
+              <a:t>6/22/2019</a:t>
             </a:fld>
             <a:endParaRPr lang="zh-CN" altLang="en-US"/>
           </a:p>
@@ -5955,7 +6086,7 @@
     </p:spTree>
     <p:extLst>
       <p:ext uri="{BB962C8B-B14F-4D97-AF65-F5344CB8AC3E}">
-        <p14:creationId xmlns:p14="http://schemas.microsoft.com/office/powerpoint/2010/main" val="2528134960"/>
+        <p14:creationId xmlns:p14="http://schemas.microsoft.com/office/powerpoint/2010/main" val="1309492929"/>
       </p:ext>
     </p:extLst>
   </p:cSld>
@@ -5987,7 +6118,7 @@
           <p:cNvPr id="2" name="标题 1">
             <a:extLst>
               <a:ext uri="{FF2B5EF4-FFF2-40B4-BE49-F238E27FC236}">
-                <a16:creationId xmlns:a16="http://schemas.microsoft.com/office/drawing/2014/main" id="{ABFCB2C7-B657-48F2-B974-1D6637E55025}"/>
+                <a16:creationId xmlns:a16="http://schemas.microsoft.com/office/drawing/2014/main" id="{C644893F-6ABB-4C4B-B75A-EB62E7D49864}"/>
               </a:ext>
             </a:extLst>
           </p:cNvPr>
@@ -6005,7 +6136,7 @@
           <a:p>
             <a:r>
               <a:rPr lang="en-US" altLang="zh-CN" dirty="0"/>
-              <a:t>Variation Trend</a:t>
+              <a:t>Trend</a:t>
             </a:r>
             <a:endParaRPr lang="zh-CN" altLang="en-US" dirty="0"/>
           </a:p>
@@ -6016,7 +6147,7 @@
           <p:cNvPr id="7" name="内容占位符 6">
             <a:extLst>
               <a:ext uri="{FF2B5EF4-FFF2-40B4-BE49-F238E27FC236}">
-                <a16:creationId xmlns:a16="http://schemas.microsoft.com/office/drawing/2014/main" id="{87949D2D-5BA2-411C-8C56-FC937449BA9A}"/>
+                <a16:creationId xmlns:a16="http://schemas.microsoft.com/office/drawing/2014/main" id="{21D6DE61-A1E6-4B65-8F39-19F62F4856E2}"/>
               </a:ext>
             </a:extLst>
           </p:cNvPr>
@@ -6035,8 +6166,8 @@
         </p:blipFill>
         <p:spPr>
           <a:xfrm>
-            <a:off x="1339438" y="1895673"/>
-            <a:ext cx="6509574" cy="3923904"/>
+            <a:off x="1408381" y="1937231"/>
+            <a:ext cx="6371688" cy="3840788"/>
           </a:xfrm>
           <a:prstGeom prst="rect">
             <a:avLst/>
@@ -6048,7 +6179,7 @@
           <p:cNvPr id="4" name="日期占位符 3">
             <a:extLst>
               <a:ext uri="{FF2B5EF4-FFF2-40B4-BE49-F238E27FC236}">
-                <a16:creationId xmlns:a16="http://schemas.microsoft.com/office/drawing/2014/main" id="{7DBEBB1A-A13C-4A99-B84F-3BFF1C184075}"/>
+                <a16:creationId xmlns:a16="http://schemas.microsoft.com/office/drawing/2014/main" id="{5F871E21-49E0-4BE4-823E-5EFAF24B3757}"/>
               </a:ext>
             </a:extLst>
           </p:cNvPr>
@@ -6066,7 +6197,7 @@
           <a:p>
             <a:fld id="{42D6268D-2F70-4DA1-AFF2-3D6BAAA66193}" type="datetime1">
               <a:rPr lang="en-US" altLang="zh-CN" smtClean="0"/>
-              <a:t>6/17/2019</a:t>
+              <a:t>6/22/2019</a:t>
             </a:fld>
             <a:endParaRPr lang="zh-CN" altLang="en-US"/>
           </a:p>
@@ -6077,7 +6208,7 @@
           <p:cNvPr id="5" name="页脚占位符 4">
             <a:extLst>
               <a:ext uri="{FF2B5EF4-FFF2-40B4-BE49-F238E27FC236}">
-                <a16:creationId xmlns:a16="http://schemas.microsoft.com/office/drawing/2014/main" id="{0DB98F8F-2085-4800-A0B4-5C3BD3244A33}"/>
+                <a16:creationId xmlns:a16="http://schemas.microsoft.com/office/drawing/2014/main" id="{C309EF00-4A90-4C16-9EA4-34B2BF54C2BB}"/>
               </a:ext>
             </a:extLst>
           </p:cNvPr>
@@ -6106,7 +6237,7 @@
           <p:cNvPr id="6" name="灯片编号占位符 5">
             <a:extLst>
               <a:ext uri="{FF2B5EF4-FFF2-40B4-BE49-F238E27FC236}">
-                <a16:creationId xmlns:a16="http://schemas.microsoft.com/office/drawing/2014/main" id="{8CD4A7FA-C44D-492C-B494-5B36B5B09136}"/>
+                <a16:creationId xmlns:a16="http://schemas.microsoft.com/office/drawing/2014/main" id="{D58BFBC4-D88D-47A8-A131-49E573EBA35D}"/>
               </a:ext>
             </a:extLst>
           </p:cNvPr>
@@ -6133,7 +6264,7 @@
     </p:spTree>
     <p:extLst>
       <p:ext uri="{BB962C8B-B14F-4D97-AF65-F5344CB8AC3E}">
-        <p14:creationId xmlns:p14="http://schemas.microsoft.com/office/powerpoint/2010/main" val="4030264939"/>
+        <p14:creationId xmlns:p14="http://schemas.microsoft.com/office/powerpoint/2010/main" val="4243911899"/>
       </p:ext>
     </p:extLst>
   </p:cSld>
@@ -6183,7 +6314,7 @@
           <a:p>
             <a:r>
               <a:rPr lang="en-US" altLang="zh-CN" dirty="0"/>
-              <a:t>Variation Trend</a:t>
+              <a:t>Trend</a:t>
             </a:r>
             <a:endParaRPr lang="zh-CN" altLang="en-US" dirty="0"/>
           </a:p>
@@ -6205,9 +6336,2227 @@
             <p:ph idx="1"/>
             <p:extLst>
               <p:ext uri="{D42A27DB-BD31-4B8C-83A1-F6EECF244321}">
-                <p14:modId xmlns:p14="http://schemas.microsoft.com/office/powerpoint/2010/main" val="536878443"/>
+                <p14:modId xmlns:p14="http://schemas.microsoft.com/office/powerpoint/2010/main" val="2506266306"/>
               </p:ext>
             </p:extLst>
+          </p:nvPr>
+        </p:nvGraphicFramePr>
+        <p:xfrm>
+          <a:off x="822325" y="1846263"/>
+          <a:ext cx="7543800" cy="2291080"/>
+        </p:xfrm>
+        <a:graphic>
+          <a:graphicData uri="http://schemas.openxmlformats.org/drawingml/2006/table">
+            <a:tbl>
+              <a:tblPr firstRow="1" bandRow="1">
+                <a:tableStyleId>{5C22544A-7EE6-4342-B048-85BDC9FD1C3A}</a:tableStyleId>
+              </a:tblPr>
+              <a:tblGrid>
+                <a:gridCol w="952105">
+                  <a:extLst>
+                    <a:ext uri="{9D8B030D-6E8A-4147-A177-3AD203B41FA5}">
+                      <a16:colId xmlns:a16="http://schemas.microsoft.com/office/drawing/2014/main" val="3205159389"/>
+                    </a:ext>
+                  </a:extLst>
+                </a:gridCol>
+                <a:gridCol w="3578517">
+                  <a:extLst>
+                    <a:ext uri="{9D8B030D-6E8A-4147-A177-3AD203B41FA5}">
+                      <a16:colId xmlns:a16="http://schemas.microsoft.com/office/drawing/2014/main" val="1785849134"/>
+                    </a:ext>
+                  </a:extLst>
+                </a:gridCol>
+                <a:gridCol w="3013178">
+                  <a:extLst>
+                    <a:ext uri="{9D8B030D-6E8A-4147-A177-3AD203B41FA5}">
+                      <a16:colId xmlns:a16="http://schemas.microsoft.com/office/drawing/2014/main" val="2738868105"/>
+                    </a:ext>
+                  </a:extLst>
+                </a:gridCol>
+              </a:tblGrid>
+              <a:tr h="370840">
+                <a:tc>
+                  <a:txBody>
+                    <a:bodyPr/>
+                    <a:lstStyle/>
+                    <a:p>
+                      <a:r>
+                        <a:rPr lang="en-US" altLang="zh-CN" dirty="0"/>
+                        <a:t>Time</a:t>
+                      </a:r>
+                      <a:endParaRPr lang="zh-CN" altLang="en-US" dirty="0"/>
+                    </a:p>
+                  </a:txBody>
+                  <a:tcPr/>
+                </a:tc>
+                <a:tc>
+                  <a:txBody>
+                    <a:bodyPr/>
+                    <a:lstStyle/>
+                    <a:p>
+                      <a:r>
+                        <a:rPr lang="en-US" altLang="zh-CN" dirty="0"/>
+                        <a:t>Trend</a:t>
+                      </a:r>
+                      <a:endParaRPr lang="zh-CN" altLang="en-US" dirty="0"/>
+                    </a:p>
+                  </a:txBody>
+                  <a:tcPr/>
+                </a:tc>
+                <a:tc>
+                  <a:txBody>
+                    <a:bodyPr/>
+                    <a:lstStyle/>
+                    <a:p>
+                      <a:r>
+                        <a:rPr lang="en-US" altLang="zh-CN" dirty="0"/>
+                        <a:t>Explanation</a:t>
+                      </a:r>
+                      <a:endParaRPr lang="zh-CN" altLang="en-US" dirty="0"/>
+                    </a:p>
+                  </a:txBody>
+                  <a:tcPr/>
+                </a:tc>
+                <a:extLst>
+                  <a:ext uri="{0D108BD9-81ED-4DB2-BD59-A6C34878D82A}">
+                    <a16:rowId xmlns:a16="http://schemas.microsoft.com/office/drawing/2014/main" val="888649267"/>
+                  </a:ext>
+                </a:extLst>
+              </a:tr>
+              <a:tr h="370840">
+                <a:tc>
+                  <a:txBody>
+                    <a:bodyPr/>
+                    <a:lstStyle/>
+                    <a:p>
+                      <a:r>
+                        <a:rPr lang="en-US" altLang="zh-CN" dirty="0"/>
+                        <a:t>1-6s</a:t>
+                      </a:r>
+                      <a:endParaRPr lang="zh-CN" altLang="en-US" dirty="0"/>
+                    </a:p>
+                  </a:txBody>
+                  <a:tcPr/>
+                </a:tc>
+                <a:tc>
+                  <a:txBody>
+                    <a:bodyPr/>
+                    <a:lstStyle/>
+                    <a:p>
+                      <a:r>
+                        <a:rPr lang="en-US" altLang="zh-CN" dirty="0"/>
+                        <a:t>Active list continues to grow.</a:t>
+                      </a:r>
+                    </a:p>
+                    <a:p>
+                      <a:r>
+                        <a:rPr lang="en-US" altLang="zh-CN" dirty="0"/>
+                        <a:t>Inactive list remains.</a:t>
+                      </a:r>
+                      <a:endParaRPr lang="zh-CN" altLang="en-US" dirty="0"/>
+                    </a:p>
+                  </a:txBody>
+                  <a:tcPr/>
+                </a:tc>
+                <a:tc>
+                  <a:txBody>
+                    <a:bodyPr/>
+                    <a:lstStyle/>
+                    <a:p>
+                      <a:r>
+                        <a:rPr lang="en-US" altLang="zh-CN" dirty="0"/>
+                        <a:t>Once a page is accessed, it is marked active.</a:t>
+                      </a:r>
+                      <a:endParaRPr lang="zh-CN" altLang="en-US" dirty="0"/>
+                    </a:p>
+                  </a:txBody>
+                  <a:tcPr/>
+                </a:tc>
+                <a:extLst>
+                  <a:ext uri="{0D108BD9-81ED-4DB2-BD59-A6C34878D82A}">
+                    <a16:rowId xmlns:a16="http://schemas.microsoft.com/office/drawing/2014/main" val="680336099"/>
+                  </a:ext>
+                </a:extLst>
+              </a:tr>
+              <a:tr h="370840">
+                <a:tc>
+                  <a:txBody>
+                    <a:bodyPr/>
+                    <a:lstStyle/>
+                    <a:p>
+                      <a:r>
+                        <a:rPr lang="en-US" altLang="zh-CN" dirty="0"/>
+                        <a:t>6-10s</a:t>
+                      </a:r>
+                      <a:endParaRPr lang="zh-CN" altLang="en-US" dirty="0"/>
+                    </a:p>
+                  </a:txBody>
+                  <a:tcPr/>
+                </a:tc>
+                <a:tc>
+                  <a:txBody>
+                    <a:bodyPr/>
+                    <a:lstStyle/>
+                    <a:p>
+                      <a:r>
+                        <a:rPr lang="en-US" altLang="zh-CN" dirty="0"/>
+                        <a:t>Active list grows more slowly.</a:t>
+                      </a:r>
+                    </a:p>
+                    <a:p>
+                      <a:r>
+                        <a:rPr lang="en-US" altLang="zh-CN" dirty="0"/>
+                        <a:t>Inactive list begins to shrink.</a:t>
+                      </a:r>
+                      <a:endParaRPr lang="zh-CN" altLang="en-US" dirty="0"/>
+                    </a:p>
+                  </a:txBody>
+                  <a:tcPr/>
+                </a:tc>
+                <a:tc>
+                  <a:txBody>
+                    <a:bodyPr/>
+                    <a:lstStyle/>
+                    <a:p>
+                      <a:r>
+                        <a:rPr lang="en-US" altLang="zh-CN" dirty="0"/>
+                        <a:t>Some pages are reused.</a:t>
+                      </a:r>
+                      <a:endParaRPr lang="zh-CN" altLang="en-US" dirty="0"/>
+                    </a:p>
+                  </a:txBody>
+                  <a:tcPr/>
+                </a:tc>
+                <a:extLst>
+                  <a:ext uri="{0D108BD9-81ED-4DB2-BD59-A6C34878D82A}">
+                    <a16:rowId xmlns:a16="http://schemas.microsoft.com/office/drawing/2014/main" val="346206708"/>
+                  </a:ext>
+                </a:extLst>
+              </a:tr>
+              <a:tr h="370840">
+                <a:tc>
+                  <a:txBody>
+                    <a:bodyPr/>
+                    <a:lstStyle/>
+                    <a:p>
+                      <a:r>
+                        <a:rPr lang="en-US" altLang="zh-CN" dirty="0"/>
+                        <a:t>10-11s</a:t>
+                      </a:r>
+                      <a:endParaRPr lang="zh-CN" altLang="en-US" dirty="0"/>
+                    </a:p>
+                  </a:txBody>
+                  <a:tcPr/>
+                </a:tc>
+                <a:tc>
+                  <a:txBody>
+                    <a:bodyPr/>
+                    <a:lstStyle/>
+                    <a:p>
+                      <a:r>
+                        <a:rPr lang="en-US" altLang="zh-CN" dirty="0"/>
+                        <a:t>Active list drops dramatically.</a:t>
+                      </a:r>
+                      <a:endParaRPr lang="zh-CN" altLang="en-US" dirty="0"/>
+                    </a:p>
+                  </a:txBody>
+                  <a:tcPr/>
+                </a:tc>
+                <a:tc>
+                  <a:txBody>
+                    <a:bodyPr/>
+                    <a:lstStyle/>
+                    <a:p>
+                      <a:r>
+                        <a:rPr lang="en-US" altLang="zh-CN" dirty="0"/>
+                        <a:t>Some processes, including the test program, are killed.</a:t>
+                      </a:r>
+                      <a:endParaRPr lang="zh-CN" altLang="en-US" dirty="0"/>
+                    </a:p>
+                  </a:txBody>
+                  <a:tcPr/>
+                </a:tc>
+                <a:extLst>
+                  <a:ext uri="{0D108BD9-81ED-4DB2-BD59-A6C34878D82A}">
+                    <a16:rowId xmlns:a16="http://schemas.microsoft.com/office/drawing/2014/main" val="2450932889"/>
+                  </a:ext>
+                </a:extLst>
+              </a:tr>
+            </a:tbl>
+          </a:graphicData>
+        </a:graphic>
+      </p:graphicFrame>
+      <p:sp>
+        <p:nvSpPr>
+          <p:cNvPr id="4" name="日期占位符 3">
+            <a:extLst>
+              <a:ext uri="{FF2B5EF4-FFF2-40B4-BE49-F238E27FC236}">
+                <a16:creationId xmlns:a16="http://schemas.microsoft.com/office/drawing/2014/main" id="{C593CC18-0334-4771-BEE1-7F1CD53A2FF6}"/>
+              </a:ext>
+            </a:extLst>
+          </p:cNvPr>
+          <p:cNvSpPr>
+            <a:spLocks noGrp="1"/>
+          </p:cNvSpPr>
+          <p:nvPr>
+            <p:ph type="dt" sz="half" idx="10"/>
+          </p:nvPr>
+        </p:nvSpPr>
+        <p:spPr/>
+        <p:txBody>
+          <a:bodyPr/>
+          <a:lstStyle/>
+          <a:p>
+            <a:fld id="{42D6268D-2F70-4DA1-AFF2-3D6BAAA66193}" type="datetime1">
+              <a:rPr lang="en-US" altLang="zh-CN" smtClean="0"/>
+              <a:t>6/22/2019</a:t>
+            </a:fld>
+            <a:endParaRPr lang="zh-CN" altLang="en-US"/>
+          </a:p>
+        </p:txBody>
+      </p:sp>
+      <p:sp>
+        <p:nvSpPr>
+          <p:cNvPr id="5" name="页脚占位符 4">
+            <a:extLst>
+              <a:ext uri="{FF2B5EF4-FFF2-40B4-BE49-F238E27FC236}">
+                <a16:creationId xmlns:a16="http://schemas.microsoft.com/office/drawing/2014/main" id="{1704FCAE-99D3-44FC-B499-5C2F6A5508DD}"/>
+              </a:ext>
+            </a:extLst>
+          </p:cNvPr>
+          <p:cNvSpPr>
+            <a:spLocks noGrp="1"/>
+          </p:cNvSpPr>
+          <p:nvPr>
+            <p:ph type="ftr" sz="quarter" idx="11"/>
+          </p:nvPr>
+        </p:nvSpPr>
+        <p:spPr/>
+        <p:txBody>
+          <a:bodyPr/>
+          <a:lstStyle/>
+          <a:p>
+            <a:r>
+              <a:rPr lang="en-US" altLang="zh-CN"/>
+              <a:t>Operating System Project 2</a:t>
+            </a:r>
+            <a:endParaRPr lang="zh-CN" altLang="en-US"/>
+          </a:p>
+        </p:txBody>
+      </p:sp>
+      <p:sp>
+        <p:nvSpPr>
+          <p:cNvPr id="6" name="灯片编号占位符 5">
+            <a:extLst>
+              <a:ext uri="{FF2B5EF4-FFF2-40B4-BE49-F238E27FC236}">
+                <a16:creationId xmlns:a16="http://schemas.microsoft.com/office/drawing/2014/main" id="{1C03D796-0484-4E56-8E0B-B3BD48C537AF}"/>
+              </a:ext>
+            </a:extLst>
+          </p:cNvPr>
+          <p:cNvSpPr>
+            <a:spLocks noGrp="1"/>
+          </p:cNvSpPr>
+          <p:nvPr>
+            <p:ph type="sldNum" sz="quarter" idx="12"/>
+          </p:nvPr>
+        </p:nvSpPr>
+        <p:spPr/>
+        <p:txBody>
+          <a:bodyPr/>
+          <a:lstStyle/>
+          <a:p>
+            <a:fld id="{E65E0886-761E-4D32-A99C-70DCDA1CCD06}" type="slidenum">
+              <a:rPr lang="zh-CN" altLang="en-US" smtClean="0"/>
+              <a:t>17</a:t>
+            </a:fld>
+            <a:endParaRPr lang="zh-CN" altLang="en-US"/>
+          </a:p>
+        </p:txBody>
+      </p:sp>
+    </p:spTree>
+    <p:extLst>
+      <p:ext uri="{BB962C8B-B14F-4D97-AF65-F5344CB8AC3E}">
+        <p14:creationId xmlns:p14="http://schemas.microsoft.com/office/powerpoint/2010/main" val="1053704563"/>
+      </p:ext>
+    </p:extLst>
+  </p:cSld>
+  <p:clrMapOvr>
+    <a:masterClrMapping/>
+  </p:clrMapOvr>
+</p:sld>
+</file>
+
+<file path=ppt/slides/slide18.xml><?xml version="1.0" encoding="utf-8"?>
+<p:sld xmlns:a="http://schemas.openxmlformats.org/drawingml/2006/main" xmlns:r="http://schemas.openxmlformats.org/officeDocument/2006/relationships" xmlns:p="http://schemas.openxmlformats.org/presentationml/2006/main">
+  <p:cSld>
+    <p:spTree>
+      <p:nvGrpSpPr>
+        <p:cNvPr id="1" name=""/>
+        <p:cNvGrpSpPr/>
+        <p:nvPr/>
+      </p:nvGrpSpPr>
+      <p:grpSpPr>
+        <a:xfrm>
+          <a:off x="0" y="0"/>
+          <a:ext cx="0" cy="0"/>
+          <a:chOff x="0" y="0"/>
+          <a:chExt cx="0" cy="0"/>
+        </a:xfrm>
+      </p:grpSpPr>
+      <mc:AlternateContent xmlns:mc="http://schemas.openxmlformats.org/markup-compatibility/2006">
+        <mc:Choice xmlns:a14="http://schemas.microsoft.com/office/drawing/2010/main" Requires="a14">
+          <p:sp>
+            <p:nvSpPr>
+              <p:cNvPr id="2" name="标题 1">
+                <a:extLst>
+                  <a:ext uri="{FF2B5EF4-FFF2-40B4-BE49-F238E27FC236}">
+                    <a16:creationId xmlns:a16="http://schemas.microsoft.com/office/drawing/2014/main" id="{2B19A9A8-C167-4544-83F4-04095369662C}"/>
+                  </a:ext>
+                </a:extLst>
+              </p:cNvPr>
+              <p:cNvSpPr>
+                <a:spLocks noGrp="1"/>
+              </p:cNvSpPr>
+              <p:nvPr>
+                <p:ph type="title"/>
+              </p:nvPr>
+            </p:nvSpPr>
+            <p:spPr/>
+            <p:txBody>
+              <a:bodyPr/>
+              <a:lstStyle/>
+              <a:p>
+                <a:r>
+                  <a:rPr lang="en-US" altLang="zh-CN" dirty="0"/>
+                  <a:t>The Impact of </a:t>
+                </a:r>
+                <a14:m>
+                  <m:oMath xmlns:m="http://schemas.openxmlformats.org/officeDocument/2006/math">
+                    <m:r>
+                      <a:rPr lang="en-US" altLang="zh-CN" b="1" i="1" smtClean="0">
+                        <a:latin typeface="Cambria Math" panose="02040503050406030204" pitchFamily="18" charset="0"/>
+                      </a:rPr>
+                      <m:t>𝑶</m:t>
+                    </m:r>
+                    <m:r>
+                      <a:rPr lang="en-US" altLang="zh-CN" b="1" i="1" smtClean="0">
+                        <a:latin typeface="Cambria Math" panose="02040503050406030204" pitchFamily="18" charset="0"/>
+                      </a:rPr>
+                      <m:t>−</m:t>
+                    </m:r>
+                    <m:r>
+                      <a:rPr lang="en-US" altLang="zh-CN" b="1" i="1" smtClean="0">
+                        <a:latin typeface="Cambria Math" panose="02040503050406030204" pitchFamily="18" charset="0"/>
+                      </a:rPr>
+                      <m:t>𝑻</m:t>
+                    </m:r>
+                  </m:oMath>
+                </a14:m>
+                <a:endParaRPr lang="zh-CN" altLang="en-US" dirty="0"/>
+              </a:p>
+            </p:txBody>
+          </p:sp>
+        </mc:Choice>
+        <mc:Fallback>
+          <p:sp>
+            <p:nvSpPr>
+              <p:cNvPr id="2" name="标题 1">
+                <a:extLst>
+                  <a:ext uri="{FF2B5EF4-FFF2-40B4-BE49-F238E27FC236}">
+                    <a16:creationId xmlns:a16="http://schemas.microsoft.com/office/drawing/2014/main" id="{2B19A9A8-C167-4544-83F4-04095369662C}"/>
+                  </a:ext>
+                </a:extLst>
+              </p:cNvPr>
+              <p:cNvSpPr>
+                <a:spLocks noGrp="1" noRot="1" noChangeAspect="1" noMove="1" noResize="1" noEditPoints="1" noAdjustHandles="1" noChangeArrowheads="1" noChangeShapeType="1" noTextEdit="1"/>
+              </p:cNvSpPr>
+              <p:nvPr>
+                <p:ph type="title"/>
+              </p:nvPr>
+            </p:nvSpPr>
+            <p:spPr>
+              <a:blipFill>
+                <a:blip r:embed="rId2"/>
+                <a:stretch>
+                  <a:fillRect l="-2827" b="-17647"/>
+                </a:stretch>
+              </a:blipFill>
+            </p:spPr>
+            <p:txBody>
+              <a:bodyPr/>
+              <a:lstStyle/>
+              <a:p>
+                <a:r>
+                  <a:rPr lang="zh-CN" altLang="en-US">
+                    <a:noFill/>
+                  </a:rPr>
+                  <a:t> </a:t>
+                </a:r>
+              </a:p>
+            </p:txBody>
+          </p:sp>
+        </mc:Fallback>
+      </mc:AlternateContent>
+      <p:sp>
+        <p:nvSpPr>
+          <p:cNvPr id="4" name="日期占位符 3">
+            <a:extLst>
+              <a:ext uri="{FF2B5EF4-FFF2-40B4-BE49-F238E27FC236}">
+                <a16:creationId xmlns:a16="http://schemas.microsoft.com/office/drawing/2014/main" id="{D7CD1E51-D68F-4831-B78F-2FDAD14E0ABC}"/>
+              </a:ext>
+            </a:extLst>
+          </p:cNvPr>
+          <p:cNvSpPr>
+            <a:spLocks noGrp="1"/>
+          </p:cNvSpPr>
+          <p:nvPr>
+            <p:ph type="dt" sz="half" idx="10"/>
+          </p:nvPr>
+        </p:nvSpPr>
+        <p:spPr/>
+        <p:txBody>
+          <a:bodyPr/>
+          <a:lstStyle/>
+          <a:p>
+            <a:fld id="{42D6268D-2F70-4DA1-AFF2-3D6BAAA66193}" type="datetime1">
+              <a:rPr lang="en-US" altLang="zh-CN" smtClean="0"/>
+              <a:t>6/22/2019</a:t>
+            </a:fld>
+            <a:endParaRPr lang="zh-CN" altLang="en-US"/>
+          </a:p>
+        </p:txBody>
+      </p:sp>
+      <p:sp>
+        <p:nvSpPr>
+          <p:cNvPr id="5" name="页脚占位符 4">
+            <a:extLst>
+              <a:ext uri="{FF2B5EF4-FFF2-40B4-BE49-F238E27FC236}">
+                <a16:creationId xmlns:a16="http://schemas.microsoft.com/office/drawing/2014/main" id="{F43CC615-2F05-4A7E-874C-CD36D373CADB}"/>
+              </a:ext>
+            </a:extLst>
+          </p:cNvPr>
+          <p:cNvSpPr>
+            <a:spLocks noGrp="1"/>
+          </p:cNvSpPr>
+          <p:nvPr>
+            <p:ph type="ftr" sz="quarter" idx="11"/>
+          </p:nvPr>
+        </p:nvSpPr>
+        <p:spPr/>
+        <p:txBody>
+          <a:bodyPr/>
+          <a:lstStyle/>
+          <a:p>
+            <a:r>
+              <a:rPr lang="en-US" altLang="zh-CN"/>
+              <a:t>Operating System Project 2</a:t>
+            </a:r>
+            <a:endParaRPr lang="zh-CN" altLang="en-US"/>
+          </a:p>
+        </p:txBody>
+      </p:sp>
+      <p:sp>
+        <p:nvSpPr>
+          <p:cNvPr id="6" name="灯片编号占位符 5">
+            <a:extLst>
+              <a:ext uri="{FF2B5EF4-FFF2-40B4-BE49-F238E27FC236}">
+                <a16:creationId xmlns:a16="http://schemas.microsoft.com/office/drawing/2014/main" id="{5B110A5F-2600-426E-A955-0DA62919BF9B}"/>
+              </a:ext>
+            </a:extLst>
+          </p:cNvPr>
+          <p:cNvSpPr>
+            <a:spLocks noGrp="1"/>
+          </p:cNvSpPr>
+          <p:nvPr>
+            <p:ph type="sldNum" sz="quarter" idx="12"/>
+          </p:nvPr>
+        </p:nvSpPr>
+        <p:spPr/>
+        <p:txBody>
+          <a:bodyPr/>
+          <a:lstStyle/>
+          <a:p>
+            <a:fld id="{E65E0886-761E-4D32-A99C-70DCDA1CCD06}" type="slidenum">
+              <a:rPr lang="zh-CN" altLang="en-US" smtClean="0"/>
+              <a:t>18</a:t>
+            </a:fld>
+            <a:endParaRPr lang="zh-CN" altLang="en-US"/>
+          </a:p>
+        </p:txBody>
+      </p:sp>
+      <p:pic>
+        <p:nvPicPr>
+          <p:cNvPr id="11" name="内容占位符 10">
+            <a:extLst>
+              <a:ext uri="{FF2B5EF4-FFF2-40B4-BE49-F238E27FC236}">
+                <a16:creationId xmlns:a16="http://schemas.microsoft.com/office/drawing/2014/main" id="{4BCE1057-CB8D-494F-BE1D-4A4FC88E2AA8}"/>
+              </a:ext>
+            </a:extLst>
+          </p:cNvPr>
+          <p:cNvPicPr>
+            <a:picLocks noGrp="1" noChangeAspect="1"/>
+          </p:cNvPicPr>
+          <p:nvPr>
+            <p:ph idx="1"/>
+          </p:nvPr>
+        </p:nvPicPr>
+        <p:blipFill>
+          <a:blip r:embed="rId3"/>
+          <a:stretch>
+            <a:fillRect/>
+          </a:stretch>
+        </p:blipFill>
+        <p:spPr>
+          <a:xfrm>
+            <a:off x="1400181" y="1932288"/>
+            <a:ext cx="6388088" cy="3850674"/>
+          </a:xfrm>
+          <a:prstGeom prst="rect">
+            <a:avLst/>
+          </a:prstGeom>
+        </p:spPr>
+      </p:pic>
+    </p:spTree>
+    <p:extLst>
+      <p:ext uri="{BB962C8B-B14F-4D97-AF65-F5344CB8AC3E}">
+        <p14:creationId xmlns:p14="http://schemas.microsoft.com/office/powerpoint/2010/main" val="735907006"/>
+      </p:ext>
+    </p:extLst>
+  </p:cSld>
+  <p:clrMapOvr>
+    <a:masterClrMapping/>
+  </p:clrMapOvr>
+</p:sld>
+</file>
+
+<file path=ppt/slides/slide19.xml><?xml version="1.0" encoding="utf-8"?>
+<p:sld xmlns:a="http://schemas.openxmlformats.org/drawingml/2006/main" xmlns:r="http://schemas.openxmlformats.org/officeDocument/2006/relationships" xmlns:p="http://schemas.openxmlformats.org/presentationml/2006/main">
+  <p:cSld>
+    <p:spTree>
+      <p:nvGrpSpPr>
+        <p:cNvPr id="1" name=""/>
+        <p:cNvGrpSpPr/>
+        <p:nvPr/>
+      </p:nvGrpSpPr>
+      <p:grpSpPr>
+        <a:xfrm>
+          <a:off x="0" y="0"/>
+          <a:ext cx="0" cy="0"/>
+          <a:chOff x="0" y="0"/>
+          <a:chExt cx="0" cy="0"/>
+        </a:xfrm>
+      </p:grpSpPr>
+      <mc:AlternateContent xmlns:mc="http://schemas.openxmlformats.org/markup-compatibility/2006">
+        <mc:Choice xmlns:a14="http://schemas.microsoft.com/office/drawing/2010/main" Requires="a14">
+          <p:sp>
+            <p:nvSpPr>
+              <p:cNvPr id="2" name="标题 1">
+                <a:extLst>
+                  <a:ext uri="{FF2B5EF4-FFF2-40B4-BE49-F238E27FC236}">
+                    <a16:creationId xmlns:a16="http://schemas.microsoft.com/office/drawing/2014/main" id="{29023051-768B-4B64-873E-E7B2F55B38EF}"/>
+                  </a:ext>
+                </a:extLst>
+              </p:cNvPr>
+              <p:cNvSpPr>
+                <a:spLocks noGrp="1"/>
+              </p:cNvSpPr>
+              <p:nvPr>
+                <p:ph type="title"/>
+              </p:nvPr>
+            </p:nvSpPr>
+            <p:spPr/>
+            <p:txBody>
+              <a:bodyPr/>
+              <a:lstStyle/>
+              <a:p>
+                <a:r>
+                  <a:rPr lang="en-US" altLang="zh-CN" dirty="0"/>
+                  <a:t>The Impact of </a:t>
+                </a:r>
+                <a14:m>
+                  <m:oMath xmlns:m="http://schemas.openxmlformats.org/officeDocument/2006/math">
+                    <m:r>
+                      <a:rPr lang="en-US" altLang="zh-CN" i="1">
+                        <a:latin typeface="Cambria Math" panose="02040503050406030204" pitchFamily="18" charset="0"/>
+                      </a:rPr>
+                      <m:t>𝑶</m:t>
+                    </m:r>
+                    <m:r>
+                      <a:rPr lang="en-US" altLang="zh-CN" i="1">
+                        <a:latin typeface="Cambria Math" panose="02040503050406030204" pitchFamily="18" charset="0"/>
+                      </a:rPr>
+                      <m:t>−</m:t>
+                    </m:r>
+                    <m:r>
+                      <a:rPr lang="en-US" altLang="zh-CN" i="1">
+                        <a:latin typeface="Cambria Math" panose="02040503050406030204" pitchFamily="18" charset="0"/>
+                      </a:rPr>
+                      <m:t>𝑻</m:t>
+                    </m:r>
+                  </m:oMath>
+                </a14:m>
+                <a:endParaRPr lang="zh-CN" altLang="en-US" dirty="0"/>
+              </a:p>
+            </p:txBody>
+          </p:sp>
+        </mc:Choice>
+        <mc:Fallback>
+          <p:sp>
+            <p:nvSpPr>
+              <p:cNvPr id="2" name="标题 1">
+                <a:extLst>
+                  <a:ext uri="{FF2B5EF4-FFF2-40B4-BE49-F238E27FC236}">
+                    <a16:creationId xmlns:a16="http://schemas.microsoft.com/office/drawing/2014/main" id="{29023051-768B-4B64-873E-E7B2F55B38EF}"/>
+                  </a:ext>
+                </a:extLst>
+              </p:cNvPr>
+              <p:cNvSpPr>
+                <a:spLocks noGrp="1" noRot="1" noChangeAspect="1" noMove="1" noResize="1" noEditPoints="1" noAdjustHandles="1" noChangeArrowheads="1" noChangeShapeType="1" noTextEdit="1"/>
+              </p:cNvSpPr>
+              <p:nvPr>
+                <p:ph type="title"/>
+              </p:nvPr>
+            </p:nvSpPr>
+            <p:spPr>
+              <a:blipFill>
+                <a:blip r:embed="rId2"/>
+                <a:stretch>
+                  <a:fillRect l="-2827" b="-17647"/>
+                </a:stretch>
+              </a:blipFill>
+            </p:spPr>
+            <p:txBody>
+              <a:bodyPr/>
+              <a:lstStyle/>
+              <a:p>
+                <a:r>
+                  <a:rPr lang="zh-CN" altLang="en-US">
+                    <a:noFill/>
+                  </a:rPr>
+                  <a:t> </a:t>
+                </a:r>
+              </a:p>
+            </p:txBody>
+          </p:sp>
+        </mc:Fallback>
+      </mc:AlternateContent>
+      <p:sp>
+        <p:nvSpPr>
+          <p:cNvPr id="4" name="日期占位符 3">
+            <a:extLst>
+              <a:ext uri="{FF2B5EF4-FFF2-40B4-BE49-F238E27FC236}">
+                <a16:creationId xmlns:a16="http://schemas.microsoft.com/office/drawing/2014/main" id="{C392F5A1-4E78-4B04-B63B-30B0B1D07FA2}"/>
+              </a:ext>
+            </a:extLst>
+          </p:cNvPr>
+          <p:cNvSpPr>
+            <a:spLocks noGrp="1"/>
+          </p:cNvSpPr>
+          <p:nvPr>
+            <p:ph type="dt" sz="half" idx="10"/>
+          </p:nvPr>
+        </p:nvSpPr>
+        <p:spPr/>
+        <p:txBody>
+          <a:bodyPr/>
+          <a:lstStyle/>
+          <a:p>
+            <a:fld id="{42D6268D-2F70-4DA1-AFF2-3D6BAAA66193}" type="datetime1">
+              <a:rPr lang="en-US" altLang="zh-CN" smtClean="0"/>
+              <a:t>6/22/2019</a:t>
+            </a:fld>
+            <a:endParaRPr lang="zh-CN" altLang="en-US"/>
+          </a:p>
+        </p:txBody>
+      </p:sp>
+      <p:sp>
+        <p:nvSpPr>
+          <p:cNvPr id="5" name="页脚占位符 4">
+            <a:extLst>
+              <a:ext uri="{FF2B5EF4-FFF2-40B4-BE49-F238E27FC236}">
+                <a16:creationId xmlns:a16="http://schemas.microsoft.com/office/drawing/2014/main" id="{D5E0322C-D91B-4172-8446-5B8755509481}"/>
+              </a:ext>
+            </a:extLst>
+          </p:cNvPr>
+          <p:cNvSpPr>
+            <a:spLocks noGrp="1"/>
+          </p:cNvSpPr>
+          <p:nvPr>
+            <p:ph type="ftr" sz="quarter" idx="11"/>
+          </p:nvPr>
+        </p:nvSpPr>
+        <p:spPr/>
+        <p:txBody>
+          <a:bodyPr/>
+          <a:lstStyle/>
+          <a:p>
+            <a:r>
+              <a:rPr lang="en-US" altLang="zh-CN"/>
+              <a:t>Operating System Project 2</a:t>
+            </a:r>
+            <a:endParaRPr lang="zh-CN" altLang="en-US"/>
+          </a:p>
+        </p:txBody>
+      </p:sp>
+      <p:sp>
+        <p:nvSpPr>
+          <p:cNvPr id="6" name="灯片编号占位符 5">
+            <a:extLst>
+              <a:ext uri="{FF2B5EF4-FFF2-40B4-BE49-F238E27FC236}">
+                <a16:creationId xmlns:a16="http://schemas.microsoft.com/office/drawing/2014/main" id="{D6643500-0DE1-4806-9033-E6B7406A3E14}"/>
+              </a:ext>
+            </a:extLst>
+          </p:cNvPr>
+          <p:cNvSpPr>
+            <a:spLocks noGrp="1"/>
+          </p:cNvSpPr>
+          <p:nvPr>
+            <p:ph type="sldNum" sz="quarter" idx="12"/>
+          </p:nvPr>
+        </p:nvSpPr>
+        <p:spPr/>
+        <p:txBody>
+          <a:bodyPr/>
+          <a:lstStyle/>
+          <a:p>
+            <a:fld id="{E65E0886-761E-4D32-A99C-70DCDA1CCD06}" type="slidenum">
+              <a:rPr lang="zh-CN" altLang="en-US" smtClean="0"/>
+              <a:t>19</a:t>
+            </a:fld>
+            <a:endParaRPr lang="zh-CN" altLang="en-US"/>
+          </a:p>
+        </p:txBody>
+      </p:sp>
+      <p:pic>
+        <p:nvPicPr>
+          <p:cNvPr id="11" name="内容占位符 10">
+            <a:extLst>
+              <a:ext uri="{FF2B5EF4-FFF2-40B4-BE49-F238E27FC236}">
+                <a16:creationId xmlns:a16="http://schemas.microsoft.com/office/drawing/2014/main" id="{0E65C2AE-C88A-4EA0-8889-5B9F6FEE3F15}"/>
+              </a:ext>
+            </a:extLst>
+          </p:cNvPr>
+          <p:cNvPicPr>
+            <a:picLocks noGrp="1" noChangeAspect="1"/>
+          </p:cNvPicPr>
+          <p:nvPr>
+            <p:ph idx="1"/>
+          </p:nvPr>
+        </p:nvPicPr>
+        <p:blipFill>
+          <a:blip r:embed="rId3"/>
+          <a:stretch>
+            <a:fillRect/>
+          </a:stretch>
+        </p:blipFill>
+        <p:spPr>
+          <a:xfrm>
+            <a:off x="1334582" y="1892746"/>
+            <a:ext cx="6519286" cy="3929758"/>
+          </a:xfrm>
+          <a:prstGeom prst="rect">
+            <a:avLst/>
+          </a:prstGeom>
+        </p:spPr>
+      </p:pic>
+    </p:spTree>
+    <p:extLst>
+      <p:ext uri="{BB962C8B-B14F-4D97-AF65-F5344CB8AC3E}">
+        <p14:creationId xmlns:p14="http://schemas.microsoft.com/office/powerpoint/2010/main" val="1599509584"/>
+      </p:ext>
+    </p:extLst>
+  </p:cSld>
+  <p:clrMapOvr>
+    <a:masterClrMapping/>
+  </p:clrMapOvr>
+</p:sld>
+</file>
+
+<file path=ppt/slides/slide2.xml><?xml version="1.0" encoding="utf-8"?>
+<p:sld xmlns:a="http://schemas.openxmlformats.org/drawingml/2006/main" xmlns:r="http://schemas.openxmlformats.org/officeDocument/2006/relationships" xmlns:p="http://schemas.openxmlformats.org/presentationml/2006/main">
+  <p:cSld>
+    <p:spTree>
+      <p:nvGrpSpPr>
+        <p:cNvPr id="1" name=""/>
+        <p:cNvGrpSpPr/>
+        <p:nvPr/>
+      </p:nvGrpSpPr>
+      <p:grpSpPr>
+        <a:xfrm>
+          <a:off x="0" y="0"/>
+          <a:ext cx="0" cy="0"/>
+          <a:chOff x="0" y="0"/>
+          <a:chExt cx="0" cy="0"/>
+        </a:xfrm>
+      </p:grpSpPr>
+      <p:sp>
+        <p:nvSpPr>
+          <p:cNvPr id="2" name="标题 1">
+            <a:extLst>
+              <a:ext uri="{FF2B5EF4-FFF2-40B4-BE49-F238E27FC236}">
+                <a16:creationId xmlns:a16="http://schemas.microsoft.com/office/drawing/2014/main" id="{A5224E57-381B-4273-AF46-D6CA7C0D02F9}"/>
+              </a:ext>
+            </a:extLst>
+          </p:cNvPr>
+          <p:cNvSpPr>
+            <a:spLocks noGrp="1"/>
+          </p:cNvSpPr>
+          <p:nvPr>
+            <p:ph type="title"/>
+          </p:nvPr>
+        </p:nvSpPr>
+        <p:spPr/>
+        <p:txBody>
+          <a:bodyPr/>
+          <a:lstStyle/>
+          <a:p>
+            <a:r>
+              <a:rPr lang="en-US" altLang="zh-CN" dirty="0"/>
+              <a:t>Overview</a:t>
+            </a:r>
+            <a:endParaRPr lang="zh-CN" altLang="en-US" dirty="0"/>
+          </a:p>
+        </p:txBody>
+      </p:sp>
+      <p:sp>
+        <p:nvSpPr>
+          <p:cNvPr id="3" name="内容占位符 2">
+            <a:extLst>
+              <a:ext uri="{FF2B5EF4-FFF2-40B4-BE49-F238E27FC236}">
+                <a16:creationId xmlns:a16="http://schemas.microsoft.com/office/drawing/2014/main" id="{EF8AFBC6-9AF5-45DA-9BEC-965B19743B41}"/>
+              </a:ext>
+            </a:extLst>
+          </p:cNvPr>
+          <p:cNvSpPr>
+            <a:spLocks noGrp="1"/>
+          </p:cNvSpPr>
+          <p:nvPr>
+            <p:ph idx="1"/>
+          </p:nvPr>
+        </p:nvSpPr>
+        <p:spPr/>
+        <p:txBody>
+          <a:bodyPr anchor="ctr">
+            <a:normAutofit/>
+          </a:bodyPr>
+          <a:lstStyle/>
+          <a:p>
+            <a:pPr>
+              <a:lnSpc>
+                <a:spcPct val="150000"/>
+              </a:lnSpc>
+            </a:pPr>
+            <a:r>
+              <a:rPr lang="en-US" altLang="zh-CN" sz="3200" dirty="0">
+                <a:latin typeface="+mj-lt"/>
+              </a:rPr>
+              <a:t>Study of the Original Algorithm</a:t>
+            </a:r>
+          </a:p>
+          <a:p>
+            <a:pPr>
+              <a:lnSpc>
+                <a:spcPct val="150000"/>
+              </a:lnSpc>
+            </a:pPr>
+            <a:r>
+              <a:rPr lang="en-US" altLang="zh-CN" sz="3200" dirty="0">
+                <a:latin typeface="+mj-lt"/>
+              </a:rPr>
+              <a:t>Changing to a new LRU Algorithm</a:t>
+            </a:r>
+          </a:p>
+          <a:p>
+            <a:pPr>
+              <a:lnSpc>
+                <a:spcPct val="150000"/>
+              </a:lnSpc>
+            </a:pPr>
+            <a:r>
+              <a:rPr lang="en-US" altLang="zh-CN" sz="3200" dirty="0">
+                <a:latin typeface="+mj-lt"/>
+              </a:rPr>
+              <a:t>To an LFU-based Algorithm</a:t>
+            </a:r>
+          </a:p>
+        </p:txBody>
+      </p:sp>
+      <p:sp>
+        <p:nvSpPr>
+          <p:cNvPr id="4" name="日期占位符 3">
+            <a:extLst>
+              <a:ext uri="{FF2B5EF4-FFF2-40B4-BE49-F238E27FC236}">
+                <a16:creationId xmlns:a16="http://schemas.microsoft.com/office/drawing/2014/main" id="{4AA283DE-7A0A-45D2-A18A-5F90160FE47B}"/>
+              </a:ext>
+            </a:extLst>
+          </p:cNvPr>
+          <p:cNvSpPr>
+            <a:spLocks noGrp="1"/>
+          </p:cNvSpPr>
+          <p:nvPr>
+            <p:ph type="dt" sz="half" idx="10"/>
+          </p:nvPr>
+        </p:nvSpPr>
+        <p:spPr/>
+        <p:txBody>
+          <a:bodyPr/>
+          <a:lstStyle/>
+          <a:p>
+            <a:fld id="{67EE479D-93C0-4BC3-9EFF-C7F9791CB645}" type="datetime1">
+              <a:rPr lang="en-US" altLang="zh-CN" smtClean="0"/>
+              <a:t>6/22/2019</a:t>
+            </a:fld>
+            <a:endParaRPr lang="zh-CN" altLang="en-US"/>
+          </a:p>
+        </p:txBody>
+      </p:sp>
+      <p:sp>
+        <p:nvSpPr>
+          <p:cNvPr id="5" name="页脚占位符 4">
+            <a:extLst>
+              <a:ext uri="{FF2B5EF4-FFF2-40B4-BE49-F238E27FC236}">
+                <a16:creationId xmlns:a16="http://schemas.microsoft.com/office/drawing/2014/main" id="{20C15EC1-081F-4D97-9A10-0703682FA504}"/>
+              </a:ext>
+            </a:extLst>
+          </p:cNvPr>
+          <p:cNvSpPr>
+            <a:spLocks noGrp="1"/>
+          </p:cNvSpPr>
+          <p:nvPr>
+            <p:ph type="ftr" sz="quarter" idx="11"/>
+          </p:nvPr>
+        </p:nvSpPr>
+        <p:spPr/>
+        <p:txBody>
+          <a:bodyPr/>
+          <a:lstStyle/>
+          <a:p>
+            <a:r>
+              <a:rPr lang="en-US" altLang="zh-CN" dirty="0"/>
+              <a:t>Operating System Project 2</a:t>
+            </a:r>
+            <a:endParaRPr lang="zh-CN" altLang="en-US"/>
+          </a:p>
+        </p:txBody>
+      </p:sp>
+      <p:sp>
+        <p:nvSpPr>
+          <p:cNvPr id="6" name="灯片编号占位符 5">
+            <a:extLst>
+              <a:ext uri="{FF2B5EF4-FFF2-40B4-BE49-F238E27FC236}">
+                <a16:creationId xmlns:a16="http://schemas.microsoft.com/office/drawing/2014/main" id="{A8029765-21D5-4180-BEC3-8220CEB3B531}"/>
+              </a:ext>
+            </a:extLst>
+          </p:cNvPr>
+          <p:cNvSpPr>
+            <a:spLocks noGrp="1"/>
+          </p:cNvSpPr>
+          <p:nvPr>
+            <p:ph type="sldNum" sz="quarter" idx="12"/>
+          </p:nvPr>
+        </p:nvSpPr>
+        <p:spPr/>
+        <p:txBody>
+          <a:bodyPr/>
+          <a:lstStyle/>
+          <a:p>
+            <a:fld id="{E65E0886-761E-4D32-A99C-70DCDA1CCD06}" type="slidenum">
+              <a:rPr lang="zh-CN" altLang="en-US" smtClean="0"/>
+              <a:t>2</a:t>
+            </a:fld>
+            <a:endParaRPr lang="zh-CN" altLang="en-US"/>
+          </a:p>
+        </p:txBody>
+      </p:sp>
+    </p:spTree>
+    <p:extLst>
+      <p:ext uri="{BB962C8B-B14F-4D97-AF65-F5344CB8AC3E}">
+        <p14:creationId xmlns:p14="http://schemas.microsoft.com/office/powerpoint/2010/main" val="3337490989"/>
+      </p:ext>
+    </p:extLst>
+  </p:cSld>
+  <p:clrMapOvr>
+    <a:masterClrMapping/>
+  </p:clrMapOvr>
+</p:sld>
+</file>
+
+<file path=ppt/slides/slide20.xml><?xml version="1.0" encoding="utf-8"?>
+<p:sld xmlns:a="http://schemas.openxmlformats.org/drawingml/2006/main" xmlns:r="http://schemas.openxmlformats.org/officeDocument/2006/relationships" xmlns:p="http://schemas.openxmlformats.org/presentationml/2006/main">
+  <p:cSld>
+    <p:spTree>
+      <p:nvGrpSpPr>
+        <p:cNvPr id="1" name=""/>
+        <p:cNvGrpSpPr/>
+        <p:nvPr/>
+      </p:nvGrpSpPr>
+      <p:grpSpPr>
+        <a:xfrm>
+          <a:off x="0" y="0"/>
+          <a:ext cx="0" cy="0"/>
+          <a:chOff x="0" y="0"/>
+          <a:chExt cx="0" cy="0"/>
+        </a:xfrm>
+      </p:grpSpPr>
+      <p:sp>
+        <p:nvSpPr>
+          <p:cNvPr id="2" name="标题 1">
+            <a:extLst>
+              <a:ext uri="{FF2B5EF4-FFF2-40B4-BE49-F238E27FC236}">
+                <a16:creationId xmlns:a16="http://schemas.microsoft.com/office/drawing/2014/main" id="{12B29C12-780F-422B-BD9D-9F133BE6FB59}"/>
+              </a:ext>
+            </a:extLst>
+          </p:cNvPr>
+          <p:cNvSpPr>
+            <a:spLocks noGrp="1"/>
+          </p:cNvSpPr>
+          <p:nvPr>
+            <p:ph type="title"/>
+          </p:nvPr>
+        </p:nvSpPr>
+        <p:spPr/>
+        <p:txBody>
+          <a:bodyPr/>
+          <a:lstStyle/>
+          <a:p>
+            <a:r>
+              <a:rPr lang="en-US" altLang="zh-CN" dirty="0"/>
+              <a:t>Observation</a:t>
+            </a:r>
+            <a:endParaRPr lang="zh-CN" altLang="en-US" dirty="0"/>
+          </a:p>
+        </p:txBody>
+      </p:sp>
+      <p:sp>
+        <p:nvSpPr>
+          <p:cNvPr id="3" name="内容占位符 2">
+            <a:extLst>
+              <a:ext uri="{FF2B5EF4-FFF2-40B4-BE49-F238E27FC236}">
+                <a16:creationId xmlns:a16="http://schemas.microsoft.com/office/drawing/2014/main" id="{68BE13E5-3C7A-48F3-96B6-2FBA79FD6801}"/>
+              </a:ext>
+            </a:extLst>
+          </p:cNvPr>
+          <p:cNvSpPr>
+            <a:spLocks noGrp="1"/>
+          </p:cNvSpPr>
+          <p:nvPr>
+            <p:ph idx="1"/>
+          </p:nvPr>
+        </p:nvSpPr>
+        <p:spPr/>
+        <p:txBody>
+          <a:bodyPr/>
+          <a:lstStyle/>
+          <a:p>
+            <a:r>
+              <a:rPr lang="en-US" altLang="zh-CN" dirty="0"/>
+              <a:t>Hard to find correlation between list sizes and parameters.</a:t>
+            </a:r>
+          </a:p>
+          <a:p>
+            <a:r>
+              <a:rPr lang="en-US" altLang="zh-CN" dirty="0"/>
+              <a:t>The variation is more of hardware performance than some inherent mechanism. </a:t>
+            </a:r>
+            <a:endParaRPr lang="zh-CN" altLang="en-US" dirty="0"/>
+          </a:p>
+        </p:txBody>
+      </p:sp>
+      <p:sp>
+        <p:nvSpPr>
+          <p:cNvPr id="4" name="日期占位符 3">
+            <a:extLst>
+              <a:ext uri="{FF2B5EF4-FFF2-40B4-BE49-F238E27FC236}">
+                <a16:creationId xmlns:a16="http://schemas.microsoft.com/office/drawing/2014/main" id="{F2329202-5A43-4A8F-B519-C2834024F086}"/>
+              </a:ext>
+            </a:extLst>
+          </p:cNvPr>
+          <p:cNvSpPr>
+            <a:spLocks noGrp="1"/>
+          </p:cNvSpPr>
+          <p:nvPr>
+            <p:ph type="dt" sz="half" idx="10"/>
+          </p:nvPr>
+        </p:nvSpPr>
+        <p:spPr/>
+        <p:txBody>
+          <a:bodyPr/>
+          <a:lstStyle/>
+          <a:p>
+            <a:fld id="{42D6268D-2F70-4DA1-AFF2-3D6BAAA66193}" type="datetime1">
+              <a:rPr lang="en-US" altLang="zh-CN" smtClean="0"/>
+              <a:t>6/22/2019</a:t>
+            </a:fld>
+            <a:endParaRPr lang="zh-CN" altLang="en-US"/>
+          </a:p>
+        </p:txBody>
+      </p:sp>
+      <p:sp>
+        <p:nvSpPr>
+          <p:cNvPr id="5" name="页脚占位符 4">
+            <a:extLst>
+              <a:ext uri="{FF2B5EF4-FFF2-40B4-BE49-F238E27FC236}">
+                <a16:creationId xmlns:a16="http://schemas.microsoft.com/office/drawing/2014/main" id="{2D8AF3EE-4900-4EF8-92AC-07ED20054CF5}"/>
+              </a:ext>
+            </a:extLst>
+          </p:cNvPr>
+          <p:cNvSpPr>
+            <a:spLocks noGrp="1"/>
+          </p:cNvSpPr>
+          <p:nvPr>
+            <p:ph type="ftr" sz="quarter" idx="11"/>
+          </p:nvPr>
+        </p:nvSpPr>
+        <p:spPr/>
+        <p:txBody>
+          <a:bodyPr/>
+          <a:lstStyle/>
+          <a:p>
+            <a:r>
+              <a:rPr lang="en-US" altLang="zh-CN"/>
+              <a:t>Operating System Project 2</a:t>
+            </a:r>
+            <a:endParaRPr lang="zh-CN" altLang="en-US"/>
+          </a:p>
+        </p:txBody>
+      </p:sp>
+      <p:sp>
+        <p:nvSpPr>
+          <p:cNvPr id="6" name="灯片编号占位符 5">
+            <a:extLst>
+              <a:ext uri="{FF2B5EF4-FFF2-40B4-BE49-F238E27FC236}">
+                <a16:creationId xmlns:a16="http://schemas.microsoft.com/office/drawing/2014/main" id="{53AD24CC-0C25-4F1E-86AC-D4688D9BD9BC}"/>
+              </a:ext>
+            </a:extLst>
+          </p:cNvPr>
+          <p:cNvSpPr>
+            <a:spLocks noGrp="1"/>
+          </p:cNvSpPr>
+          <p:nvPr>
+            <p:ph type="sldNum" sz="quarter" idx="12"/>
+          </p:nvPr>
+        </p:nvSpPr>
+        <p:spPr/>
+        <p:txBody>
+          <a:bodyPr/>
+          <a:lstStyle/>
+          <a:p>
+            <a:fld id="{E65E0886-761E-4D32-A99C-70DCDA1CCD06}" type="slidenum">
+              <a:rPr lang="zh-CN" altLang="en-US" smtClean="0"/>
+              <a:t>20</a:t>
+            </a:fld>
+            <a:endParaRPr lang="zh-CN" altLang="en-US"/>
+          </a:p>
+        </p:txBody>
+      </p:sp>
+    </p:spTree>
+    <p:extLst>
+      <p:ext uri="{BB962C8B-B14F-4D97-AF65-F5344CB8AC3E}">
+        <p14:creationId xmlns:p14="http://schemas.microsoft.com/office/powerpoint/2010/main" val="3654550945"/>
+      </p:ext>
+    </p:extLst>
+  </p:cSld>
+  <p:clrMapOvr>
+    <a:masterClrMapping/>
+  </p:clrMapOvr>
+</p:sld>
+</file>
+
+<file path=ppt/slides/slide21.xml><?xml version="1.0" encoding="utf-8"?>
+<p:sld xmlns:a="http://schemas.openxmlformats.org/drawingml/2006/main" xmlns:r="http://schemas.openxmlformats.org/officeDocument/2006/relationships" xmlns:p="http://schemas.openxmlformats.org/presentationml/2006/main">
+  <p:cSld>
+    <p:spTree>
+      <p:nvGrpSpPr>
+        <p:cNvPr id="1" name=""/>
+        <p:cNvGrpSpPr/>
+        <p:nvPr/>
+      </p:nvGrpSpPr>
+      <p:grpSpPr>
+        <a:xfrm>
+          <a:off x="0" y="0"/>
+          <a:ext cx="0" cy="0"/>
+          <a:chOff x="0" y="0"/>
+          <a:chExt cx="0" cy="0"/>
+        </a:xfrm>
+      </p:grpSpPr>
+      <p:sp>
+        <p:nvSpPr>
+          <p:cNvPr id="7" name="标题 6">
+            <a:extLst>
+              <a:ext uri="{FF2B5EF4-FFF2-40B4-BE49-F238E27FC236}">
+                <a16:creationId xmlns:a16="http://schemas.microsoft.com/office/drawing/2014/main" id="{77DA6B27-A31C-49A3-998F-46654B95F93A}"/>
+              </a:ext>
+            </a:extLst>
+          </p:cNvPr>
+          <p:cNvSpPr>
+            <a:spLocks noGrp="1"/>
+          </p:cNvSpPr>
+          <p:nvPr>
+            <p:ph type="title"/>
+          </p:nvPr>
+        </p:nvSpPr>
+        <p:spPr/>
+        <p:txBody>
+          <a:bodyPr/>
+          <a:lstStyle/>
+          <a:p>
+            <a:r>
+              <a:rPr lang="en-US" altLang="zh-CN" dirty="0"/>
+              <a:t>To an LFU-Based Algorithm</a:t>
+            </a:r>
+            <a:endParaRPr lang="zh-CN" altLang="en-US" dirty="0"/>
+          </a:p>
+        </p:txBody>
+      </p:sp>
+      <p:sp>
+        <p:nvSpPr>
+          <p:cNvPr id="8" name="文本占位符 7">
+            <a:extLst>
+              <a:ext uri="{FF2B5EF4-FFF2-40B4-BE49-F238E27FC236}">
+                <a16:creationId xmlns:a16="http://schemas.microsoft.com/office/drawing/2014/main" id="{A7B254E2-9276-4FAB-A224-3E0E3DFF2181}"/>
+              </a:ext>
+            </a:extLst>
+          </p:cNvPr>
+          <p:cNvSpPr>
+            <a:spLocks noGrp="1"/>
+          </p:cNvSpPr>
+          <p:nvPr>
+            <p:ph type="body" idx="1"/>
+          </p:nvPr>
+        </p:nvSpPr>
+        <p:spPr/>
+        <p:txBody>
+          <a:bodyPr/>
+          <a:lstStyle/>
+          <a:p>
+            <a:endParaRPr lang="zh-CN" altLang="en-US" dirty="0"/>
+          </a:p>
+        </p:txBody>
+      </p:sp>
+      <p:sp>
+        <p:nvSpPr>
+          <p:cNvPr id="4" name="日期占位符 3">
+            <a:extLst>
+              <a:ext uri="{FF2B5EF4-FFF2-40B4-BE49-F238E27FC236}">
+                <a16:creationId xmlns:a16="http://schemas.microsoft.com/office/drawing/2014/main" id="{69FDAFF2-43C5-4036-A4F6-4FE193AA9E20}"/>
+              </a:ext>
+            </a:extLst>
+          </p:cNvPr>
+          <p:cNvSpPr>
+            <a:spLocks noGrp="1"/>
+          </p:cNvSpPr>
+          <p:nvPr>
+            <p:ph type="dt" sz="half" idx="10"/>
+          </p:nvPr>
+        </p:nvSpPr>
+        <p:spPr/>
+        <p:txBody>
+          <a:bodyPr/>
+          <a:lstStyle/>
+          <a:p>
+            <a:fld id="{42D6268D-2F70-4DA1-AFF2-3D6BAAA66193}" type="datetime1">
+              <a:rPr lang="en-US" altLang="zh-CN" smtClean="0"/>
+              <a:t>6/22/2019</a:t>
+            </a:fld>
+            <a:endParaRPr lang="zh-CN" altLang="en-US"/>
+          </a:p>
+        </p:txBody>
+      </p:sp>
+      <p:sp>
+        <p:nvSpPr>
+          <p:cNvPr id="5" name="页脚占位符 4">
+            <a:extLst>
+              <a:ext uri="{FF2B5EF4-FFF2-40B4-BE49-F238E27FC236}">
+                <a16:creationId xmlns:a16="http://schemas.microsoft.com/office/drawing/2014/main" id="{70CD3E0D-A2B3-4691-906A-C7060A65EB94}"/>
+              </a:ext>
+            </a:extLst>
+          </p:cNvPr>
+          <p:cNvSpPr>
+            <a:spLocks noGrp="1"/>
+          </p:cNvSpPr>
+          <p:nvPr>
+            <p:ph type="ftr" sz="quarter" idx="11"/>
+          </p:nvPr>
+        </p:nvSpPr>
+        <p:spPr/>
+        <p:txBody>
+          <a:bodyPr/>
+          <a:lstStyle/>
+          <a:p>
+            <a:r>
+              <a:rPr lang="en-US" altLang="zh-CN" dirty="0"/>
+              <a:t>Operating System Project 2</a:t>
+            </a:r>
+            <a:endParaRPr lang="zh-CN" altLang="en-US"/>
+          </a:p>
+        </p:txBody>
+      </p:sp>
+      <p:sp>
+        <p:nvSpPr>
+          <p:cNvPr id="6" name="灯片编号占位符 5">
+            <a:extLst>
+              <a:ext uri="{FF2B5EF4-FFF2-40B4-BE49-F238E27FC236}">
+                <a16:creationId xmlns:a16="http://schemas.microsoft.com/office/drawing/2014/main" id="{B877B92B-3651-4DE7-8B3B-437FF0C3EC29}"/>
+              </a:ext>
+            </a:extLst>
+          </p:cNvPr>
+          <p:cNvSpPr>
+            <a:spLocks noGrp="1"/>
+          </p:cNvSpPr>
+          <p:nvPr>
+            <p:ph type="sldNum" sz="quarter" idx="12"/>
+          </p:nvPr>
+        </p:nvSpPr>
+        <p:spPr/>
+        <p:txBody>
+          <a:bodyPr/>
+          <a:lstStyle/>
+          <a:p>
+            <a:fld id="{E65E0886-761E-4D32-A99C-70DCDA1CCD06}" type="slidenum">
+              <a:rPr lang="zh-CN" altLang="en-US" smtClean="0"/>
+              <a:t>21</a:t>
+            </a:fld>
+            <a:endParaRPr lang="zh-CN" altLang="en-US"/>
+          </a:p>
+        </p:txBody>
+      </p:sp>
+    </p:spTree>
+    <p:extLst>
+      <p:ext uri="{BB962C8B-B14F-4D97-AF65-F5344CB8AC3E}">
+        <p14:creationId xmlns:p14="http://schemas.microsoft.com/office/powerpoint/2010/main" val="53803386"/>
+      </p:ext>
+    </p:extLst>
+  </p:cSld>
+  <p:clrMapOvr>
+    <a:masterClrMapping/>
+  </p:clrMapOvr>
+</p:sld>
+</file>
+
+<file path=ppt/slides/slide22.xml><?xml version="1.0" encoding="utf-8"?>
+<p:sld xmlns:a="http://schemas.openxmlformats.org/drawingml/2006/main" xmlns:r="http://schemas.openxmlformats.org/officeDocument/2006/relationships" xmlns:p="http://schemas.openxmlformats.org/presentationml/2006/main">
+  <p:cSld>
+    <p:spTree>
+      <p:nvGrpSpPr>
+        <p:cNvPr id="1" name=""/>
+        <p:cNvGrpSpPr/>
+        <p:nvPr/>
+      </p:nvGrpSpPr>
+      <p:grpSpPr>
+        <a:xfrm>
+          <a:off x="0" y="0"/>
+          <a:ext cx="0" cy="0"/>
+          <a:chOff x="0" y="0"/>
+          <a:chExt cx="0" cy="0"/>
+        </a:xfrm>
+      </p:grpSpPr>
+      <p:sp>
+        <p:nvSpPr>
+          <p:cNvPr id="7" name="标题 6">
+            <a:extLst>
+              <a:ext uri="{FF2B5EF4-FFF2-40B4-BE49-F238E27FC236}">
+                <a16:creationId xmlns:a16="http://schemas.microsoft.com/office/drawing/2014/main" id="{E3FFF0D0-59E0-4740-8B8D-209963775323}"/>
+              </a:ext>
+            </a:extLst>
+          </p:cNvPr>
+          <p:cNvSpPr>
+            <a:spLocks noGrp="1"/>
+          </p:cNvSpPr>
+          <p:nvPr>
+            <p:ph type="title"/>
+          </p:nvPr>
+        </p:nvSpPr>
+        <p:spPr/>
+        <p:txBody>
+          <a:bodyPr/>
+          <a:lstStyle/>
+          <a:p>
+            <a:r>
+              <a:rPr lang="en-US" altLang="zh-CN" dirty="0"/>
+              <a:t>Differences from LRU</a:t>
+            </a:r>
+            <a:endParaRPr lang="zh-CN" altLang="en-US" dirty="0"/>
+          </a:p>
+        </p:txBody>
+      </p:sp>
+      <p:sp>
+        <p:nvSpPr>
+          <p:cNvPr id="4" name="日期占位符 3">
+            <a:extLst>
+              <a:ext uri="{FF2B5EF4-FFF2-40B4-BE49-F238E27FC236}">
+                <a16:creationId xmlns:a16="http://schemas.microsoft.com/office/drawing/2014/main" id="{AD27364D-967F-400B-9186-BE73F494AF12}"/>
+              </a:ext>
+            </a:extLst>
+          </p:cNvPr>
+          <p:cNvSpPr>
+            <a:spLocks noGrp="1"/>
+          </p:cNvSpPr>
+          <p:nvPr>
+            <p:ph type="dt" sz="half" idx="10"/>
+          </p:nvPr>
+        </p:nvSpPr>
+        <p:spPr/>
+        <p:txBody>
+          <a:bodyPr/>
+          <a:lstStyle/>
+          <a:p>
+            <a:fld id="{832FBCBD-8421-4E2E-9FC7-E5C14DCBF41E}" type="datetime1">
+              <a:rPr lang="en-US" altLang="zh-CN" smtClean="0"/>
+              <a:t>6/22/2019</a:t>
+            </a:fld>
+            <a:endParaRPr lang="zh-CN" altLang="en-US"/>
+          </a:p>
+        </p:txBody>
+      </p:sp>
+      <p:sp>
+        <p:nvSpPr>
+          <p:cNvPr id="5" name="页脚占位符 4">
+            <a:extLst>
+              <a:ext uri="{FF2B5EF4-FFF2-40B4-BE49-F238E27FC236}">
+                <a16:creationId xmlns:a16="http://schemas.microsoft.com/office/drawing/2014/main" id="{CDCA91A6-1B4E-4F0E-8981-16C5BF54A911}"/>
+              </a:ext>
+            </a:extLst>
+          </p:cNvPr>
+          <p:cNvSpPr>
+            <a:spLocks noGrp="1"/>
+          </p:cNvSpPr>
+          <p:nvPr>
+            <p:ph type="ftr" sz="quarter" idx="11"/>
+          </p:nvPr>
+        </p:nvSpPr>
+        <p:spPr/>
+        <p:txBody>
+          <a:bodyPr/>
+          <a:lstStyle/>
+          <a:p>
+            <a:r>
+              <a:rPr lang="en-US" altLang="zh-CN" dirty="0"/>
+              <a:t>Operating System Project 2</a:t>
+            </a:r>
+            <a:endParaRPr lang="zh-CN" altLang="en-US" dirty="0"/>
+          </a:p>
+        </p:txBody>
+      </p:sp>
+      <p:sp>
+        <p:nvSpPr>
+          <p:cNvPr id="6" name="灯片编号占位符 5">
+            <a:extLst>
+              <a:ext uri="{FF2B5EF4-FFF2-40B4-BE49-F238E27FC236}">
+                <a16:creationId xmlns:a16="http://schemas.microsoft.com/office/drawing/2014/main" id="{D2D8E6E6-D647-4CF7-9F3A-18475B202A90}"/>
+              </a:ext>
+            </a:extLst>
+          </p:cNvPr>
+          <p:cNvSpPr>
+            <a:spLocks noGrp="1"/>
+          </p:cNvSpPr>
+          <p:nvPr>
+            <p:ph type="sldNum" sz="quarter" idx="12"/>
+          </p:nvPr>
+        </p:nvSpPr>
+        <p:spPr/>
+        <p:txBody>
+          <a:bodyPr/>
+          <a:lstStyle/>
+          <a:p>
+            <a:fld id="{E65E0886-761E-4D32-A99C-70DCDA1CCD06}" type="slidenum">
+              <a:rPr lang="zh-CN" altLang="en-US" smtClean="0"/>
+              <a:t>22</a:t>
+            </a:fld>
+            <a:endParaRPr lang="zh-CN" altLang="en-US"/>
+          </a:p>
+        </p:txBody>
+      </p:sp>
+      <p:sp>
+        <p:nvSpPr>
+          <p:cNvPr id="3" name="内容占位符 2">
+            <a:extLst>
+              <a:ext uri="{FF2B5EF4-FFF2-40B4-BE49-F238E27FC236}">
+                <a16:creationId xmlns:a16="http://schemas.microsoft.com/office/drawing/2014/main" id="{D6BD68F3-5E6E-4613-A76F-55A9703438C9}"/>
+              </a:ext>
+            </a:extLst>
+          </p:cNvPr>
+          <p:cNvSpPr>
+            <a:spLocks noGrp="1"/>
+          </p:cNvSpPr>
+          <p:nvPr>
+            <p:ph idx="1"/>
+          </p:nvPr>
+        </p:nvSpPr>
+        <p:spPr/>
+        <p:txBody>
+          <a:bodyPr/>
+          <a:lstStyle/>
+          <a:p>
+            <a:r>
+              <a:rPr lang="en-US" altLang="zh-CN" dirty="0"/>
+              <a:t>LRU: A page is </a:t>
+            </a:r>
+            <a:r>
+              <a:rPr lang="en-US" altLang="zh-CN" b="1" dirty="0"/>
+              <a:t>immediately</a:t>
+            </a:r>
+            <a:r>
+              <a:rPr lang="en-US" altLang="zh-CN" dirty="0"/>
+              <a:t> added to active list when it’s accessed.</a:t>
+            </a:r>
+          </a:p>
+          <a:p>
+            <a:r>
+              <a:rPr lang="en-US" altLang="zh-CN" dirty="0"/>
+              <a:t>LFU: A page is added to active list only when it’s accessed </a:t>
+            </a:r>
+            <a:r>
+              <a:rPr lang="en-US" altLang="zh-CN" b="1" dirty="0"/>
+              <a:t>frequently</a:t>
+            </a:r>
+            <a:r>
+              <a:rPr lang="en-US" altLang="zh-CN" dirty="0"/>
+              <a:t> enough.</a:t>
+            </a:r>
+          </a:p>
+        </p:txBody>
+      </p:sp>
+    </p:spTree>
+    <p:extLst>
+      <p:ext uri="{BB962C8B-B14F-4D97-AF65-F5344CB8AC3E}">
+        <p14:creationId xmlns:p14="http://schemas.microsoft.com/office/powerpoint/2010/main" val="582806538"/>
+      </p:ext>
+    </p:extLst>
+  </p:cSld>
+  <p:clrMapOvr>
+    <a:masterClrMapping/>
+  </p:clrMapOvr>
+</p:sld>
+</file>
+
+<file path=ppt/slides/slide23.xml><?xml version="1.0" encoding="utf-8"?>
+<p:sld xmlns:a="http://schemas.openxmlformats.org/drawingml/2006/main" xmlns:r="http://schemas.openxmlformats.org/officeDocument/2006/relationships" xmlns:p="http://schemas.openxmlformats.org/presentationml/2006/main">
+  <p:cSld>
+    <p:spTree>
+      <p:nvGrpSpPr>
+        <p:cNvPr id="1" name=""/>
+        <p:cNvGrpSpPr/>
+        <p:nvPr/>
+      </p:nvGrpSpPr>
+      <p:grpSpPr>
+        <a:xfrm>
+          <a:off x="0" y="0"/>
+          <a:ext cx="0" cy="0"/>
+          <a:chOff x="0" y="0"/>
+          <a:chExt cx="0" cy="0"/>
+        </a:xfrm>
+      </p:grpSpPr>
+      <p:sp>
+        <p:nvSpPr>
+          <p:cNvPr id="7" name="标题 6">
+            <a:extLst>
+              <a:ext uri="{FF2B5EF4-FFF2-40B4-BE49-F238E27FC236}">
+                <a16:creationId xmlns:a16="http://schemas.microsoft.com/office/drawing/2014/main" id="{E3FFF0D0-59E0-4740-8B8D-209963775323}"/>
+              </a:ext>
+            </a:extLst>
+          </p:cNvPr>
+          <p:cNvSpPr>
+            <a:spLocks noGrp="1"/>
+          </p:cNvSpPr>
+          <p:nvPr>
+            <p:ph type="title"/>
+          </p:nvPr>
+        </p:nvSpPr>
+        <p:spPr/>
+        <p:txBody>
+          <a:bodyPr/>
+          <a:lstStyle/>
+          <a:p>
+            <a:r>
+              <a:rPr lang="en-US" altLang="zh-CN" dirty="0"/>
+              <a:t>Implementation Details</a:t>
+            </a:r>
+            <a:endParaRPr lang="zh-CN" altLang="en-US" dirty="0"/>
+          </a:p>
+        </p:txBody>
+      </p:sp>
+      <p:sp>
+        <p:nvSpPr>
+          <p:cNvPr id="4" name="日期占位符 3">
+            <a:extLst>
+              <a:ext uri="{FF2B5EF4-FFF2-40B4-BE49-F238E27FC236}">
+                <a16:creationId xmlns:a16="http://schemas.microsoft.com/office/drawing/2014/main" id="{AD27364D-967F-400B-9186-BE73F494AF12}"/>
+              </a:ext>
+            </a:extLst>
+          </p:cNvPr>
+          <p:cNvSpPr>
+            <a:spLocks noGrp="1"/>
+          </p:cNvSpPr>
+          <p:nvPr>
+            <p:ph type="dt" sz="half" idx="10"/>
+          </p:nvPr>
+        </p:nvSpPr>
+        <p:spPr/>
+        <p:txBody>
+          <a:bodyPr/>
+          <a:lstStyle/>
+          <a:p>
+            <a:fld id="{832FBCBD-8421-4E2E-9FC7-E5C14DCBF41E}" type="datetime1">
+              <a:rPr lang="en-US" altLang="zh-CN" smtClean="0"/>
+              <a:t>6/22/2019</a:t>
+            </a:fld>
+            <a:endParaRPr lang="zh-CN" altLang="en-US"/>
+          </a:p>
+        </p:txBody>
+      </p:sp>
+      <p:sp>
+        <p:nvSpPr>
+          <p:cNvPr id="5" name="页脚占位符 4">
+            <a:extLst>
+              <a:ext uri="{FF2B5EF4-FFF2-40B4-BE49-F238E27FC236}">
+                <a16:creationId xmlns:a16="http://schemas.microsoft.com/office/drawing/2014/main" id="{CDCA91A6-1B4E-4F0E-8981-16C5BF54A911}"/>
+              </a:ext>
+            </a:extLst>
+          </p:cNvPr>
+          <p:cNvSpPr>
+            <a:spLocks noGrp="1"/>
+          </p:cNvSpPr>
+          <p:nvPr>
+            <p:ph type="ftr" sz="quarter" idx="11"/>
+          </p:nvPr>
+        </p:nvSpPr>
+        <p:spPr/>
+        <p:txBody>
+          <a:bodyPr/>
+          <a:lstStyle/>
+          <a:p>
+            <a:r>
+              <a:rPr lang="en-US" altLang="zh-CN" dirty="0"/>
+              <a:t>Operating System Project 2</a:t>
+            </a:r>
+            <a:endParaRPr lang="zh-CN" altLang="en-US" dirty="0"/>
+          </a:p>
+        </p:txBody>
+      </p:sp>
+      <p:sp>
+        <p:nvSpPr>
+          <p:cNvPr id="6" name="灯片编号占位符 5">
+            <a:extLst>
+              <a:ext uri="{FF2B5EF4-FFF2-40B4-BE49-F238E27FC236}">
+                <a16:creationId xmlns:a16="http://schemas.microsoft.com/office/drawing/2014/main" id="{D2D8E6E6-D647-4CF7-9F3A-18475B202A90}"/>
+              </a:ext>
+            </a:extLst>
+          </p:cNvPr>
+          <p:cNvSpPr>
+            <a:spLocks noGrp="1"/>
+          </p:cNvSpPr>
+          <p:nvPr>
+            <p:ph type="sldNum" sz="quarter" idx="12"/>
+          </p:nvPr>
+        </p:nvSpPr>
+        <p:spPr/>
+        <p:txBody>
+          <a:bodyPr/>
+          <a:lstStyle/>
+          <a:p>
+            <a:fld id="{E65E0886-761E-4D32-A99C-70DCDA1CCD06}" type="slidenum">
+              <a:rPr lang="zh-CN" altLang="en-US" smtClean="0"/>
+              <a:t>23</a:t>
+            </a:fld>
+            <a:endParaRPr lang="zh-CN" altLang="en-US"/>
+          </a:p>
+        </p:txBody>
+      </p:sp>
+      <p:sp>
+        <p:nvSpPr>
+          <p:cNvPr id="3" name="内容占位符 2">
+            <a:extLst>
+              <a:ext uri="{FF2B5EF4-FFF2-40B4-BE49-F238E27FC236}">
+                <a16:creationId xmlns:a16="http://schemas.microsoft.com/office/drawing/2014/main" id="{D6BD68F3-5E6E-4613-A76F-55A9703438C9}"/>
+              </a:ext>
+            </a:extLst>
+          </p:cNvPr>
+          <p:cNvSpPr>
+            <a:spLocks noGrp="1"/>
+          </p:cNvSpPr>
+          <p:nvPr>
+            <p:ph idx="1"/>
+          </p:nvPr>
+        </p:nvSpPr>
+        <p:spPr/>
+        <p:txBody>
+          <a:bodyPr/>
+          <a:lstStyle/>
+          <a:p>
+            <a:r>
+              <a:rPr lang="en-US" altLang="zh-CN" dirty="0"/>
+              <a:t>When a page is accessed, </a:t>
+            </a:r>
+            <a:r>
+              <a:rPr lang="en-US" altLang="zh-CN" b="1" dirty="0"/>
+              <a:t>left</a:t>
+            </a:r>
+            <a:r>
+              <a:rPr lang="en-US" altLang="zh-CN" dirty="0"/>
+              <a:t> shift </a:t>
+            </a:r>
+            <a:r>
+              <a:rPr lang="en-US" altLang="zh-CN" dirty="0" err="1">
+                <a:latin typeface="Consolas" panose="020B0609020204030204" pitchFamily="49" charset="0"/>
+              </a:rPr>
+              <a:t>PG_referenced</a:t>
+            </a:r>
+            <a:r>
+              <a:rPr lang="en-US" altLang="zh-CN" dirty="0"/>
+              <a:t> and add by 1.</a:t>
+            </a:r>
+          </a:p>
+          <a:p>
+            <a:r>
+              <a:rPr lang="en-US" altLang="zh-CN" dirty="0"/>
+              <a:t>Maximal</a:t>
+            </a:r>
+            <a:r>
+              <a:rPr lang="en-US" altLang="zh-CN" dirty="0">
+                <a:latin typeface="Bahnschrift" panose="020B0502040204020203" pitchFamily="34" charset="0"/>
+              </a:rPr>
+              <a:t> </a:t>
+            </a:r>
+            <a:r>
+              <a:rPr lang="en-US" altLang="zh-CN" dirty="0" err="1">
+                <a:latin typeface="Consolas" panose="020B0609020204030204" pitchFamily="49" charset="0"/>
+              </a:rPr>
+              <a:t>PG_referenced</a:t>
+            </a:r>
+            <a:r>
+              <a:rPr lang="en-US" altLang="zh-CN" dirty="0"/>
+              <a:t>: necessary.</a:t>
+            </a:r>
+            <a:endParaRPr lang="zh-CN" altLang="en-US" dirty="0"/>
+          </a:p>
+        </p:txBody>
+      </p:sp>
+    </p:spTree>
+    <p:extLst>
+      <p:ext uri="{BB962C8B-B14F-4D97-AF65-F5344CB8AC3E}">
+        <p14:creationId xmlns:p14="http://schemas.microsoft.com/office/powerpoint/2010/main" val="1340266712"/>
+      </p:ext>
+    </p:extLst>
+  </p:cSld>
+  <p:clrMapOvr>
+    <a:masterClrMapping/>
+  </p:clrMapOvr>
+</p:sld>
+</file>
+
+<file path=ppt/slides/slide24.xml><?xml version="1.0" encoding="utf-8"?>
+<p:sld xmlns:a="http://schemas.openxmlformats.org/drawingml/2006/main" xmlns:r="http://schemas.openxmlformats.org/officeDocument/2006/relationships" xmlns:p="http://schemas.openxmlformats.org/presentationml/2006/main">
+  <p:cSld>
+    <p:spTree>
+      <p:nvGrpSpPr>
+        <p:cNvPr id="1" name=""/>
+        <p:cNvGrpSpPr/>
+        <p:nvPr/>
+      </p:nvGrpSpPr>
+      <p:grpSpPr>
+        <a:xfrm>
+          <a:off x="0" y="0"/>
+          <a:ext cx="0" cy="0"/>
+          <a:chOff x="0" y="0"/>
+          <a:chExt cx="0" cy="0"/>
+        </a:xfrm>
+      </p:grpSpPr>
+      <p:sp>
+        <p:nvSpPr>
+          <p:cNvPr id="7" name="标题 6">
+            <a:extLst>
+              <a:ext uri="{FF2B5EF4-FFF2-40B4-BE49-F238E27FC236}">
+                <a16:creationId xmlns:a16="http://schemas.microsoft.com/office/drawing/2014/main" id="{17F8988D-E427-42CD-999A-379EE24D2B5F}"/>
+              </a:ext>
+            </a:extLst>
+          </p:cNvPr>
+          <p:cNvSpPr>
+            <a:spLocks noGrp="1"/>
+          </p:cNvSpPr>
+          <p:nvPr>
+            <p:ph type="title"/>
+          </p:nvPr>
+        </p:nvSpPr>
+        <p:spPr/>
+        <p:txBody>
+          <a:bodyPr/>
+          <a:lstStyle/>
+          <a:p>
+            <a:r>
+              <a:rPr lang="en-US" altLang="zh-CN" dirty="0"/>
+              <a:t>Test Results</a:t>
+            </a:r>
+            <a:endParaRPr lang="zh-CN" altLang="en-US" dirty="0"/>
+          </a:p>
+        </p:txBody>
+      </p:sp>
+      <p:sp>
+        <p:nvSpPr>
+          <p:cNvPr id="8" name="文本占位符 7">
+            <a:extLst>
+              <a:ext uri="{FF2B5EF4-FFF2-40B4-BE49-F238E27FC236}">
+                <a16:creationId xmlns:a16="http://schemas.microsoft.com/office/drawing/2014/main" id="{7BC2171B-E065-4AD6-9279-F82B0770FF9C}"/>
+              </a:ext>
+            </a:extLst>
+          </p:cNvPr>
+          <p:cNvSpPr>
+            <a:spLocks noGrp="1"/>
+          </p:cNvSpPr>
+          <p:nvPr>
+            <p:ph type="body" idx="1"/>
+          </p:nvPr>
+        </p:nvSpPr>
+        <p:spPr/>
+        <p:txBody>
+          <a:bodyPr/>
+          <a:lstStyle/>
+          <a:p>
+            <a:r>
+              <a:rPr lang="en-US" altLang="zh-CN" dirty="0"/>
+              <a:t>LFU</a:t>
+            </a:r>
+            <a:endParaRPr lang="zh-CN" altLang="en-US" dirty="0"/>
+          </a:p>
+        </p:txBody>
+      </p:sp>
+      <p:sp>
+        <p:nvSpPr>
+          <p:cNvPr id="4" name="日期占位符 3">
+            <a:extLst>
+              <a:ext uri="{FF2B5EF4-FFF2-40B4-BE49-F238E27FC236}">
+                <a16:creationId xmlns:a16="http://schemas.microsoft.com/office/drawing/2014/main" id="{AB937B1A-8DA4-443A-BDFD-A8B81ABB38CB}"/>
+              </a:ext>
+            </a:extLst>
+          </p:cNvPr>
+          <p:cNvSpPr>
+            <a:spLocks noGrp="1"/>
+          </p:cNvSpPr>
+          <p:nvPr>
+            <p:ph type="dt" sz="half" idx="10"/>
+          </p:nvPr>
+        </p:nvSpPr>
+        <p:spPr/>
+        <p:txBody>
+          <a:bodyPr/>
+          <a:lstStyle/>
+          <a:p>
+            <a:fld id="{42D6268D-2F70-4DA1-AFF2-3D6BAAA66193}" type="datetime1">
+              <a:rPr lang="en-US" altLang="zh-CN" smtClean="0"/>
+              <a:t>6/22/2019</a:t>
+            </a:fld>
+            <a:endParaRPr lang="zh-CN" altLang="en-US"/>
+          </a:p>
+        </p:txBody>
+      </p:sp>
+      <p:sp>
+        <p:nvSpPr>
+          <p:cNvPr id="5" name="页脚占位符 4">
+            <a:extLst>
+              <a:ext uri="{FF2B5EF4-FFF2-40B4-BE49-F238E27FC236}">
+                <a16:creationId xmlns:a16="http://schemas.microsoft.com/office/drawing/2014/main" id="{A5BFC8AA-452F-402F-990D-FA2CB748FD68}"/>
+              </a:ext>
+            </a:extLst>
+          </p:cNvPr>
+          <p:cNvSpPr>
+            <a:spLocks noGrp="1"/>
+          </p:cNvSpPr>
+          <p:nvPr>
+            <p:ph type="ftr" sz="quarter" idx="11"/>
+          </p:nvPr>
+        </p:nvSpPr>
+        <p:spPr/>
+        <p:txBody>
+          <a:bodyPr/>
+          <a:lstStyle/>
+          <a:p>
+            <a:r>
+              <a:rPr lang="en-US" altLang="zh-CN"/>
+              <a:t>Operating System Project 2</a:t>
+            </a:r>
+            <a:endParaRPr lang="zh-CN" altLang="en-US"/>
+          </a:p>
+        </p:txBody>
+      </p:sp>
+      <p:sp>
+        <p:nvSpPr>
+          <p:cNvPr id="6" name="灯片编号占位符 5">
+            <a:extLst>
+              <a:ext uri="{FF2B5EF4-FFF2-40B4-BE49-F238E27FC236}">
+                <a16:creationId xmlns:a16="http://schemas.microsoft.com/office/drawing/2014/main" id="{606F7653-5700-4F92-9C5D-5FD0253A0504}"/>
+              </a:ext>
+            </a:extLst>
+          </p:cNvPr>
+          <p:cNvSpPr>
+            <a:spLocks noGrp="1"/>
+          </p:cNvSpPr>
+          <p:nvPr>
+            <p:ph type="sldNum" sz="quarter" idx="12"/>
+          </p:nvPr>
+        </p:nvSpPr>
+        <p:spPr/>
+        <p:txBody>
+          <a:bodyPr/>
+          <a:lstStyle/>
+          <a:p>
+            <a:fld id="{E65E0886-761E-4D32-A99C-70DCDA1CCD06}" type="slidenum">
+              <a:rPr lang="zh-CN" altLang="en-US" smtClean="0"/>
+              <a:t>24</a:t>
+            </a:fld>
+            <a:endParaRPr lang="zh-CN" altLang="en-US"/>
+          </a:p>
+        </p:txBody>
+      </p:sp>
+    </p:spTree>
+    <p:extLst>
+      <p:ext uri="{BB962C8B-B14F-4D97-AF65-F5344CB8AC3E}">
+        <p14:creationId xmlns:p14="http://schemas.microsoft.com/office/powerpoint/2010/main" val="4161800283"/>
+      </p:ext>
+    </p:extLst>
+  </p:cSld>
+  <p:clrMapOvr>
+    <a:masterClrMapping/>
+  </p:clrMapOvr>
+</p:sld>
+</file>
+
+<file path=ppt/slides/slide25.xml><?xml version="1.0" encoding="utf-8"?>
+<p:sld xmlns:a="http://schemas.openxmlformats.org/drawingml/2006/main" xmlns:r="http://schemas.openxmlformats.org/officeDocument/2006/relationships" xmlns:p="http://schemas.openxmlformats.org/presentationml/2006/main">
+  <p:cSld>
+    <p:spTree>
+      <p:nvGrpSpPr>
+        <p:cNvPr id="1" name=""/>
+        <p:cNvGrpSpPr/>
+        <p:nvPr/>
+      </p:nvGrpSpPr>
+      <p:grpSpPr>
+        <a:xfrm>
+          <a:off x="0" y="0"/>
+          <a:ext cx="0" cy="0"/>
+          <a:chOff x="0" y="0"/>
+          <a:chExt cx="0" cy="0"/>
+        </a:xfrm>
+      </p:grpSpPr>
+      <p:sp>
+        <p:nvSpPr>
+          <p:cNvPr id="2" name="标题 1">
+            <a:extLst>
+              <a:ext uri="{FF2B5EF4-FFF2-40B4-BE49-F238E27FC236}">
+                <a16:creationId xmlns:a16="http://schemas.microsoft.com/office/drawing/2014/main" id="{ABFCB2C7-B657-48F2-B974-1D6637E55025}"/>
+              </a:ext>
+            </a:extLst>
+          </p:cNvPr>
+          <p:cNvSpPr>
+            <a:spLocks noGrp="1"/>
+          </p:cNvSpPr>
+          <p:nvPr>
+            <p:ph type="title"/>
+          </p:nvPr>
+        </p:nvSpPr>
+        <p:spPr/>
+        <p:txBody>
+          <a:bodyPr/>
+          <a:lstStyle/>
+          <a:p>
+            <a:r>
+              <a:rPr lang="en-US" altLang="zh-CN" dirty="0"/>
+              <a:t>Trend</a:t>
+            </a:r>
+            <a:endParaRPr lang="zh-CN" altLang="en-US" dirty="0"/>
+          </a:p>
+        </p:txBody>
+      </p:sp>
+      <p:pic>
+        <p:nvPicPr>
+          <p:cNvPr id="7" name="内容占位符 6">
+            <a:extLst>
+              <a:ext uri="{FF2B5EF4-FFF2-40B4-BE49-F238E27FC236}">
+                <a16:creationId xmlns:a16="http://schemas.microsoft.com/office/drawing/2014/main" id="{87949D2D-5BA2-411C-8C56-FC937449BA9A}"/>
+              </a:ext>
+            </a:extLst>
+          </p:cNvPr>
+          <p:cNvPicPr>
+            <a:picLocks noGrp="1" noChangeAspect="1"/>
+          </p:cNvPicPr>
+          <p:nvPr>
+            <p:ph idx="1"/>
+          </p:nvPr>
+        </p:nvPicPr>
+        <p:blipFill>
+          <a:blip r:embed="rId2"/>
+          <a:stretch>
+            <a:fillRect/>
+          </a:stretch>
+        </p:blipFill>
+        <p:spPr>
+          <a:xfrm>
+            <a:off x="1339438" y="1895673"/>
+            <a:ext cx="6509574" cy="3923904"/>
+          </a:xfrm>
+          <a:prstGeom prst="rect">
+            <a:avLst/>
+          </a:prstGeom>
+        </p:spPr>
+      </p:pic>
+      <p:sp>
+        <p:nvSpPr>
+          <p:cNvPr id="4" name="日期占位符 3">
+            <a:extLst>
+              <a:ext uri="{FF2B5EF4-FFF2-40B4-BE49-F238E27FC236}">
+                <a16:creationId xmlns:a16="http://schemas.microsoft.com/office/drawing/2014/main" id="{7DBEBB1A-A13C-4A99-B84F-3BFF1C184075}"/>
+              </a:ext>
+            </a:extLst>
+          </p:cNvPr>
+          <p:cNvSpPr>
+            <a:spLocks noGrp="1"/>
+          </p:cNvSpPr>
+          <p:nvPr>
+            <p:ph type="dt" sz="half" idx="10"/>
+          </p:nvPr>
+        </p:nvSpPr>
+        <p:spPr/>
+        <p:txBody>
+          <a:bodyPr/>
+          <a:lstStyle/>
+          <a:p>
+            <a:fld id="{42D6268D-2F70-4DA1-AFF2-3D6BAAA66193}" type="datetime1">
+              <a:rPr lang="en-US" altLang="zh-CN" smtClean="0"/>
+              <a:t>6/22/2019</a:t>
+            </a:fld>
+            <a:endParaRPr lang="zh-CN" altLang="en-US"/>
+          </a:p>
+        </p:txBody>
+      </p:sp>
+      <p:sp>
+        <p:nvSpPr>
+          <p:cNvPr id="5" name="页脚占位符 4">
+            <a:extLst>
+              <a:ext uri="{FF2B5EF4-FFF2-40B4-BE49-F238E27FC236}">
+                <a16:creationId xmlns:a16="http://schemas.microsoft.com/office/drawing/2014/main" id="{0DB98F8F-2085-4800-A0B4-5C3BD3244A33}"/>
+              </a:ext>
+            </a:extLst>
+          </p:cNvPr>
+          <p:cNvSpPr>
+            <a:spLocks noGrp="1"/>
+          </p:cNvSpPr>
+          <p:nvPr>
+            <p:ph type="ftr" sz="quarter" idx="11"/>
+          </p:nvPr>
+        </p:nvSpPr>
+        <p:spPr/>
+        <p:txBody>
+          <a:bodyPr/>
+          <a:lstStyle/>
+          <a:p>
+            <a:r>
+              <a:rPr lang="en-US" altLang="zh-CN"/>
+              <a:t>Operating System Project 2</a:t>
+            </a:r>
+            <a:endParaRPr lang="zh-CN" altLang="en-US"/>
+          </a:p>
+        </p:txBody>
+      </p:sp>
+      <p:sp>
+        <p:nvSpPr>
+          <p:cNvPr id="6" name="灯片编号占位符 5">
+            <a:extLst>
+              <a:ext uri="{FF2B5EF4-FFF2-40B4-BE49-F238E27FC236}">
+                <a16:creationId xmlns:a16="http://schemas.microsoft.com/office/drawing/2014/main" id="{8CD4A7FA-C44D-492C-B494-5B36B5B09136}"/>
+              </a:ext>
+            </a:extLst>
+          </p:cNvPr>
+          <p:cNvSpPr>
+            <a:spLocks noGrp="1"/>
+          </p:cNvSpPr>
+          <p:nvPr>
+            <p:ph type="sldNum" sz="quarter" idx="12"/>
+          </p:nvPr>
+        </p:nvSpPr>
+        <p:spPr/>
+        <p:txBody>
+          <a:bodyPr/>
+          <a:lstStyle/>
+          <a:p>
+            <a:fld id="{E65E0886-761E-4D32-A99C-70DCDA1CCD06}" type="slidenum">
+              <a:rPr lang="zh-CN" altLang="en-US" smtClean="0"/>
+              <a:t>25</a:t>
+            </a:fld>
+            <a:endParaRPr lang="zh-CN" altLang="en-US"/>
+          </a:p>
+        </p:txBody>
+      </p:sp>
+    </p:spTree>
+    <p:extLst>
+      <p:ext uri="{BB962C8B-B14F-4D97-AF65-F5344CB8AC3E}">
+        <p14:creationId xmlns:p14="http://schemas.microsoft.com/office/powerpoint/2010/main" val="512482077"/>
+      </p:ext>
+    </p:extLst>
+  </p:cSld>
+  <p:clrMapOvr>
+    <a:masterClrMapping/>
+  </p:clrMapOvr>
+</p:sld>
+</file>
+
+<file path=ppt/slides/slide26.xml><?xml version="1.0" encoding="utf-8"?>
+<p:sld xmlns:a="http://schemas.openxmlformats.org/drawingml/2006/main" xmlns:r="http://schemas.openxmlformats.org/officeDocument/2006/relationships" xmlns:p="http://schemas.openxmlformats.org/presentationml/2006/main">
+  <p:cSld>
+    <p:spTree>
+      <p:nvGrpSpPr>
+        <p:cNvPr id="1" name=""/>
+        <p:cNvGrpSpPr/>
+        <p:nvPr/>
+      </p:nvGrpSpPr>
+      <p:grpSpPr>
+        <a:xfrm>
+          <a:off x="0" y="0"/>
+          <a:ext cx="0" cy="0"/>
+          <a:chOff x="0" y="0"/>
+          <a:chExt cx="0" cy="0"/>
+        </a:xfrm>
+      </p:grpSpPr>
+      <p:sp>
+        <p:nvSpPr>
+          <p:cNvPr id="2" name="标题 1">
+            <a:extLst>
+              <a:ext uri="{FF2B5EF4-FFF2-40B4-BE49-F238E27FC236}">
+                <a16:creationId xmlns:a16="http://schemas.microsoft.com/office/drawing/2014/main" id="{F38F2846-89BD-45C8-950C-3DE8F301A1C4}"/>
+              </a:ext>
+            </a:extLst>
+          </p:cNvPr>
+          <p:cNvSpPr>
+            <a:spLocks noGrp="1"/>
+          </p:cNvSpPr>
+          <p:nvPr>
+            <p:ph type="title"/>
+          </p:nvPr>
+        </p:nvSpPr>
+        <p:spPr/>
+        <p:txBody>
+          <a:bodyPr/>
+          <a:lstStyle/>
+          <a:p>
+            <a:r>
+              <a:rPr lang="en-US" altLang="zh-CN" dirty="0"/>
+              <a:t>Trend</a:t>
+            </a:r>
+            <a:endParaRPr lang="zh-CN" altLang="en-US" dirty="0"/>
+          </a:p>
+        </p:txBody>
+      </p:sp>
+      <p:graphicFrame>
+        <p:nvGraphicFramePr>
+          <p:cNvPr id="7" name="内容占位符 6">
+            <a:extLst>
+              <a:ext uri="{FF2B5EF4-FFF2-40B4-BE49-F238E27FC236}">
+                <a16:creationId xmlns:a16="http://schemas.microsoft.com/office/drawing/2014/main" id="{F42FED02-C473-44A9-B18E-E5601A1778A8}"/>
+              </a:ext>
+            </a:extLst>
+          </p:cNvPr>
+          <p:cNvGraphicFramePr>
+            <a:graphicFrameLocks noGrp="1"/>
+          </p:cNvGraphicFramePr>
+          <p:nvPr>
+            <p:ph idx="1"/>
           </p:nvPr>
         </p:nvGraphicFramePr>
         <p:xfrm>
@@ -6389,7 +8738,7 @@
                     <a:p>
                       <a:r>
                         <a:rPr lang="en-US" altLang="zh-CN" dirty="0"/>
-                        <a:t>Page replacement procedures are started.</a:t>
+                        <a:t>Some pages are reused.</a:t>
                       </a:r>
                       <a:endParaRPr lang="zh-CN" altLang="en-US" dirty="0"/>
                     </a:p>
@@ -6527,7 +8876,7 @@
           <a:p>
             <a:fld id="{42D6268D-2F70-4DA1-AFF2-3D6BAAA66193}" type="datetime1">
               <a:rPr lang="en-US" altLang="zh-CN" smtClean="0"/>
-              <a:t>6/17/2019</a:t>
+              <a:t>6/22/2019</a:t>
             </a:fld>
             <a:endParaRPr lang="zh-CN" altLang="en-US"/>
           </a:p>
@@ -6585,7 +8934,7 @@
           <a:p>
             <a:fld id="{E65E0886-761E-4D32-A99C-70DCDA1CCD06}" type="slidenum">
               <a:rPr lang="zh-CN" altLang="en-US" smtClean="0"/>
-              <a:t>17</a:t>
+              <a:t>26</a:t>
             </a:fld>
             <a:endParaRPr lang="zh-CN" altLang="en-US"/>
           </a:p>
@@ -6594,7 +8943,7 @@
     </p:spTree>
     <p:extLst>
       <p:ext uri="{BB962C8B-B14F-4D97-AF65-F5344CB8AC3E}">
-        <p14:creationId xmlns:p14="http://schemas.microsoft.com/office/powerpoint/2010/main" val="2630006234"/>
+        <p14:creationId xmlns:p14="http://schemas.microsoft.com/office/powerpoint/2010/main" val="1700418552"/>
       </p:ext>
     </p:extLst>
   </p:cSld>
@@ -6604,7 +8953,7 @@
 </p:sld>
 </file>
 
-<file path=ppt/slides/slide18.xml><?xml version="1.0" encoding="utf-8"?>
+<file path=ppt/slides/slide27.xml><?xml version="1.0" encoding="utf-8"?>
 <p:sld xmlns:a="http://schemas.openxmlformats.org/drawingml/2006/main" xmlns:r="http://schemas.openxmlformats.org/officeDocument/2006/relationships" xmlns:p="http://schemas.openxmlformats.org/presentationml/2006/main">
   <p:cSld>
     <p:spTree>
@@ -6705,7 +9054,7 @@
           <a:p>
             <a:fld id="{42D6268D-2F70-4DA1-AFF2-3D6BAAA66193}" type="datetime1">
               <a:rPr lang="en-US" altLang="zh-CN" smtClean="0"/>
-              <a:t>6/17/2019</a:t>
+              <a:t>6/22/2019</a:t>
             </a:fld>
             <a:endParaRPr lang="zh-CN" altLang="en-US"/>
           </a:p>
@@ -6763,7 +9112,7 @@
           <a:p>
             <a:fld id="{E65E0886-761E-4D32-A99C-70DCDA1CCD06}" type="slidenum">
               <a:rPr lang="zh-CN" altLang="en-US" smtClean="0"/>
-              <a:t>18</a:t>
+              <a:t>27</a:t>
             </a:fld>
             <a:endParaRPr lang="zh-CN" altLang="en-US"/>
           </a:p>
@@ -6782,7 +9131,7 @@
 </p:sld>
 </file>
 
-<file path=ppt/slides/slide19.xml><?xml version="1.0" encoding="utf-8"?>
+<file path=ppt/slides/slide28.xml><?xml version="1.0" encoding="utf-8"?>
 <p:sld xmlns:a="http://schemas.openxmlformats.org/drawingml/2006/main" xmlns:r="http://schemas.openxmlformats.org/officeDocument/2006/relationships" xmlns:p="http://schemas.openxmlformats.org/presentationml/2006/main">
   <p:cSld>
     <p:spTree>
@@ -6883,7 +9232,7 @@
           <a:p>
             <a:fld id="{42D6268D-2F70-4DA1-AFF2-3D6BAAA66193}" type="datetime1">
               <a:rPr lang="en-US" altLang="zh-CN" smtClean="0"/>
-              <a:t>6/17/2019</a:t>
+              <a:t>6/22/2019</a:t>
             </a:fld>
             <a:endParaRPr lang="zh-CN" altLang="en-US"/>
           </a:p>
@@ -6941,7 +9290,7 @@
           <a:p>
             <a:fld id="{E65E0886-761E-4D32-A99C-70DCDA1CCD06}" type="slidenum">
               <a:rPr lang="zh-CN" altLang="en-US" smtClean="0"/>
-              <a:t>19</a:t>
+              <a:t>28</a:t>
             </a:fld>
             <a:endParaRPr lang="zh-CN" altLang="en-US"/>
           </a:p>
@@ -6960,7 +9309,7 @@
 </p:sld>
 </file>
 
-<file path=ppt/slides/slide2.xml><?xml version="1.0" encoding="utf-8"?>
+<file path=ppt/slides/slide29.xml><?xml version="1.0" encoding="utf-8"?>
 <p:sld xmlns:a="http://schemas.openxmlformats.org/drawingml/2006/main" xmlns:r="http://schemas.openxmlformats.org/officeDocument/2006/relationships" xmlns:p="http://schemas.openxmlformats.org/presentationml/2006/main">
   <p:cSld>
     <p:spTree>
@@ -6982,7 +9331,7 @@
           <p:cNvPr id="2" name="标题 1">
             <a:extLst>
               <a:ext uri="{FF2B5EF4-FFF2-40B4-BE49-F238E27FC236}">
-                <a16:creationId xmlns:a16="http://schemas.microsoft.com/office/drawing/2014/main" id="{A5224E57-381B-4273-AF46-D6CA7C0D02F9}"/>
+                <a16:creationId xmlns:a16="http://schemas.microsoft.com/office/drawing/2014/main" id="{5C5ED13D-36FF-474E-BE7B-2733BFE0FB5D}"/>
               </a:ext>
             </a:extLst>
           </p:cNvPr>
@@ -7000,7 +9349,7 @@
           <a:p>
             <a:r>
               <a:rPr lang="en-US" altLang="zh-CN" dirty="0"/>
-              <a:t>Overview</a:t>
+              <a:t>The Impact of Maximum</a:t>
             </a:r>
             <a:endParaRPr lang="zh-CN" altLang="en-US" dirty="0"/>
           </a:p>
@@ -7008,76 +9357,10 @@
       </p:sp>
       <p:sp>
         <p:nvSpPr>
-          <p:cNvPr id="3" name="内容占位符 2">
-            <a:extLst>
-              <a:ext uri="{FF2B5EF4-FFF2-40B4-BE49-F238E27FC236}">
-                <a16:creationId xmlns:a16="http://schemas.microsoft.com/office/drawing/2014/main" id="{EF8AFBC6-9AF5-45DA-9BEC-965B19743B41}"/>
-              </a:ext>
-            </a:extLst>
-          </p:cNvPr>
-          <p:cNvSpPr>
-            <a:spLocks noGrp="1"/>
-          </p:cNvSpPr>
-          <p:nvPr>
-            <p:ph idx="1"/>
-          </p:nvPr>
-        </p:nvSpPr>
-        <p:spPr/>
-        <p:txBody>
-          <a:bodyPr anchor="ctr">
-            <a:normAutofit/>
-          </a:bodyPr>
-          <a:lstStyle/>
-          <a:p>
-            <a:pPr>
-              <a:lnSpc>
-                <a:spcPct val="150000"/>
-              </a:lnSpc>
-            </a:pPr>
-            <a:r>
-              <a:rPr lang="en-US" altLang="zh-CN" sz="3200" dirty="0">
-                <a:latin typeface="+mj-lt"/>
-              </a:rPr>
-              <a:t>Study of the Original Algorithm</a:t>
-            </a:r>
-          </a:p>
-          <a:p>
-            <a:pPr>
-              <a:lnSpc>
-                <a:spcPct val="150000"/>
-              </a:lnSpc>
-            </a:pPr>
-            <a:r>
-              <a:rPr lang="en-US" altLang="zh-CN" sz="3200" dirty="0">
-                <a:latin typeface="+mj-lt"/>
-              </a:rPr>
-              <a:t>Changing to an LFU-Based Algorithm</a:t>
-            </a:r>
-          </a:p>
-          <a:p>
-            <a:pPr>
-              <a:lnSpc>
-                <a:spcPct val="150000"/>
-              </a:lnSpc>
-            </a:pPr>
-            <a:r>
-              <a:rPr lang="en-US" altLang="zh-CN" sz="3200" dirty="0">
-                <a:latin typeface="+mj-lt"/>
-              </a:rPr>
-              <a:t>Test Results</a:t>
-            </a:r>
-            <a:endParaRPr lang="zh-CN" altLang="en-US" sz="3200" dirty="0">
-              <a:latin typeface="+mj-lt"/>
-            </a:endParaRPr>
-          </a:p>
-        </p:txBody>
-      </p:sp>
-      <p:sp>
-        <p:nvSpPr>
           <p:cNvPr id="4" name="日期占位符 3">
             <a:extLst>
               <a:ext uri="{FF2B5EF4-FFF2-40B4-BE49-F238E27FC236}">
-                <a16:creationId xmlns:a16="http://schemas.microsoft.com/office/drawing/2014/main" id="{4AA283DE-7A0A-45D2-A18A-5F90160FE47B}"/>
+                <a16:creationId xmlns:a16="http://schemas.microsoft.com/office/drawing/2014/main" id="{DB0BC4BB-6783-47CA-A722-C21C8F564DB9}"/>
               </a:ext>
             </a:extLst>
           </p:cNvPr>
@@ -7093,9 +9376,9 @@
           <a:bodyPr/>
           <a:lstStyle/>
           <a:p>
-            <a:fld id="{67EE479D-93C0-4BC3-9EFF-C7F9791CB645}" type="datetime1">
+            <a:fld id="{42D6268D-2F70-4DA1-AFF2-3D6BAAA66193}" type="datetime1">
               <a:rPr lang="en-US" altLang="zh-CN" smtClean="0"/>
-              <a:t>6/17/2019</a:t>
+              <a:t>6/22/2019</a:t>
             </a:fld>
             <a:endParaRPr lang="zh-CN" altLang="en-US"/>
           </a:p>
@@ -7106,7 +9389,7 @@
           <p:cNvPr id="5" name="页脚占位符 4">
             <a:extLst>
               <a:ext uri="{FF2B5EF4-FFF2-40B4-BE49-F238E27FC236}">
-                <a16:creationId xmlns:a16="http://schemas.microsoft.com/office/drawing/2014/main" id="{20C15EC1-081F-4D97-9A10-0703682FA504}"/>
+                <a16:creationId xmlns:a16="http://schemas.microsoft.com/office/drawing/2014/main" id="{AF287A87-C8D0-4934-87B4-067A9D195C11}"/>
               </a:ext>
             </a:extLst>
           </p:cNvPr>
@@ -7123,7 +9406,7 @@
           <a:lstStyle/>
           <a:p>
             <a:r>
-              <a:rPr lang="en-US" altLang="zh-CN" dirty="0"/>
+              <a:rPr lang="en-US" altLang="zh-CN"/>
               <a:t>Operating System Project 2</a:t>
             </a:r>
             <a:endParaRPr lang="zh-CN" altLang="en-US"/>
@@ -7135,7 +9418,7 @@
           <p:cNvPr id="6" name="灯片编号占位符 5">
             <a:extLst>
               <a:ext uri="{FF2B5EF4-FFF2-40B4-BE49-F238E27FC236}">
-                <a16:creationId xmlns:a16="http://schemas.microsoft.com/office/drawing/2014/main" id="{A8029765-21D5-4180-BEC3-8220CEB3B531}"/>
+                <a16:creationId xmlns:a16="http://schemas.microsoft.com/office/drawing/2014/main" id="{C0D0DF41-5D26-417E-97CF-0BC54CB4988C}"/>
               </a:ext>
             </a:extLst>
           </p:cNvPr>
@@ -7153,153 +9436,7 @@
           <a:p>
             <a:fld id="{E65E0886-761E-4D32-A99C-70DCDA1CCD06}" type="slidenum">
               <a:rPr lang="zh-CN" altLang="en-US" smtClean="0"/>
-              <a:t>2</a:t>
-            </a:fld>
-            <a:endParaRPr lang="zh-CN" altLang="en-US"/>
-          </a:p>
-        </p:txBody>
-      </p:sp>
-    </p:spTree>
-    <p:extLst>
-      <p:ext uri="{BB962C8B-B14F-4D97-AF65-F5344CB8AC3E}">
-        <p14:creationId xmlns:p14="http://schemas.microsoft.com/office/powerpoint/2010/main" val="3337490989"/>
-      </p:ext>
-    </p:extLst>
-  </p:cSld>
-  <p:clrMapOvr>
-    <a:masterClrMapping/>
-  </p:clrMapOvr>
-</p:sld>
-</file>
-
-<file path=ppt/slides/slide20.xml><?xml version="1.0" encoding="utf-8"?>
-<p:sld xmlns:a="http://schemas.openxmlformats.org/drawingml/2006/main" xmlns:r="http://schemas.openxmlformats.org/officeDocument/2006/relationships" xmlns:p="http://schemas.openxmlformats.org/presentationml/2006/main">
-  <p:cSld>
-    <p:spTree>
-      <p:nvGrpSpPr>
-        <p:cNvPr id="1" name=""/>
-        <p:cNvGrpSpPr/>
-        <p:nvPr/>
-      </p:nvGrpSpPr>
-      <p:grpSpPr>
-        <a:xfrm>
-          <a:off x="0" y="0"/>
-          <a:ext cx="0" cy="0"/>
-          <a:chOff x="0" y="0"/>
-          <a:chExt cx="0" cy="0"/>
-        </a:xfrm>
-      </p:grpSpPr>
-      <p:sp>
-        <p:nvSpPr>
-          <p:cNvPr id="2" name="标题 1">
-            <a:extLst>
-              <a:ext uri="{FF2B5EF4-FFF2-40B4-BE49-F238E27FC236}">
-                <a16:creationId xmlns:a16="http://schemas.microsoft.com/office/drawing/2014/main" id="{5C5ED13D-36FF-474E-BE7B-2733BFE0FB5D}"/>
-              </a:ext>
-            </a:extLst>
-          </p:cNvPr>
-          <p:cNvSpPr>
-            <a:spLocks noGrp="1"/>
-          </p:cNvSpPr>
-          <p:nvPr>
-            <p:ph type="title"/>
-          </p:nvPr>
-        </p:nvSpPr>
-        <p:spPr/>
-        <p:txBody>
-          <a:bodyPr/>
-          <a:lstStyle/>
-          <a:p>
-            <a:r>
-              <a:rPr lang="en-US" altLang="zh-CN" dirty="0"/>
-              <a:t>The Impact of Maximum</a:t>
-            </a:r>
-            <a:endParaRPr lang="zh-CN" altLang="en-US" dirty="0"/>
-          </a:p>
-        </p:txBody>
-      </p:sp>
-      <p:sp>
-        <p:nvSpPr>
-          <p:cNvPr id="4" name="日期占位符 3">
-            <a:extLst>
-              <a:ext uri="{FF2B5EF4-FFF2-40B4-BE49-F238E27FC236}">
-                <a16:creationId xmlns:a16="http://schemas.microsoft.com/office/drawing/2014/main" id="{DB0BC4BB-6783-47CA-A722-C21C8F564DB9}"/>
-              </a:ext>
-            </a:extLst>
-          </p:cNvPr>
-          <p:cNvSpPr>
-            <a:spLocks noGrp="1"/>
-          </p:cNvSpPr>
-          <p:nvPr>
-            <p:ph type="dt" sz="half" idx="10"/>
-          </p:nvPr>
-        </p:nvSpPr>
-        <p:spPr/>
-        <p:txBody>
-          <a:bodyPr/>
-          <a:lstStyle/>
-          <a:p>
-            <a:fld id="{42D6268D-2F70-4DA1-AFF2-3D6BAAA66193}" type="datetime1">
-              <a:rPr lang="en-US" altLang="zh-CN" smtClean="0"/>
-              <a:t>6/17/2019</a:t>
-            </a:fld>
-            <a:endParaRPr lang="zh-CN" altLang="en-US"/>
-          </a:p>
-        </p:txBody>
-      </p:sp>
-      <p:sp>
-        <p:nvSpPr>
-          <p:cNvPr id="5" name="页脚占位符 4">
-            <a:extLst>
-              <a:ext uri="{FF2B5EF4-FFF2-40B4-BE49-F238E27FC236}">
-                <a16:creationId xmlns:a16="http://schemas.microsoft.com/office/drawing/2014/main" id="{AF287A87-C8D0-4934-87B4-067A9D195C11}"/>
-              </a:ext>
-            </a:extLst>
-          </p:cNvPr>
-          <p:cNvSpPr>
-            <a:spLocks noGrp="1"/>
-          </p:cNvSpPr>
-          <p:nvPr>
-            <p:ph type="ftr" sz="quarter" idx="11"/>
-          </p:nvPr>
-        </p:nvSpPr>
-        <p:spPr/>
-        <p:txBody>
-          <a:bodyPr/>
-          <a:lstStyle/>
-          <a:p>
-            <a:r>
-              <a:rPr lang="en-US" altLang="zh-CN"/>
-              <a:t>Operating System Project 2</a:t>
-            </a:r>
-            <a:endParaRPr lang="zh-CN" altLang="en-US"/>
-          </a:p>
-        </p:txBody>
-      </p:sp>
-      <p:sp>
-        <p:nvSpPr>
-          <p:cNvPr id="6" name="灯片编号占位符 5">
-            <a:extLst>
-              <a:ext uri="{FF2B5EF4-FFF2-40B4-BE49-F238E27FC236}">
-                <a16:creationId xmlns:a16="http://schemas.microsoft.com/office/drawing/2014/main" id="{C0D0DF41-5D26-417E-97CF-0BC54CB4988C}"/>
-              </a:ext>
-            </a:extLst>
-          </p:cNvPr>
-          <p:cNvSpPr>
-            <a:spLocks noGrp="1"/>
-          </p:cNvSpPr>
-          <p:nvPr>
-            <p:ph type="sldNum" sz="quarter" idx="12"/>
-          </p:nvPr>
-        </p:nvSpPr>
-        <p:spPr/>
-        <p:txBody>
-          <a:bodyPr/>
-          <a:lstStyle/>
-          <a:p>
-            <a:fld id="{E65E0886-761E-4D32-A99C-70DCDA1CCD06}" type="slidenum">
-              <a:rPr lang="zh-CN" altLang="en-US" smtClean="0"/>
-              <a:t>20</a:t>
+              <a:t>29</a:t>
             </a:fld>
             <a:endParaRPr lang="zh-CN" altLang="en-US"/>
           </a:p>
@@ -7350,7 +9487,178 @@
 </p:sld>
 </file>
 
-<file path=ppt/slides/slide21.xml><?xml version="1.0" encoding="utf-8"?>
+<file path=ppt/slides/slide3.xml><?xml version="1.0" encoding="utf-8"?>
+<p:sld xmlns:a="http://schemas.openxmlformats.org/drawingml/2006/main" xmlns:r="http://schemas.openxmlformats.org/officeDocument/2006/relationships" xmlns:p="http://schemas.openxmlformats.org/presentationml/2006/main">
+  <p:cSld>
+    <p:spTree>
+      <p:nvGrpSpPr>
+        <p:cNvPr id="1" name=""/>
+        <p:cNvGrpSpPr/>
+        <p:nvPr/>
+      </p:nvGrpSpPr>
+      <p:grpSpPr>
+        <a:xfrm>
+          <a:off x="0" y="0"/>
+          <a:ext cx="0" cy="0"/>
+          <a:chOff x="0" y="0"/>
+          <a:chExt cx="0" cy="0"/>
+        </a:xfrm>
+      </p:grpSpPr>
+      <p:sp>
+        <p:nvSpPr>
+          <p:cNvPr id="4" name="标题 3">
+            <a:extLst>
+              <a:ext uri="{FF2B5EF4-FFF2-40B4-BE49-F238E27FC236}">
+                <a16:creationId xmlns:a16="http://schemas.microsoft.com/office/drawing/2014/main" id="{32E27319-DD6C-4218-9DB4-E90637939EFA}"/>
+              </a:ext>
+            </a:extLst>
+          </p:cNvPr>
+          <p:cNvSpPr>
+            <a:spLocks noGrp="1"/>
+          </p:cNvSpPr>
+          <p:nvPr>
+            <p:ph type="title"/>
+          </p:nvPr>
+        </p:nvSpPr>
+        <p:spPr/>
+        <p:txBody>
+          <a:bodyPr/>
+          <a:lstStyle/>
+          <a:p>
+            <a:r>
+              <a:rPr lang="en-US" altLang="zh-CN" dirty="0"/>
+              <a:t>Study of the Original Algorithm</a:t>
+            </a:r>
+            <a:endParaRPr lang="zh-CN" altLang="en-US" dirty="0"/>
+          </a:p>
+        </p:txBody>
+      </p:sp>
+      <p:sp>
+        <p:nvSpPr>
+          <p:cNvPr id="10" name="文本占位符 9">
+            <a:extLst>
+              <a:ext uri="{FF2B5EF4-FFF2-40B4-BE49-F238E27FC236}">
+                <a16:creationId xmlns:a16="http://schemas.microsoft.com/office/drawing/2014/main" id="{4A20F201-3FFA-4388-80A1-3FE44F8A9490}"/>
+              </a:ext>
+            </a:extLst>
+          </p:cNvPr>
+          <p:cNvSpPr>
+            <a:spLocks noGrp="1"/>
+          </p:cNvSpPr>
+          <p:nvPr>
+            <p:ph type="body" idx="1"/>
+          </p:nvPr>
+        </p:nvSpPr>
+        <p:spPr/>
+        <p:txBody>
+          <a:bodyPr/>
+          <a:lstStyle/>
+          <a:p>
+            <a:endParaRPr lang="zh-CN" altLang="en-US" dirty="0"/>
+          </a:p>
+        </p:txBody>
+      </p:sp>
+      <p:sp>
+        <p:nvSpPr>
+          <p:cNvPr id="6" name="日期占位符 5">
+            <a:extLst>
+              <a:ext uri="{FF2B5EF4-FFF2-40B4-BE49-F238E27FC236}">
+                <a16:creationId xmlns:a16="http://schemas.microsoft.com/office/drawing/2014/main" id="{86867B76-279A-41E4-9DA8-4DAEAC395B43}"/>
+              </a:ext>
+            </a:extLst>
+          </p:cNvPr>
+          <p:cNvSpPr>
+            <a:spLocks noGrp="1"/>
+          </p:cNvSpPr>
+          <p:nvPr>
+            <p:ph type="dt" sz="half" idx="10"/>
+          </p:nvPr>
+        </p:nvSpPr>
+        <p:spPr/>
+        <p:txBody>
+          <a:bodyPr/>
+          <a:lstStyle/>
+          <a:p>
+            <a:fld id="{D927A788-966E-4678-82EF-D7BCD44F7B05}" type="datetime1">
+              <a:rPr lang="en-US" altLang="zh-CN" smtClean="0"/>
+              <a:t>6/22/2019</a:t>
+            </a:fld>
+            <a:endParaRPr lang="zh-CN" altLang="en-US"/>
+          </a:p>
+        </p:txBody>
+      </p:sp>
+      <p:sp>
+        <p:nvSpPr>
+          <p:cNvPr id="7" name="页脚占位符 6">
+            <a:extLst>
+              <a:ext uri="{FF2B5EF4-FFF2-40B4-BE49-F238E27FC236}">
+                <a16:creationId xmlns:a16="http://schemas.microsoft.com/office/drawing/2014/main" id="{A8242AC7-5BA7-4BF6-9A0B-BAE08D037120}"/>
+              </a:ext>
+            </a:extLst>
+          </p:cNvPr>
+          <p:cNvSpPr>
+            <a:spLocks noGrp="1"/>
+          </p:cNvSpPr>
+          <p:nvPr>
+            <p:ph type="ftr" sz="quarter" idx="11"/>
+          </p:nvPr>
+        </p:nvSpPr>
+        <p:spPr/>
+        <p:txBody>
+          <a:bodyPr/>
+          <a:lstStyle/>
+          <a:p>
+            <a:r>
+              <a:rPr lang="en-US" altLang="zh-CN" dirty="0"/>
+              <a:t>Operating System Project 2</a:t>
+            </a:r>
+            <a:endParaRPr lang="zh-CN" altLang="en-US"/>
+          </a:p>
+        </p:txBody>
+      </p:sp>
+      <p:sp>
+        <p:nvSpPr>
+          <p:cNvPr id="8" name="灯片编号占位符 7">
+            <a:extLst>
+              <a:ext uri="{FF2B5EF4-FFF2-40B4-BE49-F238E27FC236}">
+                <a16:creationId xmlns:a16="http://schemas.microsoft.com/office/drawing/2014/main" id="{F61D872B-506D-4A84-B394-6C22B4AF3DB2}"/>
+              </a:ext>
+            </a:extLst>
+          </p:cNvPr>
+          <p:cNvSpPr>
+            <a:spLocks noGrp="1"/>
+          </p:cNvSpPr>
+          <p:nvPr>
+            <p:ph type="sldNum" sz="quarter" idx="12"/>
+          </p:nvPr>
+        </p:nvSpPr>
+        <p:spPr/>
+        <p:txBody>
+          <a:bodyPr/>
+          <a:lstStyle/>
+          <a:p>
+            <a:fld id="{E65E0886-761E-4D32-A99C-70DCDA1CCD06}" type="slidenum">
+              <a:rPr lang="zh-CN" altLang="en-US" smtClean="0"/>
+              <a:t>3</a:t>
+            </a:fld>
+            <a:endParaRPr lang="zh-CN" altLang="en-US"/>
+          </a:p>
+        </p:txBody>
+      </p:sp>
+    </p:spTree>
+    <p:extLst>
+      <p:ext uri="{BB962C8B-B14F-4D97-AF65-F5344CB8AC3E}">
+        <p14:creationId xmlns:p14="http://schemas.microsoft.com/office/powerpoint/2010/main" val="2572540360"/>
+      </p:ext>
+    </p:extLst>
+  </p:cSld>
+  <p:clrMapOvr>
+    <a:masterClrMapping/>
+  </p:clrMapOvr>
+</p:sld>
+</file>
+
+<file path=ppt/slides/slide30.xml><?xml version="1.0" encoding="utf-8"?>
 <p:sld xmlns:a="http://schemas.openxmlformats.org/drawingml/2006/main" xmlns:r="http://schemas.openxmlformats.org/officeDocument/2006/relationships" xmlns:p="http://schemas.openxmlformats.org/presentationml/2006/main">
   <p:cSld>
     <p:spTree>
@@ -7451,7 +9759,7 @@
           <a:p>
             <a:fld id="{42D6268D-2F70-4DA1-AFF2-3D6BAAA66193}" type="datetime1">
               <a:rPr lang="en-US" altLang="zh-CN" smtClean="0"/>
-              <a:t>6/17/2019</a:t>
+              <a:t>6/22/2019</a:t>
             </a:fld>
             <a:endParaRPr lang="zh-CN" altLang="en-US"/>
           </a:p>
@@ -7509,7 +9817,7 @@
           <a:p>
             <a:fld id="{E65E0886-761E-4D32-A99C-70DCDA1CCD06}" type="slidenum">
               <a:rPr lang="zh-CN" altLang="en-US" smtClean="0"/>
-              <a:t>21</a:t>
+              <a:t>30</a:t>
             </a:fld>
             <a:endParaRPr lang="zh-CN" altLang="en-US"/>
           </a:p>
@@ -7528,7 +9836,7 @@
 </p:sld>
 </file>
 
-<file path=ppt/slides/slide22.xml><?xml version="1.0" encoding="utf-8"?>
+<file path=ppt/slides/slide31.xml><?xml version="1.0" encoding="utf-8"?>
 <p:sld xmlns:a="http://schemas.openxmlformats.org/drawingml/2006/main" xmlns:r="http://schemas.openxmlformats.org/officeDocument/2006/relationships" xmlns:p="http://schemas.openxmlformats.org/presentationml/2006/main">
   <p:cSld>
     <p:spTree>
@@ -7609,7 +9917,7 @@
           <a:p>
             <a:r>
               <a:rPr lang="en-US" altLang="zh-CN" dirty="0"/>
-              <a:t>The size of active list varies more greatly in the new algorithm, compared with the original.</a:t>
+              <a:t>The size of active list varies more greatly in the LFU algorithm, compared with the original.</a:t>
             </a:r>
           </a:p>
           <a:p>
@@ -7644,7 +9952,7 @@
           <a:p>
             <a:fld id="{42D6268D-2F70-4DA1-AFF2-3D6BAAA66193}" type="datetime1">
               <a:rPr lang="en-US" altLang="zh-CN" smtClean="0"/>
-              <a:t>6/17/2019</a:t>
+              <a:t>6/22/2019</a:t>
             </a:fld>
             <a:endParaRPr lang="zh-CN" altLang="en-US"/>
           </a:p>
@@ -7702,7 +10010,7 @@
           <a:p>
             <a:fld id="{E65E0886-761E-4D32-A99C-70DCDA1CCD06}" type="slidenum">
               <a:rPr lang="zh-CN" altLang="en-US" smtClean="0"/>
-              <a:t>22</a:t>
+              <a:t>31</a:t>
             </a:fld>
             <a:endParaRPr lang="zh-CN" altLang="en-US"/>
           </a:p>
@@ -7721,7 +10029,7 @@
 </p:sld>
 </file>
 
-<file path=ppt/slides/slide23.xml><?xml version="1.0" encoding="utf-8"?>
+<file path=ppt/slides/slide32.xml><?xml version="1.0" encoding="utf-8"?>
 <p:sld xmlns:a="http://schemas.openxmlformats.org/drawingml/2006/main" xmlns:r="http://schemas.openxmlformats.org/officeDocument/2006/relationships" xmlns:p="http://schemas.openxmlformats.org/presentationml/2006/main">
   <p:cSld>
     <p:spTree>
@@ -8007,7 +10315,7 @@
           <a:p>
             <a:fld id="{42D6268D-2F70-4DA1-AFF2-3D6BAAA66193}" type="datetime1">
               <a:rPr lang="en-US" altLang="zh-CN" smtClean="0"/>
-              <a:t>6/17/2019</a:t>
+              <a:t>6/22/2019</a:t>
             </a:fld>
             <a:endParaRPr lang="zh-CN" altLang="en-US"/>
           </a:p>
@@ -8065,7 +10373,7 @@
           <a:p>
             <a:fld id="{E65E0886-761E-4D32-A99C-70DCDA1CCD06}" type="slidenum">
               <a:rPr lang="zh-CN" altLang="en-US" smtClean="0"/>
-              <a:t>23</a:t>
+              <a:t>32</a:t>
             </a:fld>
             <a:endParaRPr lang="zh-CN" altLang="en-US"/>
           </a:p>
@@ -8084,7 +10392,7 @@
 </p:sld>
 </file>
 
-<file path=ppt/slides/slide24.xml><?xml version="1.0" encoding="utf-8"?>
+<file path=ppt/slides/slide33.xml><?xml version="1.0" encoding="utf-8"?>
 <p:sld xmlns:a="http://schemas.openxmlformats.org/drawingml/2006/main" xmlns:r="http://schemas.openxmlformats.org/officeDocument/2006/relationships" xmlns:p="http://schemas.openxmlformats.org/presentationml/2006/main">
   <p:cSld>
     <p:spTree>
@@ -8182,7 +10490,7 @@
           <a:p>
             <a:fld id="{42D6268D-2F70-4DA1-AFF2-3D6BAAA66193}" type="datetime1">
               <a:rPr lang="en-US" altLang="zh-CN" smtClean="0"/>
-              <a:t>6/17/2019</a:t>
+              <a:t>6/22/2019</a:t>
             </a:fld>
             <a:endParaRPr lang="zh-CN" altLang="en-US"/>
           </a:p>
@@ -8240,7 +10548,7 @@
           <a:p>
             <a:fld id="{E65E0886-761E-4D32-A99C-70DCDA1CCD06}" type="slidenum">
               <a:rPr lang="zh-CN" altLang="en-US" smtClean="0"/>
-              <a:t>24</a:t>
+              <a:t>33</a:t>
             </a:fld>
             <a:endParaRPr lang="zh-CN" altLang="en-US"/>
           </a:p>
@@ -8259,7 +10567,7 @@
 </p:sld>
 </file>
 
-<file path=ppt/slides/slide25.xml><?xml version="1.0" encoding="utf-8"?>
+<file path=ppt/slides/slide34.xml><?xml version="1.0" encoding="utf-8"?>
 <p:sld xmlns:a="http://schemas.openxmlformats.org/drawingml/2006/main" xmlns:r="http://schemas.openxmlformats.org/officeDocument/2006/relationships" xmlns:p="http://schemas.openxmlformats.org/presentationml/2006/main">
   <p:cSld>
     <p:spTree>
@@ -8299,34 +10607,38 @@
           <a:p>
             <a:r>
               <a:rPr lang="en-US" altLang="zh-CN" dirty="0"/>
+              <a:t>The End</a:t>
+            </a:r>
+            <a:endParaRPr lang="zh-CN" altLang="en-US" dirty="0"/>
+          </a:p>
+        </p:txBody>
+      </p:sp>
+      <p:sp>
+        <p:nvSpPr>
+          <p:cNvPr id="8" name="文本占位符 7">
+            <a:extLst>
+              <a:ext uri="{FF2B5EF4-FFF2-40B4-BE49-F238E27FC236}">
+                <a16:creationId xmlns:a16="http://schemas.microsoft.com/office/drawing/2014/main" id="{3F7946D1-8A7F-4006-AE28-16C777254F89}"/>
+              </a:ext>
+            </a:extLst>
+          </p:cNvPr>
+          <p:cNvSpPr>
+            <a:spLocks noGrp="1"/>
+          </p:cNvSpPr>
+          <p:nvPr>
+            <p:ph type="body" idx="1"/>
+          </p:nvPr>
+        </p:nvSpPr>
+        <p:spPr/>
+        <p:txBody>
+          <a:bodyPr/>
+          <a:lstStyle/>
+          <a:p>
+            <a:r>
+              <a:rPr lang="en-US" altLang="zh-CN" dirty="0"/>
               <a:t>Thanks</a:t>
             </a:r>
             <a:endParaRPr lang="zh-CN" altLang="en-US" dirty="0"/>
-          </a:p>
-        </p:txBody>
-      </p:sp>
-      <p:sp>
-        <p:nvSpPr>
-          <p:cNvPr id="8" name="文本占位符 7">
-            <a:extLst>
-              <a:ext uri="{FF2B5EF4-FFF2-40B4-BE49-F238E27FC236}">
-                <a16:creationId xmlns:a16="http://schemas.microsoft.com/office/drawing/2014/main" id="{3F7946D1-8A7F-4006-AE28-16C777254F89}"/>
-              </a:ext>
-            </a:extLst>
-          </p:cNvPr>
-          <p:cNvSpPr>
-            <a:spLocks noGrp="1"/>
-          </p:cNvSpPr>
-          <p:nvPr>
-            <p:ph type="body" idx="1"/>
-          </p:nvPr>
-        </p:nvSpPr>
-        <p:spPr/>
-        <p:txBody>
-          <a:bodyPr/>
-          <a:lstStyle/>
-          <a:p>
-            <a:endParaRPr lang="zh-CN" altLang="en-US"/>
           </a:p>
         </p:txBody>
       </p:sp>
@@ -8353,7 +10665,7 @@
           <a:p>
             <a:fld id="{42D6268D-2F70-4DA1-AFF2-3D6BAAA66193}" type="datetime1">
               <a:rPr lang="en-US" altLang="zh-CN" smtClean="0"/>
-              <a:t>6/17/2019</a:t>
+              <a:t>6/22/2019</a:t>
             </a:fld>
             <a:endParaRPr lang="zh-CN" altLang="en-US"/>
           </a:p>
@@ -8411,7 +10723,7 @@
           <a:p>
             <a:fld id="{E65E0886-761E-4D32-A99C-70DCDA1CCD06}" type="slidenum">
               <a:rPr lang="zh-CN" altLang="en-US" smtClean="0"/>
-              <a:t>25</a:t>
+              <a:t>34</a:t>
             </a:fld>
             <a:endParaRPr lang="zh-CN" altLang="en-US"/>
           </a:p>
@@ -8421,177 +10733,6 @@
     <p:extLst>
       <p:ext uri="{BB962C8B-B14F-4D97-AF65-F5344CB8AC3E}">
         <p14:creationId xmlns:p14="http://schemas.microsoft.com/office/powerpoint/2010/main" val="1333876050"/>
-      </p:ext>
-    </p:extLst>
-  </p:cSld>
-  <p:clrMapOvr>
-    <a:masterClrMapping/>
-  </p:clrMapOvr>
-</p:sld>
-</file>
-
-<file path=ppt/slides/slide3.xml><?xml version="1.0" encoding="utf-8"?>
-<p:sld xmlns:a="http://schemas.openxmlformats.org/drawingml/2006/main" xmlns:r="http://schemas.openxmlformats.org/officeDocument/2006/relationships" xmlns:p="http://schemas.openxmlformats.org/presentationml/2006/main">
-  <p:cSld>
-    <p:spTree>
-      <p:nvGrpSpPr>
-        <p:cNvPr id="1" name=""/>
-        <p:cNvGrpSpPr/>
-        <p:nvPr/>
-      </p:nvGrpSpPr>
-      <p:grpSpPr>
-        <a:xfrm>
-          <a:off x="0" y="0"/>
-          <a:ext cx="0" cy="0"/>
-          <a:chOff x="0" y="0"/>
-          <a:chExt cx="0" cy="0"/>
-        </a:xfrm>
-      </p:grpSpPr>
-      <p:sp>
-        <p:nvSpPr>
-          <p:cNvPr id="4" name="标题 3">
-            <a:extLst>
-              <a:ext uri="{FF2B5EF4-FFF2-40B4-BE49-F238E27FC236}">
-                <a16:creationId xmlns:a16="http://schemas.microsoft.com/office/drawing/2014/main" id="{32E27319-DD6C-4218-9DB4-E90637939EFA}"/>
-              </a:ext>
-            </a:extLst>
-          </p:cNvPr>
-          <p:cNvSpPr>
-            <a:spLocks noGrp="1"/>
-          </p:cNvSpPr>
-          <p:nvPr>
-            <p:ph type="title"/>
-          </p:nvPr>
-        </p:nvSpPr>
-        <p:spPr/>
-        <p:txBody>
-          <a:bodyPr/>
-          <a:lstStyle/>
-          <a:p>
-            <a:r>
-              <a:rPr lang="en-US" altLang="zh-CN" dirty="0"/>
-              <a:t>Study of the Original Algorithm</a:t>
-            </a:r>
-            <a:endParaRPr lang="zh-CN" altLang="en-US" dirty="0"/>
-          </a:p>
-        </p:txBody>
-      </p:sp>
-      <p:sp>
-        <p:nvSpPr>
-          <p:cNvPr id="10" name="文本占位符 9">
-            <a:extLst>
-              <a:ext uri="{FF2B5EF4-FFF2-40B4-BE49-F238E27FC236}">
-                <a16:creationId xmlns:a16="http://schemas.microsoft.com/office/drawing/2014/main" id="{4A20F201-3FFA-4388-80A1-3FE44F8A9490}"/>
-              </a:ext>
-            </a:extLst>
-          </p:cNvPr>
-          <p:cNvSpPr>
-            <a:spLocks noGrp="1"/>
-          </p:cNvSpPr>
-          <p:nvPr>
-            <p:ph type="body" idx="1"/>
-          </p:nvPr>
-        </p:nvSpPr>
-        <p:spPr/>
-        <p:txBody>
-          <a:bodyPr/>
-          <a:lstStyle/>
-          <a:p>
-            <a:endParaRPr lang="zh-CN" altLang="en-US" dirty="0"/>
-          </a:p>
-        </p:txBody>
-      </p:sp>
-      <p:sp>
-        <p:nvSpPr>
-          <p:cNvPr id="6" name="日期占位符 5">
-            <a:extLst>
-              <a:ext uri="{FF2B5EF4-FFF2-40B4-BE49-F238E27FC236}">
-                <a16:creationId xmlns:a16="http://schemas.microsoft.com/office/drawing/2014/main" id="{86867B76-279A-41E4-9DA8-4DAEAC395B43}"/>
-              </a:ext>
-            </a:extLst>
-          </p:cNvPr>
-          <p:cNvSpPr>
-            <a:spLocks noGrp="1"/>
-          </p:cNvSpPr>
-          <p:nvPr>
-            <p:ph type="dt" sz="half" idx="10"/>
-          </p:nvPr>
-        </p:nvSpPr>
-        <p:spPr/>
-        <p:txBody>
-          <a:bodyPr/>
-          <a:lstStyle/>
-          <a:p>
-            <a:fld id="{D927A788-966E-4678-82EF-D7BCD44F7B05}" type="datetime1">
-              <a:rPr lang="en-US" altLang="zh-CN" smtClean="0"/>
-              <a:t>6/17/2019</a:t>
-            </a:fld>
-            <a:endParaRPr lang="zh-CN" altLang="en-US"/>
-          </a:p>
-        </p:txBody>
-      </p:sp>
-      <p:sp>
-        <p:nvSpPr>
-          <p:cNvPr id="7" name="页脚占位符 6">
-            <a:extLst>
-              <a:ext uri="{FF2B5EF4-FFF2-40B4-BE49-F238E27FC236}">
-                <a16:creationId xmlns:a16="http://schemas.microsoft.com/office/drawing/2014/main" id="{A8242AC7-5BA7-4BF6-9A0B-BAE08D037120}"/>
-              </a:ext>
-            </a:extLst>
-          </p:cNvPr>
-          <p:cNvSpPr>
-            <a:spLocks noGrp="1"/>
-          </p:cNvSpPr>
-          <p:nvPr>
-            <p:ph type="ftr" sz="quarter" idx="11"/>
-          </p:nvPr>
-        </p:nvSpPr>
-        <p:spPr/>
-        <p:txBody>
-          <a:bodyPr/>
-          <a:lstStyle/>
-          <a:p>
-            <a:r>
-              <a:rPr lang="en-US" altLang="zh-CN" dirty="0"/>
-              <a:t>Operating System Project 2</a:t>
-            </a:r>
-            <a:endParaRPr lang="zh-CN" altLang="en-US"/>
-          </a:p>
-        </p:txBody>
-      </p:sp>
-      <p:sp>
-        <p:nvSpPr>
-          <p:cNvPr id="8" name="灯片编号占位符 7">
-            <a:extLst>
-              <a:ext uri="{FF2B5EF4-FFF2-40B4-BE49-F238E27FC236}">
-                <a16:creationId xmlns:a16="http://schemas.microsoft.com/office/drawing/2014/main" id="{F61D872B-506D-4A84-B394-6C22B4AF3DB2}"/>
-              </a:ext>
-            </a:extLst>
-          </p:cNvPr>
-          <p:cNvSpPr>
-            <a:spLocks noGrp="1"/>
-          </p:cNvSpPr>
-          <p:nvPr>
-            <p:ph type="sldNum" sz="quarter" idx="12"/>
-          </p:nvPr>
-        </p:nvSpPr>
-        <p:spPr/>
-        <p:txBody>
-          <a:bodyPr/>
-          <a:lstStyle/>
-          <a:p>
-            <a:fld id="{E65E0886-761E-4D32-A99C-70DCDA1CCD06}" type="slidenum">
-              <a:rPr lang="zh-CN" altLang="en-US" smtClean="0"/>
-              <a:t>3</a:t>
-            </a:fld>
-            <a:endParaRPr lang="zh-CN" altLang="en-US"/>
-          </a:p>
-        </p:txBody>
-      </p:sp>
-    </p:spTree>
-    <p:extLst>
-      <p:ext uri="{BB962C8B-B14F-4D97-AF65-F5344CB8AC3E}">
-        <p14:creationId xmlns:p14="http://schemas.microsoft.com/office/powerpoint/2010/main" val="2572540360"/>
       </p:ext>
     </p:extLst>
   </p:cSld>
@@ -8670,7 +10811,7 @@
           <a:p>
             <a:fld id="{6EBD23C6-F2C2-4AB5-A395-5C9CE18441C7}" type="datetime1">
               <a:rPr lang="en-US" altLang="zh-CN" smtClean="0"/>
-              <a:t>6/17/2019</a:t>
+              <a:t>6/22/2019</a:t>
             </a:fld>
             <a:endParaRPr lang="zh-CN" altLang="en-US"/>
           </a:p>
@@ -8853,7 +10994,7 @@
           <a:p>
             <a:fld id="{42D6268D-2F70-4DA1-AFF2-3D6BAAA66193}" type="datetime1">
               <a:rPr lang="en-US" altLang="zh-CN" smtClean="0"/>
-              <a:t>6/17/2019</a:t>
+              <a:t>6/22/2019</a:t>
             </a:fld>
             <a:endParaRPr lang="zh-CN" altLang="en-US"/>
           </a:p>
@@ -10082,7 +12223,7 @@
           <a:p>
             <a:fld id="{D03CE57E-267A-40BB-806F-75094D4A2095}" type="datetime1">
               <a:rPr lang="en-US" altLang="zh-CN" smtClean="0"/>
-              <a:t>6/17/2019</a:t>
+              <a:t>6/22/2019</a:t>
             </a:fld>
             <a:endParaRPr lang="zh-CN" altLang="en-US"/>
           </a:p>
@@ -10199,7 +12340,7 @@
           <a:p>
             <a:fld id="{D03CE57E-267A-40BB-806F-75094D4A2095}" type="datetime1">
               <a:rPr lang="en-US" altLang="zh-CN" smtClean="0"/>
-              <a:t>6/17/2019</a:t>
+              <a:t>6/22/2019</a:t>
             </a:fld>
             <a:endParaRPr lang="zh-CN" altLang="en-US"/>
           </a:p>
@@ -11668,7 +13809,7 @@
             </a:pPr>
             <a:r>
               <a:rPr lang="en-US" altLang="zh-CN" b="1" dirty="0"/>
-              <a:t>Memory Zone</a:t>
+              <a:t>Zone</a:t>
             </a:r>
             <a:r>
               <a:rPr lang="en-US" altLang="zh-CN" dirty="0"/>
@@ -11708,7 +13849,7 @@
           <a:p>
             <a:fld id="{42D6268D-2F70-4DA1-AFF2-3D6BAAA66193}" type="datetime1">
               <a:rPr lang="en-US" altLang="zh-CN" smtClean="0"/>
-              <a:t>6/17/2019</a:t>
+              <a:t>6/22/2019</a:t>
             </a:fld>
             <a:endParaRPr lang="zh-CN" altLang="en-US" dirty="0"/>
           </a:p>
@@ -12145,10 +14286,10 @@
       </p:grpSpPr>
       <p:sp>
         <p:nvSpPr>
-          <p:cNvPr id="7" name="标题 6">
-            <a:extLst>
-              <a:ext uri="{FF2B5EF4-FFF2-40B4-BE49-F238E27FC236}">
-                <a16:creationId xmlns:a16="http://schemas.microsoft.com/office/drawing/2014/main" id="{77DA6B27-A31C-49A3-998F-46654B95F93A}"/>
+          <p:cNvPr id="8" name="标题 7">
+            <a:extLst>
+              <a:ext uri="{FF2B5EF4-FFF2-40B4-BE49-F238E27FC236}">
+                <a16:creationId xmlns:a16="http://schemas.microsoft.com/office/drawing/2014/main" id="{17CF39B1-D7D1-4257-B47A-904584FB25F6}"/>
               </a:ext>
             </a:extLst>
           </p:cNvPr>
@@ -12166,7 +14307,7 @@
           <a:p>
             <a:r>
               <a:rPr lang="en-US" altLang="zh-CN" dirty="0"/>
-              <a:t>Changing to an LFU-Based Algorithm</a:t>
+              <a:t>Changing to a New LRU Algorithm</a:t>
             </a:r>
             <a:endParaRPr lang="zh-CN" altLang="en-US" dirty="0"/>
           </a:p>
@@ -12174,10 +14315,10 @@
       </p:sp>
       <p:sp>
         <p:nvSpPr>
-          <p:cNvPr id="8" name="文本占位符 7">
-            <a:extLst>
-              <a:ext uri="{FF2B5EF4-FFF2-40B4-BE49-F238E27FC236}">
-                <a16:creationId xmlns:a16="http://schemas.microsoft.com/office/drawing/2014/main" id="{A7B254E2-9276-4FAB-A224-3E0E3DFF2181}"/>
+          <p:cNvPr id="9" name="文本占位符 8">
+            <a:extLst>
+              <a:ext uri="{FF2B5EF4-FFF2-40B4-BE49-F238E27FC236}">
+                <a16:creationId xmlns:a16="http://schemas.microsoft.com/office/drawing/2014/main" id="{8F911D56-93EC-4BDB-97A6-5014C6C92971}"/>
               </a:ext>
             </a:extLst>
           </p:cNvPr>
@@ -12193,16 +14334,16 @@
           <a:bodyPr/>
           <a:lstStyle/>
           <a:p>
-            <a:endParaRPr lang="zh-CN" altLang="en-US" dirty="0"/>
-          </a:p>
-        </p:txBody>
-      </p:sp>
-      <p:sp>
-        <p:nvSpPr>
-          <p:cNvPr id="4" name="日期占位符 3">
-            <a:extLst>
-              <a:ext uri="{FF2B5EF4-FFF2-40B4-BE49-F238E27FC236}">
-                <a16:creationId xmlns:a16="http://schemas.microsoft.com/office/drawing/2014/main" id="{69FDAFF2-43C5-4036-A4F6-4FE193AA9E20}"/>
+            <a:endParaRPr lang="zh-CN" altLang="en-US"/>
+          </a:p>
+        </p:txBody>
+      </p:sp>
+      <p:sp>
+        <p:nvSpPr>
+          <p:cNvPr id="5" name="日期占位符 4">
+            <a:extLst>
+              <a:ext uri="{FF2B5EF4-FFF2-40B4-BE49-F238E27FC236}">
+                <a16:creationId xmlns:a16="http://schemas.microsoft.com/office/drawing/2014/main" id="{B7363097-CB73-4869-9CF6-59BD3514563A}"/>
               </a:ext>
             </a:extLst>
           </p:cNvPr>
@@ -12218,9 +14359,9 @@
           <a:bodyPr/>
           <a:lstStyle/>
           <a:p>
-            <a:fld id="{42D6268D-2F70-4DA1-AFF2-3D6BAAA66193}" type="datetime1">
+            <a:fld id="{D03CE57E-267A-40BB-806F-75094D4A2095}" type="datetime1">
               <a:rPr lang="en-US" altLang="zh-CN" smtClean="0"/>
-              <a:t>6/17/2019</a:t>
+              <a:t>6/22/2019</a:t>
             </a:fld>
             <a:endParaRPr lang="zh-CN" altLang="en-US"/>
           </a:p>
@@ -12228,10 +14369,10 @@
       </p:sp>
       <p:sp>
         <p:nvSpPr>
-          <p:cNvPr id="5" name="页脚占位符 4">
-            <a:extLst>
-              <a:ext uri="{FF2B5EF4-FFF2-40B4-BE49-F238E27FC236}">
-                <a16:creationId xmlns:a16="http://schemas.microsoft.com/office/drawing/2014/main" id="{70CD3E0D-A2B3-4691-906A-C7060A65EB94}"/>
+          <p:cNvPr id="6" name="页脚占位符 5">
+            <a:extLst>
+              <a:ext uri="{FF2B5EF4-FFF2-40B4-BE49-F238E27FC236}">
+                <a16:creationId xmlns:a16="http://schemas.microsoft.com/office/drawing/2014/main" id="{3664B76C-72C1-4E73-B69C-B721E5E4F6D8}"/>
               </a:ext>
             </a:extLst>
           </p:cNvPr>
@@ -12248,7 +14389,7 @@
           <a:lstStyle/>
           <a:p>
             <a:r>
-              <a:rPr lang="en-US" altLang="zh-CN" dirty="0"/>
+              <a:rPr lang="en-US" altLang="zh-CN"/>
               <a:t>Operating System Project 2</a:t>
             </a:r>
             <a:endParaRPr lang="zh-CN" altLang="en-US"/>
@@ -12257,10 +14398,10 @@
       </p:sp>
       <p:sp>
         <p:nvSpPr>
-          <p:cNvPr id="6" name="灯片编号占位符 5">
-            <a:extLst>
-              <a:ext uri="{FF2B5EF4-FFF2-40B4-BE49-F238E27FC236}">
-                <a16:creationId xmlns:a16="http://schemas.microsoft.com/office/drawing/2014/main" id="{B877B92B-3651-4DE7-8B3B-437FF0C3EC29}"/>
+          <p:cNvPr id="7" name="灯片编号占位符 6">
+            <a:extLst>
+              <a:ext uri="{FF2B5EF4-FFF2-40B4-BE49-F238E27FC236}">
+                <a16:creationId xmlns:a16="http://schemas.microsoft.com/office/drawing/2014/main" id="{F875A9F4-BFBE-4DE7-BA97-1174E7C2E04B}"/>
               </a:ext>
             </a:extLst>
           </p:cNvPr>
@@ -12287,7 +14428,7 @@
     </p:spTree>
     <p:extLst>
       <p:ext uri="{BB962C8B-B14F-4D97-AF65-F5344CB8AC3E}">
-        <p14:creationId xmlns:p14="http://schemas.microsoft.com/office/powerpoint/2010/main" val="53803386"/>
+        <p14:creationId xmlns:p14="http://schemas.microsoft.com/office/powerpoint/2010/main" val="1662207622"/>
       </p:ext>
     </p:extLst>
   </p:cSld>

</xml_diff>

<commit_message>
Final version of pre.
</commit_message>
<xml_diff>
--- a/Project2/prj2pre.pptx
+++ b/Project2/prj2pre.pptx
@@ -230,7 +230,7 @@
           <a:p>
             <a:fld id="{381AE319-54B2-4E7D-A7DE-C129642D9372}" type="datetimeFigureOut">
               <a:rPr lang="zh-CN" altLang="en-US" smtClean="0"/>
-              <a:t>2019/6/22</a:t>
+              <a:t>2019/6/23</a:t>
             </a:fld>
             <a:endParaRPr lang="zh-CN" altLang="en-US"/>
           </a:p>
@@ -687,7 +687,7 @@
           <a:p>
             <a:fld id="{5D3A1078-3DED-4C23-8D1E-0FD29ACCB236}" type="datetime1">
               <a:rPr lang="en-US" altLang="zh-CN" smtClean="0"/>
-              <a:t>6/22/2019</a:t>
+              <a:t>6/23/2019</a:t>
             </a:fld>
             <a:endParaRPr lang="zh-CN" altLang="en-US"/>
           </a:p>
@@ -937,7 +937,7 @@
           <a:p>
             <a:fld id="{D738D431-F424-4476-81D7-C94BC7E6A0F0}" type="datetime1">
               <a:rPr lang="en-US" altLang="zh-CN" smtClean="0"/>
-              <a:t>6/22/2019</a:t>
+              <a:t>6/23/2019</a:t>
             </a:fld>
             <a:endParaRPr lang="zh-CN" altLang="en-US"/>
           </a:p>
@@ -1199,7 +1199,7 @@
           <a:p>
             <a:fld id="{5673D9D3-A427-442F-95AC-4A8D99DB73A3}" type="datetime1">
               <a:rPr lang="en-US" altLang="zh-CN" smtClean="0"/>
-              <a:t>6/22/2019</a:t>
+              <a:t>6/23/2019</a:t>
             </a:fld>
             <a:endParaRPr lang="zh-CN" altLang="en-US"/>
           </a:p>
@@ -1405,7 +1405,7 @@
           <a:p>
             <a:fld id="{42D6268D-2F70-4DA1-AFF2-3D6BAAA66193}" type="datetime1">
               <a:rPr lang="en-US" altLang="zh-CN" smtClean="0"/>
-              <a:t>6/22/2019</a:t>
+              <a:t>6/23/2019</a:t>
             </a:fld>
             <a:endParaRPr lang="zh-CN" altLang="en-US"/>
           </a:p>
@@ -1708,7 +1708,7 @@
           <a:p>
             <a:fld id="{832FBCBD-8421-4E2E-9FC7-E5C14DCBF41E}" type="datetime1">
               <a:rPr lang="en-US" altLang="zh-CN" smtClean="0"/>
-              <a:t>6/22/2019</a:t>
+              <a:t>6/23/2019</a:t>
             </a:fld>
             <a:endParaRPr lang="zh-CN" altLang="en-US"/>
           </a:p>
@@ -2025,7 +2025,7 @@
           <a:p>
             <a:fld id="{D03CE57E-267A-40BB-806F-75094D4A2095}" type="datetime1">
               <a:rPr lang="en-US" altLang="zh-CN" smtClean="0"/>
-              <a:t>6/22/2019</a:t>
+              <a:t>6/23/2019</a:t>
             </a:fld>
             <a:endParaRPr lang="zh-CN" altLang="en-US"/>
           </a:p>
@@ -2408,7 +2408,7 @@
           <a:p>
             <a:fld id="{F5D01026-E108-4AC1-8BD0-671D6390BCA8}" type="datetime1">
               <a:rPr lang="en-US" altLang="zh-CN" smtClean="0"/>
-              <a:t>6/22/2019</a:t>
+              <a:t>6/23/2019</a:t>
             </a:fld>
             <a:endParaRPr lang="zh-CN" altLang="en-US"/>
           </a:p>
@@ -2530,7 +2530,7 @@
           <a:p>
             <a:fld id="{53229592-1EDE-4376-A776-52E6F6611B9D}" type="datetime1">
               <a:rPr lang="en-US" altLang="zh-CN" smtClean="0"/>
-              <a:t>6/22/2019</a:t>
+              <a:t>6/23/2019</a:t>
             </a:fld>
             <a:endParaRPr lang="zh-CN" altLang="en-US"/>
           </a:p>
@@ -2707,7 +2707,7 @@
           <a:p>
             <a:fld id="{4BD7FCF5-BF71-45E0-B538-2F8CBB745C5C}" type="datetime1">
               <a:rPr lang="en-US" altLang="zh-CN" smtClean="0"/>
-              <a:t>6/22/2019</a:t>
+              <a:t>6/23/2019</a:t>
             </a:fld>
             <a:endParaRPr lang="zh-CN" altLang="en-US"/>
           </a:p>
@@ -3067,7 +3067,7 @@
           <a:p>
             <a:fld id="{070B7305-538A-4350-A4CA-8090D9E2C75F}" type="datetime1">
               <a:rPr lang="en-US" altLang="zh-CN" smtClean="0"/>
-              <a:t>6/22/2019</a:t>
+              <a:t>6/23/2019</a:t>
             </a:fld>
             <a:endParaRPr lang="zh-CN" altLang="en-US"/>
           </a:p>
@@ -3450,7 +3450,7 @@
           <a:p>
             <a:fld id="{AD210078-1402-4F42-9824-4719B5ED631B}" type="datetime1">
               <a:rPr lang="en-US" altLang="zh-CN" smtClean="0"/>
-              <a:t>6/22/2019</a:t>
+              <a:t>6/23/2019</a:t>
             </a:fld>
             <a:endParaRPr lang="zh-CN" altLang="en-US"/>
           </a:p>
@@ -3743,7 +3743,7 @@
           <a:p>
             <a:fld id="{01A8D15C-AF12-47A7-A90E-2315D48B3496}" type="datetime1">
               <a:rPr lang="en-US" altLang="zh-CN" smtClean="0"/>
-              <a:t>6/22/2019</a:t>
+              <a:t>6/23/2019</a:t>
             </a:fld>
             <a:endParaRPr lang="zh-CN" altLang="en-US"/>
           </a:p>
@@ -4449,7 +4449,7 @@
           <a:p>
             <a:fld id="{832FBCBD-8421-4E2E-9FC7-E5C14DCBF41E}" type="datetime1">
               <a:rPr lang="en-US" altLang="zh-CN" smtClean="0"/>
-              <a:t>6/22/2019</a:t>
+              <a:t>6/23/2019</a:t>
             </a:fld>
             <a:endParaRPr lang="zh-CN" altLang="en-US"/>
           </a:p>
@@ -4588,7 +4588,7 @@
             <p:ph idx="1"/>
             <p:extLst>
               <p:ext uri="{D42A27DB-BD31-4B8C-83A1-F6EECF244321}">
-                <p14:modId xmlns:p14="http://schemas.microsoft.com/office/powerpoint/2010/main" val="80502303"/>
+                <p14:modId xmlns:p14="http://schemas.microsoft.com/office/powerpoint/2010/main" val="1994670886"/>
               </p:ext>
             </p:extLst>
           </p:nvPr>
@@ -4683,7 +4683,7 @@
                     <a:p>
                       <a:r>
                         <a:rPr lang="en-US" altLang="zh-CN" dirty="0"/>
-                        <a:t>Access page</a:t>
+                        <a:t>Renew page</a:t>
                       </a:r>
                       <a:endParaRPr lang="zh-CN" altLang="en-US" dirty="0"/>
                     </a:p>
@@ -4881,7 +4881,7 @@
           <a:p>
             <a:fld id="{832FBCBD-8421-4E2E-9FC7-E5C14DCBF41E}" type="datetime1">
               <a:rPr lang="en-US" altLang="zh-CN" smtClean="0"/>
-              <a:t>6/22/2019</a:t>
+              <a:t>6/23/2019</a:t>
             </a:fld>
             <a:endParaRPr lang="zh-CN" altLang="en-US"/>
           </a:p>
@@ -5236,8 +5236,8 @@
           </a:p>
         </p:txBody>
       </p:sp>
-      <mc:AlternateContent xmlns:mc="http://schemas.openxmlformats.org/markup-compatibility/2006">
-        <mc:Choice xmlns:a14="http://schemas.microsoft.com/office/drawing/2010/main" Requires="a14">
+      <mc:AlternateContent xmlns:mc="http://schemas.openxmlformats.org/markup-compatibility/2006" xmlns:a14="http://schemas.microsoft.com/office/drawing/2010/main">
+        <mc:Choice Requires="a14">
           <p:sp>
             <p:nvSpPr>
               <p:cNvPr id="3" name="内容占位符 2">
@@ -5347,10 +5347,6 @@
                 </a:r>
               </a:p>
               <a:p>
-                <a:r>
-                  <a:rPr lang="en-US" altLang="zh-CN" b="0" dirty="0"/>
-                  <a:t>It’s </a:t>
-                </a:r>
                 <a14:m>
                   <m:oMath xmlns:m="http://schemas.openxmlformats.org/officeDocument/2006/math">
                     <m:r>
@@ -5375,13 +5371,13 @@
                 </a14:m>
                 <a:r>
                   <a:rPr lang="en-US" altLang="zh-CN" dirty="0"/>
-                  <a:t> that affects list sizes.</a:t>
+                  <a:t> may affect list sizes.</a:t>
                 </a:r>
               </a:p>
             </p:txBody>
           </p:sp>
         </mc:Choice>
-        <mc:Fallback>
+        <mc:Fallback xmlns="">
           <p:sp>
             <p:nvSpPr>
               <p:cNvPr id="3" name="内容占位符 2">
@@ -5444,7 +5440,7 @@
           <a:p>
             <a:fld id="{42D6268D-2F70-4DA1-AFF2-3D6BAAA66193}" type="datetime1">
               <a:rPr lang="en-US" altLang="zh-CN" smtClean="0"/>
-              <a:t>6/22/2019</a:t>
+              <a:t>6/23/2019</a:t>
             </a:fld>
             <a:endParaRPr lang="zh-CN" altLang="en-US" dirty="0"/>
           </a:p>
@@ -5619,7 +5615,7 @@
           <a:p>
             <a:fld id="{42D6268D-2F70-4DA1-AFF2-3D6BAAA66193}" type="datetime1">
               <a:rPr lang="en-US" altLang="zh-CN" smtClean="0"/>
-              <a:t>6/22/2019</a:t>
+              <a:t>6/23/2019</a:t>
             </a:fld>
             <a:endParaRPr lang="zh-CN" altLang="en-US"/>
           </a:p>
@@ -5822,7 +5818,7 @@
           <a:p>
             <a:fld id="{42D6268D-2F70-4DA1-AFF2-3D6BAAA66193}" type="datetime1">
               <a:rPr lang="en-US" altLang="zh-CN" smtClean="0"/>
-              <a:t>6/22/2019</a:t>
+              <a:t>6/23/2019</a:t>
             </a:fld>
             <a:endParaRPr lang="zh-CN" altLang="en-US"/>
           </a:p>
@@ -5984,15 +5980,34 @@
             </a:r>
             <a:r>
               <a:rPr lang="en-US" altLang="zh-CN" dirty="0"/>
-              <a:t>, which kills processes to reclaim memory space.</a:t>
+              <a:t>, which kills processes to reclaim memory space. The test process is then terminated. </a:t>
             </a:r>
           </a:p>
           <a:p>
             <a:r>
               <a:rPr lang="en-US" altLang="zh-CN" dirty="0"/>
-              <a:t>The test program can no longer run while the pages are being reclaimed.</a:t>
-            </a:r>
-            <a:endParaRPr lang="zh-CN" altLang="en-US" dirty="0"/>
+              <a:t>List sizes change differently for </a:t>
+            </a:r>
+            <a:r>
+              <a:rPr lang="en-US" altLang="zh-CN" dirty="0" err="1">
+                <a:latin typeface="Consolas" panose="020B0609020204030204" pitchFamily="49" charset="0"/>
+              </a:rPr>
+              <a:t>mmap</a:t>
+            </a:r>
+            <a:r>
+              <a:rPr lang="en-US" altLang="zh-CN" dirty="0"/>
+              <a:t> and </a:t>
+            </a:r>
+            <a:r>
+              <a:rPr lang="en-US" altLang="zh-CN" dirty="0">
+                <a:latin typeface="Consolas" panose="020B0609020204030204" pitchFamily="49" charset="0"/>
+              </a:rPr>
+              <a:t>malloc</a:t>
+            </a:r>
+            <a:r>
+              <a:rPr lang="en-US" altLang="zh-CN" dirty="0"/>
+              <a:t>.</a:t>
+            </a:r>
           </a:p>
         </p:txBody>
       </p:sp>
@@ -6019,7 +6034,7 @@
           <a:p>
             <a:fld id="{42D6268D-2F70-4DA1-AFF2-3D6BAAA66193}" type="datetime1">
               <a:rPr lang="en-US" altLang="zh-CN" smtClean="0"/>
-              <a:t>6/22/2019</a:t>
+              <a:t>6/23/2019</a:t>
             </a:fld>
             <a:endParaRPr lang="zh-CN" altLang="en-US"/>
           </a:p>
@@ -6197,7 +6212,7 @@
           <a:p>
             <a:fld id="{42D6268D-2F70-4DA1-AFF2-3D6BAAA66193}" type="datetime1">
               <a:rPr lang="en-US" altLang="zh-CN" smtClean="0"/>
-              <a:t>6/22/2019</a:t>
+              <a:t>6/23/2019</a:t>
             </a:fld>
             <a:endParaRPr lang="zh-CN" altLang="en-US"/>
           </a:p>
@@ -6609,7 +6624,7 @@
           <a:p>
             <a:fld id="{42D6268D-2F70-4DA1-AFF2-3D6BAAA66193}" type="datetime1">
               <a:rPr lang="en-US" altLang="zh-CN" smtClean="0"/>
-              <a:t>6/22/2019</a:t>
+              <a:t>6/23/2019</a:t>
             </a:fld>
             <a:endParaRPr lang="zh-CN" altLang="en-US"/>
           </a:p>
@@ -6703,8 +6718,8 @@
           <a:chExt cx="0" cy="0"/>
         </a:xfrm>
       </p:grpSpPr>
-      <mc:AlternateContent xmlns:mc="http://schemas.openxmlformats.org/markup-compatibility/2006">
-        <mc:Choice xmlns:a14="http://schemas.microsoft.com/office/drawing/2010/main" Requires="a14">
+      <mc:AlternateContent xmlns:mc="http://schemas.openxmlformats.org/markup-compatibility/2006" xmlns:a14="http://schemas.microsoft.com/office/drawing/2010/main">
+        <mc:Choice Requires="a14">
           <p:sp>
             <p:nvSpPr>
               <p:cNvPr id="2" name="标题 1">
@@ -6757,7 +6772,7 @@
             </p:txBody>
           </p:sp>
         </mc:Choice>
-        <mc:Fallback>
+        <mc:Fallback xmlns="">
           <p:sp>
             <p:nvSpPr>
               <p:cNvPr id="2" name="标题 1">
@@ -6820,7 +6835,7 @@
           <a:p>
             <a:fld id="{42D6268D-2F70-4DA1-AFF2-3D6BAAA66193}" type="datetime1">
               <a:rPr lang="en-US" altLang="zh-CN" smtClean="0"/>
-              <a:t>6/22/2019</a:t>
+              <a:t>6/23/2019</a:t>
             </a:fld>
             <a:endParaRPr lang="zh-CN" altLang="en-US"/>
           </a:p>
@@ -6946,8 +6961,8 @@
           <a:chExt cx="0" cy="0"/>
         </a:xfrm>
       </p:grpSpPr>
-      <mc:AlternateContent xmlns:mc="http://schemas.openxmlformats.org/markup-compatibility/2006">
-        <mc:Choice xmlns:a14="http://schemas.microsoft.com/office/drawing/2010/main" Requires="a14">
+      <mc:AlternateContent xmlns:mc="http://schemas.openxmlformats.org/markup-compatibility/2006" xmlns:a14="http://schemas.microsoft.com/office/drawing/2010/main">
+        <mc:Choice Requires="a14">
           <p:sp>
             <p:nvSpPr>
               <p:cNvPr id="2" name="标题 1">
@@ -7000,7 +7015,7 @@
             </p:txBody>
           </p:sp>
         </mc:Choice>
-        <mc:Fallback>
+        <mc:Fallback xmlns="">
           <p:sp>
             <p:nvSpPr>
               <p:cNvPr id="2" name="标题 1">
@@ -7063,7 +7078,7 @@
           <a:p>
             <a:fld id="{42D6268D-2F70-4DA1-AFF2-3D6BAAA66193}" type="datetime1">
               <a:rPr lang="en-US" altLang="zh-CN" smtClean="0"/>
-              <a:t>6/22/2019</a:t>
+              <a:t>6/23/2019</a:t>
             </a:fld>
             <a:endParaRPr lang="zh-CN" altLang="en-US"/>
           </a:p>
@@ -7276,7 +7291,7 @@
               <a:rPr lang="en-US" altLang="zh-CN" sz="3200" dirty="0">
                 <a:latin typeface="+mj-lt"/>
               </a:rPr>
-              <a:t>To an LFU-based Algorithm</a:t>
+              <a:t>Changing to an LFU Algorithm</a:t>
             </a:r>
           </a:p>
         </p:txBody>
@@ -7304,7 +7319,7 @@
           <a:p>
             <a:fld id="{67EE479D-93C0-4BC3-9EFF-C7F9791CB645}" type="datetime1">
               <a:rPr lang="en-US" altLang="zh-CN" smtClean="0"/>
-              <a:t>6/22/2019</a:t>
+              <a:t>6/23/2019</a:t>
             </a:fld>
             <a:endParaRPr lang="zh-CN" altLang="en-US"/>
           </a:p>
@@ -7450,13 +7465,13 @@
           <a:p>
             <a:r>
               <a:rPr lang="en-US" altLang="zh-CN" dirty="0"/>
-              <a:t>Hard to find correlation between list sizes and parameters.</a:t>
+              <a:t>Hard to find correlation between sizes of LRU lists and parameters.</a:t>
             </a:r>
           </a:p>
           <a:p>
             <a:r>
               <a:rPr lang="en-US" altLang="zh-CN" dirty="0"/>
-              <a:t>The variation is more of hardware performance than some inherent mechanism. </a:t>
+              <a:t>The difference in list sizes is more of randomness than some inherent mechanism. </a:t>
             </a:r>
             <a:endParaRPr lang="zh-CN" altLang="en-US" dirty="0"/>
           </a:p>
@@ -7485,7 +7500,7 @@
           <a:p>
             <a:fld id="{42D6268D-2F70-4DA1-AFF2-3D6BAAA66193}" type="datetime1">
               <a:rPr lang="en-US" altLang="zh-CN" smtClean="0"/>
-              <a:t>6/22/2019</a:t>
+              <a:t>6/23/2019</a:t>
             </a:fld>
             <a:endParaRPr lang="zh-CN" altLang="en-US"/>
           </a:p>
@@ -7602,7 +7617,7 @@
           <a:p>
             <a:r>
               <a:rPr lang="en-US" altLang="zh-CN" dirty="0"/>
-              <a:t>To an LFU-Based Algorithm</a:t>
+              <a:t>To an LFU Algorithm</a:t>
             </a:r>
             <a:endParaRPr lang="zh-CN" altLang="en-US" dirty="0"/>
           </a:p>
@@ -7629,6 +7644,10 @@
           <a:bodyPr/>
           <a:lstStyle/>
           <a:p>
+            <a:r>
+              <a:rPr lang="en-US" altLang="zh-CN" dirty="0"/>
+              <a:t>With a few modifications to the LRU algorithm.</a:t>
+            </a:r>
             <a:endParaRPr lang="zh-CN" altLang="en-US" dirty="0"/>
           </a:p>
         </p:txBody>
@@ -7656,7 +7675,7 @@
           <a:p>
             <a:fld id="{42D6268D-2F70-4DA1-AFF2-3D6BAAA66193}" type="datetime1">
               <a:rPr lang="en-US" altLang="zh-CN" smtClean="0"/>
-              <a:t>6/22/2019</a:t>
+              <a:t>6/23/2019</a:t>
             </a:fld>
             <a:endParaRPr lang="zh-CN" altLang="en-US"/>
           </a:p>
@@ -7802,7 +7821,7 @@
           <a:p>
             <a:fld id="{832FBCBD-8421-4E2E-9FC7-E5C14DCBF41E}" type="datetime1">
               <a:rPr lang="en-US" altLang="zh-CN" smtClean="0"/>
-              <a:t>6/22/2019</a:t>
+              <a:t>6/23/2019</a:t>
             </a:fld>
             <a:endParaRPr lang="zh-CN" altLang="en-US"/>
           </a:p>
@@ -7998,7 +8017,7 @@
           <a:p>
             <a:fld id="{832FBCBD-8421-4E2E-9FC7-E5C14DCBF41E}" type="datetime1">
               <a:rPr lang="en-US" altLang="zh-CN" smtClean="0"/>
-              <a:t>6/22/2019</a:t>
+              <a:t>6/23/2019</a:t>
             </a:fld>
             <a:endParaRPr lang="zh-CN" altLang="en-US"/>
           </a:p>
@@ -8213,7 +8232,7 @@
           <a:p>
             <a:r>
               <a:rPr lang="en-US" altLang="zh-CN" dirty="0"/>
-              <a:t>LFU</a:t>
+              <a:t>LFU Algorithm</a:t>
             </a:r>
             <a:endParaRPr lang="zh-CN" altLang="en-US" dirty="0"/>
           </a:p>
@@ -8242,7 +8261,7 @@
           <a:p>
             <a:fld id="{42D6268D-2F70-4DA1-AFF2-3D6BAAA66193}" type="datetime1">
               <a:rPr lang="en-US" altLang="zh-CN" smtClean="0"/>
-              <a:t>6/22/2019</a:t>
+              <a:t>6/23/2019</a:t>
             </a:fld>
             <a:endParaRPr lang="zh-CN" altLang="en-US"/>
           </a:p>
@@ -8420,7 +8439,7 @@
           <a:p>
             <a:fld id="{42D6268D-2F70-4DA1-AFF2-3D6BAAA66193}" type="datetime1">
               <a:rPr lang="en-US" altLang="zh-CN" smtClean="0"/>
-              <a:t>6/22/2019</a:t>
+              <a:t>6/23/2019</a:t>
             </a:fld>
             <a:endParaRPr lang="zh-CN" altLang="en-US"/>
           </a:p>
@@ -8876,7 +8895,7 @@
           <a:p>
             <a:fld id="{42D6268D-2F70-4DA1-AFF2-3D6BAAA66193}" type="datetime1">
               <a:rPr lang="en-US" altLang="zh-CN" smtClean="0"/>
-              <a:t>6/22/2019</a:t>
+              <a:t>6/23/2019</a:t>
             </a:fld>
             <a:endParaRPr lang="zh-CN" altLang="en-US"/>
           </a:p>
@@ -9054,7 +9073,7 @@
           <a:p>
             <a:fld id="{42D6268D-2F70-4DA1-AFF2-3D6BAAA66193}" type="datetime1">
               <a:rPr lang="en-US" altLang="zh-CN" smtClean="0"/>
-              <a:t>6/22/2019</a:t>
+              <a:t>6/23/2019</a:t>
             </a:fld>
             <a:endParaRPr lang="zh-CN" altLang="en-US"/>
           </a:p>
@@ -9232,7 +9251,7 @@
           <a:p>
             <a:fld id="{42D6268D-2F70-4DA1-AFF2-3D6BAAA66193}" type="datetime1">
               <a:rPr lang="en-US" altLang="zh-CN" smtClean="0"/>
-              <a:t>6/22/2019</a:t>
+              <a:t>6/23/2019</a:t>
             </a:fld>
             <a:endParaRPr lang="zh-CN" altLang="en-US"/>
           </a:p>
@@ -9378,7 +9397,7 @@
           <a:p>
             <a:fld id="{42D6268D-2F70-4DA1-AFF2-3D6BAAA66193}" type="datetime1">
               <a:rPr lang="en-US" altLang="zh-CN" smtClean="0"/>
-              <a:t>6/22/2019</a:t>
+              <a:t>6/23/2019</a:t>
             </a:fld>
             <a:endParaRPr lang="zh-CN" altLang="en-US"/>
           </a:p>
@@ -9581,7 +9600,7 @@
           <a:p>
             <a:fld id="{D927A788-966E-4678-82EF-D7BCD44F7B05}" type="datetime1">
               <a:rPr lang="en-US" altLang="zh-CN" smtClean="0"/>
-              <a:t>6/22/2019</a:t>
+              <a:t>6/23/2019</a:t>
             </a:fld>
             <a:endParaRPr lang="zh-CN" altLang="en-US"/>
           </a:p>
@@ -9759,7 +9778,7 @@
           <a:p>
             <a:fld id="{42D6268D-2F70-4DA1-AFF2-3D6BAAA66193}" type="datetime1">
               <a:rPr lang="en-US" altLang="zh-CN" smtClean="0"/>
-              <a:t>6/22/2019</a:t>
+              <a:t>6/23/2019</a:t>
             </a:fld>
             <a:endParaRPr lang="zh-CN" altLang="en-US"/>
           </a:p>
@@ -9952,7 +9971,7 @@
           <a:p>
             <a:fld id="{42D6268D-2F70-4DA1-AFF2-3D6BAAA66193}" type="datetime1">
               <a:rPr lang="en-US" altLang="zh-CN" smtClean="0"/>
-              <a:t>6/22/2019</a:t>
+              <a:t>6/23/2019</a:t>
             </a:fld>
             <a:endParaRPr lang="zh-CN" altLang="en-US"/>
           </a:p>
@@ -10315,7 +10334,7 @@
           <a:p>
             <a:fld id="{42D6268D-2F70-4DA1-AFF2-3D6BAAA66193}" type="datetime1">
               <a:rPr lang="en-US" altLang="zh-CN" smtClean="0"/>
-              <a:t>6/22/2019</a:t>
+              <a:t>6/23/2019</a:t>
             </a:fld>
             <a:endParaRPr lang="zh-CN" altLang="en-US"/>
           </a:p>
@@ -10490,7 +10509,7 @@
           <a:p>
             <a:fld id="{42D6268D-2F70-4DA1-AFF2-3D6BAAA66193}" type="datetime1">
               <a:rPr lang="en-US" altLang="zh-CN" smtClean="0"/>
-              <a:t>6/22/2019</a:t>
+              <a:t>6/23/2019</a:t>
             </a:fld>
             <a:endParaRPr lang="zh-CN" altLang="en-US"/>
           </a:p>
@@ -10665,7 +10684,7 @@
           <a:p>
             <a:fld id="{42D6268D-2F70-4DA1-AFF2-3D6BAAA66193}" type="datetime1">
               <a:rPr lang="en-US" altLang="zh-CN" smtClean="0"/>
-              <a:t>6/22/2019</a:t>
+              <a:t>6/23/2019</a:t>
             </a:fld>
             <a:endParaRPr lang="zh-CN" altLang="en-US"/>
           </a:p>
@@ -10811,7 +10830,7 @@
           <a:p>
             <a:fld id="{6EBD23C6-F2C2-4AB5-A395-5C9CE18441C7}" type="datetime1">
               <a:rPr lang="en-US" altLang="zh-CN" smtClean="0"/>
-              <a:t>6/22/2019</a:t>
+              <a:t>6/23/2019</a:t>
             </a:fld>
             <a:endParaRPr lang="zh-CN" altLang="en-US"/>
           </a:p>
@@ -10994,7 +11013,7 @@
           <a:p>
             <a:fld id="{42D6268D-2F70-4DA1-AFF2-3D6BAAA66193}" type="datetime1">
               <a:rPr lang="en-US" altLang="zh-CN" smtClean="0"/>
-              <a:t>6/22/2019</a:t>
+              <a:t>6/23/2019</a:t>
             </a:fld>
             <a:endParaRPr lang="zh-CN" altLang="en-US"/>
           </a:p>
@@ -12194,7 +12213,7 @@
             </a:r>
             <a:r>
               <a:rPr lang="en-US" altLang="zh-CN" dirty="0"/>
-              <a:t>: Kernel threads are invoked periodically to check whether free pages are above a certain threshold.</a:t>
+              <a:t>: Kernel threads check periodically whether free pages are above a certain threshold.</a:t>
             </a:r>
             <a:endParaRPr lang="zh-CN" altLang="en-US" dirty="0"/>
           </a:p>
@@ -12223,7 +12242,7 @@
           <a:p>
             <a:fld id="{D03CE57E-267A-40BB-806F-75094D4A2095}" type="datetime1">
               <a:rPr lang="en-US" altLang="zh-CN" smtClean="0"/>
-              <a:t>6/22/2019</a:t>
+              <a:t>6/23/2019</a:t>
             </a:fld>
             <a:endParaRPr lang="zh-CN" altLang="en-US"/>
           </a:p>
@@ -12340,7 +12359,7 @@
           <a:p>
             <a:fld id="{D03CE57E-267A-40BB-806F-75094D4A2095}" type="datetime1">
               <a:rPr lang="en-US" altLang="zh-CN" smtClean="0"/>
-              <a:t>6/22/2019</a:t>
+              <a:t>6/23/2019</a:t>
             </a:fld>
             <a:endParaRPr lang="zh-CN" altLang="en-US"/>
           </a:p>
@@ -13849,7 +13868,7 @@
           <a:p>
             <a:fld id="{42D6268D-2F70-4DA1-AFF2-3D6BAAA66193}" type="datetime1">
               <a:rPr lang="en-US" altLang="zh-CN" smtClean="0"/>
-              <a:t>6/22/2019</a:t>
+              <a:t>6/23/2019</a:t>
             </a:fld>
             <a:endParaRPr lang="zh-CN" altLang="en-US" dirty="0"/>
           </a:p>
@@ -14361,7 +14380,7 @@
           <a:p>
             <a:fld id="{D03CE57E-267A-40BB-806F-75094D4A2095}" type="datetime1">
               <a:rPr lang="en-US" altLang="zh-CN" smtClean="0"/>
-              <a:t>6/22/2019</a:t>
+              <a:t>6/23/2019</a:t>
             </a:fld>
             <a:endParaRPr lang="zh-CN" altLang="en-US"/>
           </a:p>

</xml_diff>